<commit_message>
Committed for Template Design Pattern
</commit_message>
<xml_diff>
--- a/UMLDiagrams.pptx
+++ b/UMLDiagrams.pptx
@@ -5,7 +5,7 @@
     <p:sldMasterId id="2147483648" r:id="rId1"/>
   </p:sldMasterIdLst>
   <p:notesMasterIdLst>
-    <p:notesMasterId r:id="rId15"/>
+    <p:notesMasterId r:id="rId16"/>
   </p:notesMasterIdLst>
   <p:sldIdLst>
     <p:sldId id="256" r:id="rId2"/>
@@ -21,6 +21,7 @@
     <p:sldId id="354" r:id="rId12"/>
     <p:sldId id="355" r:id="rId13"/>
     <p:sldId id="356" r:id="rId14"/>
+    <p:sldId id="357" r:id="rId15"/>
   </p:sldIdLst>
   <p:sldSz cx="12192000" cy="6858000"/>
   <p:notesSz cx="6858000" cy="9144000"/>
@@ -130,7 +131,7 @@
 <file path=ppt/revisionInfo.xml><?xml version="1.0" encoding="utf-8"?>
 <p1510:revInfo xmlns:a="http://schemas.openxmlformats.org/drawingml/2006/main" xmlns:r="http://schemas.openxmlformats.org/officeDocument/2006/relationships" xmlns:p1510="http://schemas.microsoft.com/office/powerpoint/2015/10/main">
   <p1510:revLst>
-    <p1510:client id="{034AA59E-D954-44E8-84AB-C770C7EA240B}" v="21" dt="2023-09-11T10:16:40.185"/>
+    <p1510:client id="{034AA59E-D954-44E8-84AB-C770C7EA240B}" v="22" dt="2023-09-12T06:06:51.001"/>
   </p1510:revLst>
 </p1510:revInfo>
 </file>
@@ -140,7 +141,7 @@
   <pc:docChgLst>
     <pc:chgData name="Manaswini Ray" userId="451f23f8-43b4-4daa-9511-0c9fb98bad1c" providerId="ADAL" clId="{034AA59E-D954-44E8-84AB-C770C7EA240B}"/>
     <pc:docChg chg="undo custSel addSld delSld modSld">
-      <pc:chgData name="Manaswini Ray" userId="451f23f8-43b4-4daa-9511-0c9fb98bad1c" providerId="ADAL" clId="{034AA59E-D954-44E8-84AB-C770C7EA240B}" dt="2023-09-11T10:16:47.401" v="371" actId="14100"/>
+      <pc:chgData name="Manaswini Ray" userId="451f23f8-43b4-4daa-9511-0c9fb98bad1c" providerId="ADAL" clId="{034AA59E-D954-44E8-84AB-C770C7EA240B}" dt="2023-09-12T06:09:59.970" v="529" actId="1076"/>
       <pc:docMkLst>
         <pc:docMk/>
       </pc:docMkLst>
@@ -721,6 +722,237 @@
             <pc:docMk/>
             <pc:sldMk cId="177032187" sldId="356"/>
             <ac:cxnSpMk id="82" creationId="{0E482E31-92EA-4588-3E88-6A2BDBD1359A}"/>
+          </ac:cxnSpMkLst>
+        </pc:cxnChg>
+      </pc:sldChg>
+      <pc:sldChg chg="addSp delSp modSp new mod">
+        <pc:chgData name="Manaswini Ray" userId="451f23f8-43b4-4daa-9511-0c9fb98bad1c" providerId="ADAL" clId="{034AA59E-D954-44E8-84AB-C770C7EA240B}" dt="2023-09-12T06:09:59.970" v="529" actId="1076"/>
+        <pc:sldMkLst>
+          <pc:docMk/>
+          <pc:sldMk cId="192732721" sldId="357"/>
+        </pc:sldMkLst>
+        <pc:spChg chg="add mod">
+          <ac:chgData name="Manaswini Ray" userId="451f23f8-43b4-4daa-9511-0c9fb98bad1c" providerId="ADAL" clId="{034AA59E-D954-44E8-84AB-C770C7EA240B}" dt="2023-09-12T06:06:55.119" v="381" actId="20577"/>
+          <ac:spMkLst>
+            <pc:docMk/>
+            <pc:sldMk cId="192732721" sldId="357"/>
+            <ac:spMk id="2" creationId="{A8851384-546E-0D03-D063-3FB06A0955A7}"/>
+          </ac:spMkLst>
+        </pc:spChg>
+        <pc:spChg chg="add mod">
+          <ac:chgData name="Manaswini Ray" userId="451f23f8-43b4-4daa-9511-0c9fb98bad1c" providerId="ADAL" clId="{034AA59E-D954-44E8-84AB-C770C7EA240B}" dt="2023-09-12T06:06:51.001" v="373"/>
+          <ac:spMkLst>
+            <pc:docMk/>
+            <pc:sldMk cId="192732721" sldId="357"/>
+            <ac:spMk id="3" creationId="{FC78CA9B-B140-9D31-2F75-3DF9E2B30E34}"/>
+          </ac:spMkLst>
+        </pc:spChg>
+        <pc:spChg chg="add mod">
+          <ac:chgData name="Manaswini Ray" userId="451f23f8-43b4-4daa-9511-0c9fb98bad1c" providerId="ADAL" clId="{034AA59E-D954-44E8-84AB-C770C7EA240B}" dt="2023-09-12T06:06:51.001" v="373"/>
+          <ac:spMkLst>
+            <pc:docMk/>
+            <pc:sldMk cId="192732721" sldId="357"/>
+            <ac:spMk id="5" creationId="{15D4D659-4BAD-C979-B911-7B1FB3596494}"/>
+          </ac:spMkLst>
+        </pc:spChg>
+        <pc:spChg chg="add mod">
+          <ac:chgData name="Manaswini Ray" userId="451f23f8-43b4-4daa-9511-0c9fb98bad1c" providerId="ADAL" clId="{034AA59E-D954-44E8-84AB-C770C7EA240B}" dt="2023-09-12T06:08:49.705" v="497" actId="14100"/>
+          <ac:spMkLst>
+            <pc:docMk/>
+            <pc:sldMk cId="192732721" sldId="357"/>
+            <ac:spMk id="6" creationId="{0D9BB29D-4245-5DC0-D82F-C8D6B0744372}"/>
+          </ac:spMkLst>
+        </pc:spChg>
+        <pc:spChg chg="add mod">
+          <ac:chgData name="Manaswini Ray" userId="451f23f8-43b4-4daa-9511-0c9fb98bad1c" providerId="ADAL" clId="{034AA59E-D954-44E8-84AB-C770C7EA240B}" dt="2023-09-12T06:08:59.025" v="500" actId="1076"/>
+          <ac:spMkLst>
+            <pc:docMk/>
+            <pc:sldMk cId="192732721" sldId="357"/>
+            <ac:spMk id="7" creationId="{97BCFE65-7D23-B7F9-E779-3CA5FEF3D28E}"/>
+          </ac:spMkLst>
+        </pc:spChg>
+        <pc:spChg chg="add mod">
+          <ac:chgData name="Manaswini Ray" userId="451f23f8-43b4-4daa-9511-0c9fb98bad1c" providerId="ADAL" clId="{034AA59E-D954-44E8-84AB-C770C7EA240B}" dt="2023-09-12T06:06:51.001" v="373"/>
+          <ac:spMkLst>
+            <pc:docMk/>
+            <pc:sldMk cId="192732721" sldId="357"/>
+            <ac:spMk id="9" creationId="{554D8650-4AD3-D8EE-DC39-9E977B311EEA}"/>
+          </ac:spMkLst>
+        </pc:spChg>
+        <pc:spChg chg="add mod">
+          <ac:chgData name="Manaswini Ray" userId="451f23f8-43b4-4daa-9511-0c9fb98bad1c" providerId="ADAL" clId="{034AA59E-D954-44E8-84AB-C770C7EA240B}" dt="2023-09-12T06:09:40.470" v="525" actId="14100"/>
+          <ac:spMkLst>
+            <pc:docMk/>
+            <pc:sldMk cId="192732721" sldId="357"/>
+            <ac:spMk id="10" creationId="{39C0F402-A35E-1FDF-4347-312F8C1CCC5D}"/>
+          </ac:spMkLst>
+        </pc:spChg>
+        <pc:spChg chg="add mod">
+          <ac:chgData name="Manaswini Ray" userId="451f23f8-43b4-4daa-9511-0c9fb98bad1c" providerId="ADAL" clId="{034AA59E-D954-44E8-84AB-C770C7EA240B}" dt="2023-09-12T06:09:23.994" v="511" actId="20577"/>
+          <ac:spMkLst>
+            <pc:docMk/>
+            <pc:sldMk cId="192732721" sldId="357"/>
+            <ac:spMk id="12" creationId="{067EE05B-E9CB-16C6-A7EE-ADAB962D4AB6}"/>
+          </ac:spMkLst>
+        </pc:spChg>
+        <pc:spChg chg="add del mod">
+          <ac:chgData name="Manaswini Ray" userId="451f23f8-43b4-4daa-9511-0c9fb98bad1c" providerId="ADAL" clId="{034AA59E-D954-44E8-84AB-C770C7EA240B}" dt="2023-09-12T06:07:07.179" v="382" actId="478"/>
+          <ac:spMkLst>
+            <pc:docMk/>
+            <pc:sldMk cId="192732721" sldId="357"/>
+            <ac:spMk id="14" creationId="{663BF65B-AEA0-DB9F-9496-5BF88C6C3FD0}"/>
+          </ac:spMkLst>
+        </pc:spChg>
+        <pc:spChg chg="add del mod">
+          <ac:chgData name="Manaswini Ray" userId="451f23f8-43b4-4daa-9511-0c9fb98bad1c" providerId="ADAL" clId="{034AA59E-D954-44E8-84AB-C770C7EA240B}" dt="2023-09-12T06:07:07.179" v="382" actId="478"/>
+          <ac:spMkLst>
+            <pc:docMk/>
+            <pc:sldMk cId="192732721" sldId="357"/>
+            <ac:spMk id="16" creationId="{5D173078-62B5-B148-FD4F-F6F9DA9E67C6}"/>
+          </ac:spMkLst>
+        </pc:spChg>
+        <pc:spChg chg="add del mod">
+          <ac:chgData name="Manaswini Ray" userId="451f23f8-43b4-4daa-9511-0c9fb98bad1c" providerId="ADAL" clId="{034AA59E-D954-44E8-84AB-C770C7EA240B}" dt="2023-09-12T06:07:07.179" v="382" actId="478"/>
+          <ac:spMkLst>
+            <pc:docMk/>
+            <pc:sldMk cId="192732721" sldId="357"/>
+            <ac:spMk id="17" creationId="{155DD5D9-0EBA-BCDA-7D41-D50C71D3A273}"/>
+          </ac:spMkLst>
+        </pc:spChg>
+        <pc:spChg chg="add del mod">
+          <ac:chgData name="Manaswini Ray" userId="451f23f8-43b4-4daa-9511-0c9fb98bad1c" providerId="ADAL" clId="{034AA59E-D954-44E8-84AB-C770C7EA240B}" dt="2023-09-12T06:07:07.179" v="382" actId="478"/>
+          <ac:spMkLst>
+            <pc:docMk/>
+            <pc:sldMk cId="192732721" sldId="357"/>
+            <ac:spMk id="19" creationId="{CB3CA9A5-CEF3-3BBD-B289-23AF8F4A8C87}"/>
+          </ac:spMkLst>
+        </pc:spChg>
+        <pc:spChg chg="add mod">
+          <ac:chgData name="Manaswini Ray" userId="451f23f8-43b4-4daa-9511-0c9fb98bad1c" providerId="ADAL" clId="{034AA59E-D954-44E8-84AB-C770C7EA240B}" dt="2023-09-12T06:09:45.463" v="526"/>
+          <ac:spMkLst>
+            <pc:docMk/>
+            <pc:sldMk cId="192732721" sldId="357"/>
+            <ac:spMk id="22" creationId="{E90A19C6-BA17-BC56-F24A-FAEE45302DE2}"/>
+          </ac:spMkLst>
+        </pc:spChg>
+        <pc:spChg chg="add del mod">
+          <ac:chgData name="Manaswini Ray" userId="451f23f8-43b4-4daa-9511-0c9fb98bad1c" providerId="ADAL" clId="{034AA59E-D954-44E8-84AB-C770C7EA240B}" dt="2023-09-12T06:07:07.179" v="382" actId="478"/>
+          <ac:spMkLst>
+            <pc:docMk/>
+            <pc:sldMk cId="192732721" sldId="357"/>
+            <ac:spMk id="23" creationId="{E7E53AAB-C751-D42C-D46E-32D82F1DD523}"/>
+          </ac:spMkLst>
+        </pc:spChg>
+        <pc:spChg chg="add del mod">
+          <ac:chgData name="Manaswini Ray" userId="451f23f8-43b4-4daa-9511-0c9fb98bad1c" providerId="ADAL" clId="{034AA59E-D954-44E8-84AB-C770C7EA240B}" dt="2023-09-12T06:07:07.179" v="382" actId="478"/>
+          <ac:spMkLst>
+            <pc:docMk/>
+            <pc:sldMk cId="192732721" sldId="357"/>
+            <ac:spMk id="24" creationId="{E345F398-78CB-FB54-877D-49D92F16E3BE}"/>
+          </ac:spMkLst>
+        </pc:spChg>
+        <pc:spChg chg="add mod">
+          <ac:chgData name="Manaswini Ray" userId="451f23f8-43b4-4daa-9511-0c9fb98bad1c" providerId="ADAL" clId="{034AA59E-D954-44E8-84AB-C770C7EA240B}" dt="2023-09-12T06:09:53.103" v="527" actId="14100"/>
+          <ac:spMkLst>
+            <pc:docMk/>
+            <pc:sldMk cId="192732721" sldId="357"/>
+            <ac:spMk id="25" creationId="{5EA03F13-C671-B8A3-3568-1DD3D8371592}"/>
+          </ac:spMkLst>
+        </pc:spChg>
+        <pc:spChg chg="add mod">
+          <ac:chgData name="Manaswini Ray" userId="451f23f8-43b4-4daa-9511-0c9fb98bad1c" providerId="ADAL" clId="{034AA59E-D954-44E8-84AB-C770C7EA240B}" dt="2023-09-12T06:09:29.408" v="524" actId="20577"/>
+          <ac:spMkLst>
+            <pc:docMk/>
+            <pc:sldMk cId="192732721" sldId="357"/>
+            <ac:spMk id="27" creationId="{BAB02D4C-F2C9-AF10-C7BF-D929EB3120E5}"/>
+          </ac:spMkLst>
+        </pc:spChg>
+        <pc:spChg chg="add mod">
+          <ac:chgData name="Manaswini Ray" userId="451f23f8-43b4-4daa-9511-0c9fb98bad1c" providerId="ADAL" clId="{034AA59E-D954-44E8-84AB-C770C7EA240B}" dt="2023-09-12T06:09:59.970" v="529" actId="1076"/>
+          <ac:spMkLst>
+            <pc:docMk/>
+            <pc:sldMk cId="192732721" sldId="357"/>
+            <ac:spMk id="28" creationId="{01FCC91E-1B87-F160-E14C-59D4331B2F97}"/>
+          </ac:spMkLst>
+        </pc:spChg>
+        <pc:cxnChg chg="add mod">
+          <ac:chgData name="Manaswini Ray" userId="451f23f8-43b4-4daa-9511-0c9fb98bad1c" providerId="ADAL" clId="{034AA59E-D954-44E8-84AB-C770C7EA240B}" dt="2023-09-12T06:08:55.798" v="499" actId="1076"/>
+          <ac:cxnSpMkLst>
+            <pc:docMk/>
+            <pc:sldMk cId="192732721" sldId="357"/>
+            <ac:cxnSpMk id="4" creationId="{9CCE4B34-D951-D55B-BEE6-7BAD38A73076}"/>
+          </ac:cxnSpMkLst>
+        </pc:cxnChg>
+        <pc:cxnChg chg="add mod">
+          <ac:chgData name="Manaswini Ray" userId="451f23f8-43b4-4daa-9511-0c9fb98bad1c" providerId="ADAL" clId="{034AA59E-D954-44E8-84AB-C770C7EA240B}" dt="2023-09-12T06:08:59.025" v="500" actId="1076"/>
+          <ac:cxnSpMkLst>
+            <pc:docMk/>
+            <pc:sldMk cId="192732721" sldId="357"/>
+            <ac:cxnSpMk id="8" creationId="{3756F977-DF99-6200-BE44-957716AC77E1}"/>
+          </ac:cxnSpMkLst>
+        </pc:cxnChg>
+        <pc:cxnChg chg="add mod">
+          <ac:chgData name="Manaswini Ray" userId="451f23f8-43b4-4daa-9511-0c9fb98bad1c" providerId="ADAL" clId="{034AA59E-D954-44E8-84AB-C770C7EA240B}" dt="2023-09-12T06:06:51.001" v="373"/>
+          <ac:cxnSpMkLst>
+            <pc:docMk/>
+            <pc:sldMk cId="192732721" sldId="357"/>
+            <ac:cxnSpMk id="11" creationId="{479F7E3D-10B3-C4B0-088C-5F5D6CD711D8}"/>
+          </ac:cxnSpMkLst>
+        </pc:cxnChg>
+        <pc:cxnChg chg="add mod">
+          <ac:chgData name="Manaswini Ray" userId="451f23f8-43b4-4daa-9511-0c9fb98bad1c" providerId="ADAL" clId="{034AA59E-D954-44E8-84AB-C770C7EA240B}" dt="2023-09-12T06:06:51.001" v="373"/>
+          <ac:cxnSpMkLst>
+            <pc:docMk/>
+            <pc:sldMk cId="192732721" sldId="357"/>
+            <ac:cxnSpMk id="13" creationId="{7D843023-FB08-A881-1E87-3AEE5637CAA5}"/>
+          </ac:cxnSpMkLst>
+        </pc:cxnChg>
+        <pc:cxnChg chg="add del mod">
+          <ac:chgData name="Manaswini Ray" userId="451f23f8-43b4-4daa-9511-0c9fb98bad1c" providerId="ADAL" clId="{034AA59E-D954-44E8-84AB-C770C7EA240B}" dt="2023-09-12T06:07:07.179" v="382" actId="478"/>
+          <ac:cxnSpMkLst>
+            <pc:docMk/>
+            <pc:sldMk cId="192732721" sldId="357"/>
+            <ac:cxnSpMk id="15" creationId="{127BF695-7C0C-5EB6-ABAB-44A23CD4841F}"/>
+          </ac:cxnSpMkLst>
+        </pc:cxnChg>
+        <pc:cxnChg chg="add del mod">
+          <ac:chgData name="Manaswini Ray" userId="451f23f8-43b4-4daa-9511-0c9fb98bad1c" providerId="ADAL" clId="{034AA59E-D954-44E8-84AB-C770C7EA240B}" dt="2023-09-12T06:07:07.179" v="382" actId="478"/>
+          <ac:cxnSpMkLst>
+            <pc:docMk/>
+            <pc:sldMk cId="192732721" sldId="357"/>
+            <ac:cxnSpMk id="18" creationId="{2855D972-EE43-A6C1-57DC-3A630BC1CC1E}"/>
+          </ac:cxnSpMkLst>
+        </pc:cxnChg>
+        <pc:cxnChg chg="add del mod">
+          <ac:chgData name="Manaswini Ray" userId="451f23f8-43b4-4daa-9511-0c9fb98bad1c" providerId="ADAL" clId="{034AA59E-D954-44E8-84AB-C770C7EA240B}" dt="2023-09-12T06:07:12.161" v="384" actId="478"/>
+          <ac:cxnSpMkLst>
+            <pc:docMk/>
+            <pc:sldMk cId="192732721" sldId="357"/>
+            <ac:cxnSpMk id="20" creationId="{1BEF32F4-2AE6-695E-4E11-C015D7B007C3}"/>
+          </ac:cxnSpMkLst>
+        </pc:cxnChg>
+        <pc:cxnChg chg="add del mod">
+          <ac:chgData name="Manaswini Ray" userId="451f23f8-43b4-4daa-9511-0c9fb98bad1c" providerId="ADAL" clId="{034AA59E-D954-44E8-84AB-C770C7EA240B}" dt="2023-09-12T06:07:09.766" v="383" actId="478"/>
+          <ac:cxnSpMkLst>
+            <pc:docMk/>
+            <pc:sldMk cId="192732721" sldId="357"/>
+            <ac:cxnSpMk id="21" creationId="{C53C6CFF-F94E-1454-AD2B-EA2B60CF7F59}"/>
+          </ac:cxnSpMkLst>
+        </pc:cxnChg>
+        <pc:cxnChg chg="add mod">
+          <ac:chgData name="Manaswini Ray" userId="451f23f8-43b4-4daa-9511-0c9fb98bad1c" providerId="ADAL" clId="{034AA59E-D954-44E8-84AB-C770C7EA240B}" dt="2023-09-12T06:07:21.262" v="385" actId="1076"/>
+          <ac:cxnSpMkLst>
+            <pc:docMk/>
+            <pc:sldMk cId="192732721" sldId="357"/>
+            <ac:cxnSpMk id="26" creationId="{63A25A13-CBB5-B342-2092-9ABF58C11691}"/>
+          </ac:cxnSpMkLst>
+        </pc:cxnChg>
+        <pc:cxnChg chg="add mod">
+          <ac:chgData name="Manaswini Ray" userId="451f23f8-43b4-4daa-9511-0c9fb98bad1c" providerId="ADAL" clId="{034AA59E-D954-44E8-84AB-C770C7EA240B}" dt="2023-09-12T06:09:59.970" v="529" actId="1076"/>
+          <ac:cxnSpMkLst>
+            <pc:docMk/>
+            <pc:sldMk cId="192732721" sldId="357"/>
+            <ac:cxnSpMk id="29" creationId="{BF048B4C-25AE-3D92-35D9-13FB36430248}"/>
           </ac:cxnSpMkLst>
         </pc:cxnChg>
       </pc:sldChg>
@@ -3277,7 +3509,7 @@
           <a:p>
             <a:fld id="{DA65EFA3-2408-462E-A228-C020DF9C1D92}" type="datetimeFigureOut">
               <a:rPr lang="en-IN" smtClean="0"/>
-              <a:t>11-09-2023</a:t>
+              <a:t>12-09-2023</a:t>
             </a:fld>
             <a:endParaRPr lang="en-IN"/>
           </a:p>
@@ -3778,7 +4010,7 @@
           <a:p>
             <a:fld id="{DBA864D8-E328-4C18-B44D-9296865D5C31}" type="datetimeFigureOut">
               <a:rPr lang="en-IN" smtClean="0"/>
-              <a:t>11-09-2023</a:t>
+              <a:t>12-09-2023</a:t>
             </a:fld>
             <a:endParaRPr lang="en-IN"/>
           </a:p>
@@ -3978,7 +4210,7 @@
           <a:p>
             <a:fld id="{DBA864D8-E328-4C18-B44D-9296865D5C31}" type="datetimeFigureOut">
               <a:rPr lang="en-IN" smtClean="0"/>
-              <a:t>11-09-2023</a:t>
+              <a:t>12-09-2023</a:t>
             </a:fld>
             <a:endParaRPr lang="en-IN"/>
           </a:p>
@@ -4188,7 +4420,7 @@
           <a:p>
             <a:fld id="{DBA864D8-E328-4C18-B44D-9296865D5C31}" type="datetimeFigureOut">
               <a:rPr lang="en-IN" smtClean="0"/>
-              <a:t>11-09-2023</a:t>
+              <a:t>12-09-2023</a:t>
             </a:fld>
             <a:endParaRPr lang="en-IN"/>
           </a:p>
@@ -4455,7 +4687,7 @@
           <a:p>
             <a:fld id="{DBA864D8-E328-4C18-B44D-9296865D5C31}" type="datetimeFigureOut">
               <a:rPr lang="en-IN" smtClean="0"/>
-              <a:t>11-09-2023</a:t>
+              <a:t>12-09-2023</a:t>
             </a:fld>
             <a:endParaRPr lang="en-IN"/>
           </a:p>
@@ -4731,7 +4963,7 @@
           <a:p>
             <a:fld id="{DBA864D8-E328-4C18-B44D-9296865D5C31}" type="datetimeFigureOut">
               <a:rPr lang="en-IN" smtClean="0"/>
-              <a:t>11-09-2023</a:t>
+              <a:t>12-09-2023</a:t>
             </a:fld>
             <a:endParaRPr lang="en-IN"/>
           </a:p>
@@ -4999,7 +5231,7 @@
           <a:p>
             <a:fld id="{DBA864D8-E328-4C18-B44D-9296865D5C31}" type="datetimeFigureOut">
               <a:rPr lang="en-IN" smtClean="0"/>
-              <a:t>11-09-2023</a:t>
+              <a:t>12-09-2023</a:t>
             </a:fld>
             <a:endParaRPr lang="en-IN"/>
           </a:p>
@@ -5414,7 +5646,7 @@
           <a:p>
             <a:fld id="{DBA864D8-E328-4C18-B44D-9296865D5C31}" type="datetimeFigureOut">
               <a:rPr lang="en-IN" smtClean="0"/>
-              <a:t>11-09-2023</a:t>
+              <a:t>12-09-2023</a:t>
             </a:fld>
             <a:endParaRPr lang="en-IN"/>
           </a:p>
@@ -5556,7 +5788,7 @@
           <a:p>
             <a:fld id="{DBA864D8-E328-4C18-B44D-9296865D5C31}" type="datetimeFigureOut">
               <a:rPr lang="en-IN" smtClean="0"/>
-              <a:t>11-09-2023</a:t>
+              <a:t>12-09-2023</a:t>
             </a:fld>
             <a:endParaRPr lang="en-IN"/>
           </a:p>
@@ -5669,7 +5901,7 @@
           <a:p>
             <a:fld id="{DBA864D8-E328-4C18-B44D-9296865D5C31}" type="datetimeFigureOut">
               <a:rPr lang="en-IN" smtClean="0"/>
-              <a:t>11-09-2023</a:t>
+              <a:t>12-09-2023</a:t>
             </a:fld>
             <a:endParaRPr lang="en-IN"/>
           </a:p>
@@ -5982,7 +6214,7 @@
           <a:p>
             <a:fld id="{DBA864D8-E328-4C18-B44D-9296865D5C31}" type="datetimeFigureOut">
               <a:rPr lang="en-IN" smtClean="0"/>
-              <a:t>11-09-2023</a:t>
+              <a:t>12-09-2023</a:t>
             </a:fld>
             <a:endParaRPr lang="en-IN"/>
           </a:p>
@@ -6271,7 +6503,7 @@
           <a:p>
             <a:fld id="{DBA864D8-E328-4C18-B44D-9296865D5C31}" type="datetimeFigureOut">
               <a:rPr lang="en-IN" smtClean="0"/>
-              <a:t>11-09-2023</a:t>
+              <a:t>12-09-2023</a:t>
             </a:fld>
             <a:endParaRPr lang="en-IN"/>
           </a:p>
@@ -6514,7 +6746,7 @@
           <a:p>
             <a:fld id="{DBA864D8-E328-4C18-B44D-9296865D5C31}" type="datetimeFigureOut">
               <a:rPr lang="en-IN" smtClean="0"/>
-              <a:t>11-09-2023</a:t>
+              <a:t>12-09-2023</a:t>
             </a:fld>
             <a:endParaRPr lang="en-IN"/>
           </a:p>
@@ -11943,6 +12175,958 @@
     <p:extLst>
       <p:ext uri="{BB962C8B-B14F-4D97-AF65-F5344CB8AC3E}">
         <p14:creationId xmlns:p14="http://schemas.microsoft.com/office/powerpoint/2010/main" val="177032187"/>
+      </p:ext>
+    </p:extLst>
+  </p:cSld>
+  <p:clrMapOvr>
+    <a:masterClrMapping/>
+  </p:clrMapOvr>
+</p:sld>
+</file>
+
+<file path=ppt/slides/slide14.xml><?xml version="1.0" encoding="utf-8"?>
+<p:sld xmlns:a="http://schemas.openxmlformats.org/drawingml/2006/main" xmlns:r="http://schemas.openxmlformats.org/officeDocument/2006/relationships" xmlns:p="http://schemas.openxmlformats.org/presentationml/2006/main">
+  <p:cSld>
+    <p:spTree>
+      <p:nvGrpSpPr>
+        <p:cNvPr id="1" name=""/>
+        <p:cNvGrpSpPr/>
+        <p:nvPr/>
+      </p:nvGrpSpPr>
+      <p:grpSpPr>
+        <a:xfrm>
+          <a:off x="0" y="0"/>
+          <a:ext cx="0" cy="0"/>
+          <a:chOff x="0" y="0"/>
+          <a:chExt cx="0" cy="0"/>
+        </a:xfrm>
+      </p:grpSpPr>
+      <p:sp>
+        <p:nvSpPr>
+          <p:cNvPr id="2" name="TextBox 1">
+            <a:extLst>
+              <a:ext uri="{FF2B5EF4-FFF2-40B4-BE49-F238E27FC236}">
+                <a16:creationId xmlns:a16="http://schemas.microsoft.com/office/drawing/2014/main" id="{A8851384-546E-0D03-D063-3FB06A0955A7}"/>
+              </a:ext>
+            </a:extLst>
+          </p:cNvPr>
+          <p:cNvSpPr txBox="1"/>
+          <p:nvPr/>
+        </p:nvSpPr>
+        <p:spPr>
+          <a:xfrm>
+            <a:off x="252248" y="393403"/>
+            <a:ext cx="6138040" cy="400110"/>
+          </a:xfrm>
+          <a:prstGeom prst="rect">
+            <a:avLst/>
+          </a:prstGeom>
+          <a:noFill/>
+        </p:spPr>
+        <p:txBody>
+          <a:bodyPr wrap="square">
+            <a:spAutoFit/>
+          </a:bodyPr>
+          <a:lstStyle/>
+          <a:p>
+            <a:r>
+              <a:rPr lang="en-US" sz="2000" b="1" u="sng" dirty="0">
+                <a:solidFill>
+                  <a:srgbClr val="000000"/>
+                </a:solidFill>
+              </a:rPr>
+              <a:t>Template </a:t>
+            </a:r>
+            <a:r>
+              <a:rPr lang="en-IN" sz="2000" b="1" u="sng" dirty="0">
+                <a:solidFill>
+                  <a:srgbClr val="000000"/>
+                </a:solidFill>
+              </a:rPr>
+              <a:t>Design Pattern</a:t>
+            </a:r>
+            <a:endParaRPr lang="en-IN" sz="2000" b="1" u="sng" dirty="0"/>
+          </a:p>
+        </p:txBody>
+      </p:sp>
+      <p:sp>
+        <p:nvSpPr>
+          <p:cNvPr id="3" name="Rectangle 2">
+            <a:extLst>
+              <a:ext uri="{FF2B5EF4-FFF2-40B4-BE49-F238E27FC236}">
+                <a16:creationId xmlns:a16="http://schemas.microsoft.com/office/drawing/2014/main" id="{FC78CA9B-B140-9D31-2F75-3DF9E2B30E34}"/>
+              </a:ext>
+            </a:extLst>
+          </p:cNvPr>
+          <p:cNvSpPr/>
+          <p:nvPr/>
+        </p:nvSpPr>
+        <p:spPr>
+          <a:xfrm>
+            <a:off x="2748169" y="1587742"/>
+            <a:ext cx="2991679" cy="2301085"/>
+          </a:xfrm>
+          <a:prstGeom prst="rect">
+            <a:avLst/>
+          </a:prstGeom>
+          <a:noFill/>
+          <a:ln>
+            <a:solidFill>
+              <a:schemeClr val="bg2">
+                <a:lumMod val="10000"/>
+              </a:schemeClr>
+            </a:solidFill>
+          </a:ln>
+        </p:spPr>
+        <p:style>
+          <a:lnRef idx="2">
+            <a:schemeClr val="accent1">
+              <a:shade val="50000"/>
+            </a:schemeClr>
+          </a:lnRef>
+          <a:fillRef idx="1">
+            <a:schemeClr val="accent1"/>
+          </a:fillRef>
+          <a:effectRef idx="0">
+            <a:schemeClr val="accent1"/>
+          </a:effectRef>
+          <a:fontRef idx="minor">
+            <a:schemeClr val="lt1"/>
+          </a:fontRef>
+        </p:style>
+        <p:txBody>
+          <a:bodyPr rtlCol="0" anchor="ctr"/>
+          <a:lstStyle/>
+          <a:p>
+            <a:pPr algn="ctr"/>
+            <a:endParaRPr lang="en-IN"/>
+          </a:p>
+        </p:txBody>
+      </p:sp>
+      <p:cxnSp>
+        <p:nvCxnSpPr>
+          <p:cNvPr id="4" name="Straight Connector 3">
+            <a:extLst>
+              <a:ext uri="{FF2B5EF4-FFF2-40B4-BE49-F238E27FC236}">
+                <a16:creationId xmlns:a16="http://schemas.microsoft.com/office/drawing/2014/main" id="{9CCE4B34-D951-D55B-BEE6-7BAD38A73076}"/>
+              </a:ext>
+            </a:extLst>
+          </p:cNvPr>
+          <p:cNvCxnSpPr>
+            <a:cxnSpLocks/>
+          </p:cNvCxnSpPr>
+          <p:nvPr/>
+        </p:nvCxnSpPr>
+        <p:spPr>
+          <a:xfrm>
+            <a:off x="2748168" y="2078070"/>
+            <a:ext cx="2991679" cy="0"/>
+          </a:xfrm>
+          <a:prstGeom prst="line">
+            <a:avLst/>
+          </a:prstGeom>
+          <a:ln>
+            <a:solidFill>
+              <a:schemeClr val="tx1">
+                <a:lumMod val="95000"/>
+                <a:lumOff val="5000"/>
+              </a:schemeClr>
+            </a:solidFill>
+          </a:ln>
+        </p:spPr>
+        <p:style>
+          <a:lnRef idx="1">
+            <a:schemeClr val="accent1"/>
+          </a:lnRef>
+          <a:fillRef idx="0">
+            <a:schemeClr val="accent1"/>
+          </a:fillRef>
+          <a:effectRef idx="0">
+            <a:schemeClr val="accent1"/>
+          </a:effectRef>
+          <a:fontRef idx="minor">
+            <a:schemeClr val="tx1"/>
+          </a:fontRef>
+        </p:style>
+      </p:cxnSp>
+      <p:sp>
+        <p:nvSpPr>
+          <p:cNvPr id="5" name="TextBox 4">
+            <a:extLst>
+              <a:ext uri="{FF2B5EF4-FFF2-40B4-BE49-F238E27FC236}">
+                <a16:creationId xmlns:a16="http://schemas.microsoft.com/office/drawing/2014/main" id="{15D4D659-4BAD-C979-B911-7B1FB3596494}"/>
+              </a:ext>
+            </a:extLst>
+          </p:cNvPr>
+          <p:cNvSpPr txBox="1"/>
+          <p:nvPr/>
+        </p:nvSpPr>
+        <p:spPr>
+          <a:xfrm>
+            <a:off x="583216" y="1332637"/>
+            <a:ext cx="1373138" cy="369332"/>
+          </a:xfrm>
+          <a:prstGeom prst="rect">
+            <a:avLst/>
+          </a:prstGeom>
+          <a:noFill/>
+        </p:spPr>
+        <p:txBody>
+          <a:bodyPr wrap="square" rtlCol="0">
+            <a:spAutoFit/>
+          </a:bodyPr>
+          <a:lstStyle/>
+          <a:p>
+            <a:r>
+              <a:rPr lang="en-US" dirty="0"/>
+              <a:t>Client</a:t>
+            </a:r>
+            <a:endParaRPr lang="en-IN" dirty="0"/>
+          </a:p>
+        </p:txBody>
+      </p:sp>
+      <p:sp>
+        <p:nvSpPr>
+          <p:cNvPr id="6" name="TextBox 5">
+            <a:extLst>
+              <a:ext uri="{FF2B5EF4-FFF2-40B4-BE49-F238E27FC236}">
+                <a16:creationId xmlns:a16="http://schemas.microsoft.com/office/drawing/2014/main" id="{0D9BB29D-4245-5DC0-D82F-C8D6B0744372}"/>
+              </a:ext>
+            </a:extLst>
+          </p:cNvPr>
+          <p:cNvSpPr txBox="1"/>
+          <p:nvPr/>
+        </p:nvSpPr>
+        <p:spPr>
+          <a:xfrm>
+            <a:off x="2773014" y="1665264"/>
+            <a:ext cx="2629303" cy="369332"/>
+          </a:xfrm>
+          <a:prstGeom prst="rect">
+            <a:avLst/>
+          </a:prstGeom>
+          <a:noFill/>
+        </p:spPr>
+        <p:txBody>
+          <a:bodyPr wrap="square" rtlCol="0">
+            <a:spAutoFit/>
+          </a:bodyPr>
+          <a:lstStyle/>
+          <a:p>
+            <a:r>
+              <a:rPr lang="en-US" dirty="0" err="1"/>
+              <a:t>OrderProcessTemplate</a:t>
+            </a:r>
+            <a:endParaRPr lang="en-IN" dirty="0"/>
+          </a:p>
+        </p:txBody>
+      </p:sp>
+      <p:sp>
+        <p:nvSpPr>
+          <p:cNvPr id="7" name="TextBox 6">
+            <a:extLst>
+              <a:ext uri="{FF2B5EF4-FFF2-40B4-BE49-F238E27FC236}">
+                <a16:creationId xmlns:a16="http://schemas.microsoft.com/office/drawing/2014/main" id="{97BCFE65-7D23-B7F9-E779-3CA5FEF3D28E}"/>
+              </a:ext>
+            </a:extLst>
+          </p:cNvPr>
+          <p:cNvSpPr txBox="1"/>
+          <p:nvPr/>
+        </p:nvSpPr>
+        <p:spPr>
+          <a:xfrm>
+            <a:off x="2748168" y="2103362"/>
+            <a:ext cx="2538535" cy="2096732"/>
+          </a:xfrm>
+          <a:prstGeom prst="rect">
+            <a:avLst/>
+          </a:prstGeom>
+          <a:noFill/>
+        </p:spPr>
+        <p:txBody>
+          <a:bodyPr wrap="square" rtlCol="0">
+            <a:spAutoFit/>
+          </a:bodyPr>
+          <a:lstStyle/>
+          <a:p>
+            <a:r>
+              <a:rPr lang="en-US" dirty="0" err="1"/>
+              <a:t>ProcessOrder</a:t>
+            </a:r>
+            <a:r>
+              <a:rPr lang="en-US" dirty="0"/>
+              <a:t>(){}</a:t>
+            </a:r>
+          </a:p>
+          <a:p>
+            <a:r>
+              <a:rPr lang="en-US" dirty="0" err="1"/>
+              <a:t>TakeOrder</a:t>
+            </a:r>
+            <a:r>
+              <a:rPr lang="en-US" dirty="0"/>
+              <a:t>()</a:t>
+            </a:r>
+          </a:p>
+          <a:p>
+            <a:r>
+              <a:rPr lang="en-US" dirty="0" err="1"/>
+              <a:t>PrepareOrder</a:t>
+            </a:r>
+            <a:r>
+              <a:rPr lang="en-US" dirty="0"/>
+              <a:t>()</a:t>
+            </a:r>
+          </a:p>
+          <a:p>
+            <a:r>
+              <a:rPr lang="en-US" dirty="0"/>
+              <a:t>Service()</a:t>
+            </a:r>
+          </a:p>
+          <a:p>
+            <a:r>
+              <a:rPr lang="en-US" dirty="0" err="1"/>
+              <a:t>IsPayment</a:t>
+            </a:r>
+            <a:r>
+              <a:rPr lang="en-US" dirty="0"/>
+              <a:t>()</a:t>
+            </a:r>
+          </a:p>
+          <a:p>
+            <a:r>
+              <a:rPr lang="en-US" dirty="0" err="1"/>
+              <a:t>ProcessPayment</a:t>
+            </a:r>
+            <a:r>
+              <a:rPr lang="en-US" dirty="0"/>
+              <a:t>()</a:t>
+            </a:r>
+          </a:p>
+          <a:p>
+            <a:endParaRPr lang="en-US" dirty="0"/>
+          </a:p>
+        </p:txBody>
+      </p:sp>
+      <p:cxnSp>
+        <p:nvCxnSpPr>
+          <p:cNvPr id="8" name="Straight Arrow Connector 17">
+            <a:extLst>
+              <a:ext uri="{FF2B5EF4-FFF2-40B4-BE49-F238E27FC236}">
+                <a16:creationId xmlns:a16="http://schemas.microsoft.com/office/drawing/2014/main" id="{3756F977-DF99-6200-BE44-957716AC77E1}"/>
+              </a:ext>
+            </a:extLst>
+          </p:cNvPr>
+          <p:cNvCxnSpPr>
+            <a:cxnSpLocks/>
+            <a:stCxn id="9" idx="2"/>
+            <a:endCxn id="7" idx="1"/>
+          </p:cNvCxnSpPr>
+          <p:nvPr/>
+        </p:nvCxnSpPr>
+        <p:spPr>
+          <a:xfrm rot="16200000" flipH="1">
+            <a:off x="1393780" y="1797339"/>
+            <a:ext cx="1238845" cy="1469932"/>
+          </a:xfrm>
+          <a:prstGeom prst="bentConnector2">
+            <a:avLst/>
+          </a:prstGeom>
+          <a:ln>
+            <a:tailEnd type="triangle"/>
+          </a:ln>
+        </p:spPr>
+        <p:style>
+          <a:lnRef idx="1">
+            <a:schemeClr val="dk1"/>
+          </a:lnRef>
+          <a:fillRef idx="0">
+            <a:schemeClr val="dk1"/>
+          </a:fillRef>
+          <a:effectRef idx="0">
+            <a:schemeClr val="dk1"/>
+          </a:effectRef>
+          <a:fontRef idx="minor">
+            <a:schemeClr val="tx1"/>
+          </a:fontRef>
+        </p:style>
+      </p:cxnSp>
+      <p:sp>
+        <p:nvSpPr>
+          <p:cNvPr id="9" name="Rectangle 8">
+            <a:extLst>
+              <a:ext uri="{FF2B5EF4-FFF2-40B4-BE49-F238E27FC236}">
+                <a16:creationId xmlns:a16="http://schemas.microsoft.com/office/drawing/2014/main" id="{554D8650-4AD3-D8EE-DC39-9E977B311EEA}"/>
+              </a:ext>
+            </a:extLst>
+          </p:cNvPr>
+          <p:cNvSpPr/>
+          <p:nvPr/>
+        </p:nvSpPr>
+        <p:spPr>
+          <a:xfrm>
+            <a:off x="252248" y="1147106"/>
+            <a:ext cx="2051975" cy="765777"/>
+          </a:xfrm>
+          <a:prstGeom prst="rect">
+            <a:avLst/>
+          </a:prstGeom>
+          <a:noFill/>
+          <a:ln>
+            <a:solidFill>
+              <a:schemeClr val="bg2">
+                <a:lumMod val="10000"/>
+              </a:schemeClr>
+            </a:solidFill>
+          </a:ln>
+        </p:spPr>
+        <p:style>
+          <a:lnRef idx="2">
+            <a:schemeClr val="accent1">
+              <a:shade val="50000"/>
+            </a:schemeClr>
+          </a:lnRef>
+          <a:fillRef idx="1">
+            <a:schemeClr val="accent1"/>
+          </a:fillRef>
+          <a:effectRef idx="0">
+            <a:schemeClr val="accent1"/>
+          </a:effectRef>
+          <a:fontRef idx="minor">
+            <a:schemeClr val="lt1"/>
+          </a:fontRef>
+        </p:style>
+        <p:txBody>
+          <a:bodyPr rtlCol="0" anchor="ctr"/>
+          <a:lstStyle/>
+          <a:p>
+            <a:pPr algn="ctr"/>
+            <a:endParaRPr lang="en-IN"/>
+          </a:p>
+        </p:txBody>
+      </p:sp>
+      <p:sp>
+        <p:nvSpPr>
+          <p:cNvPr id="10" name="Rectangle 9">
+            <a:extLst>
+              <a:ext uri="{FF2B5EF4-FFF2-40B4-BE49-F238E27FC236}">
+                <a16:creationId xmlns:a16="http://schemas.microsoft.com/office/drawing/2014/main" id="{39C0F402-A35E-1FDF-4347-312F8C1CCC5D}"/>
+              </a:ext>
+            </a:extLst>
+          </p:cNvPr>
+          <p:cNvSpPr/>
+          <p:nvPr/>
+        </p:nvSpPr>
+        <p:spPr>
+          <a:xfrm>
+            <a:off x="7292408" y="322457"/>
+            <a:ext cx="2991679" cy="2301085"/>
+          </a:xfrm>
+          <a:prstGeom prst="rect">
+            <a:avLst/>
+          </a:prstGeom>
+          <a:noFill/>
+          <a:ln>
+            <a:solidFill>
+              <a:schemeClr val="bg2">
+                <a:lumMod val="10000"/>
+              </a:schemeClr>
+            </a:solidFill>
+          </a:ln>
+        </p:spPr>
+        <p:style>
+          <a:lnRef idx="2">
+            <a:schemeClr val="accent1">
+              <a:shade val="50000"/>
+            </a:schemeClr>
+          </a:lnRef>
+          <a:fillRef idx="1">
+            <a:schemeClr val="accent1"/>
+          </a:fillRef>
+          <a:effectRef idx="0">
+            <a:schemeClr val="accent1"/>
+          </a:effectRef>
+          <a:fontRef idx="minor">
+            <a:schemeClr val="lt1"/>
+          </a:fontRef>
+        </p:style>
+        <p:txBody>
+          <a:bodyPr rtlCol="0" anchor="ctr"/>
+          <a:lstStyle/>
+          <a:p>
+            <a:pPr algn="ctr"/>
+            <a:endParaRPr lang="en-IN"/>
+          </a:p>
+        </p:txBody>
+      </p:sp>
+      <p:cxnSp>
+        <p:nvCxnSpPr>
+          <p:cNvPr id="11" name="Straight Connector 10">
+            <a:extLst>
+              <a:ext uri="{FF2B5EF4-FFF2-40B4-BE49-F238E27FC236}">
+                <a16:creationId xmlns:a16="http://schemas.microsoft.com/office/drawing/2014/main" id="{479F7E3D-10B3-C4B0-088C-5F5D6CD711D8}"/>
+              </a:ext>
+            </a:extLst>
+          </p:cNvPr>
+          <p:cNvCxnSpPr>
+            <a:cxnSpLocks/>
+          </p:cNvCxnSpPr>
+          <p:nvPr/>
+        </p:nvCxnSpPr>
+        <p:spPr>
+          <a:xfrm>
+            <a:off x="7292408" y="958525"/>
+            <a:ext cx="2991679" cy="0"/>
+          </a:xfrm>
+          <a:prstGeom prst="line">
+            <a:avLst/>
+          </a:prstGeom>
+          <a:ln>
+            <a:solidFill>
+              <a:schemeClr val="tx1">
+                <a:lumMod val="95000"/>
+                <a:lumOff val="5000"/>
+              </a:schemeClr>
+            </a:solidFill>
+          </a:ln>
+        </p:spPr>
+        <p:style>
+          <a:lnRef idx="1">
+            <a:schemeClr val="accent1"/>
+          </a:lnRef>
+          <a:fillRef idx="0">
+            <a:schemeClr val="accent1"/>
+          </a:fillRef>
+          <a:effectRef idx="0">
+            <a:schemeClr val="accent1"/>
+          </a:effectRef>
+          <a:fontRef idx="minor">
+            <a:schemeClr val="tx1"/>
+          </a:fontRef>
+        </p:style>
+      </p:cxnSp>
+      <p:sp>
+        <p:nvSpPr>
+          <p:cNvPr id="12" name="TextBox 11">
+            <a:extLst>
+              <a:ext uri="{FF2B5EF4-FFF2-40B4-BE49-F238E27FC236}">
+                <a16:creationId xmlns:a16="http://schemas.microsoft.com/office/drawing/2014/main" id="{067EE05B-E9CB-16C6-A7EE-ADAB962D4AB6}"/>
+              </a:ext>
+            </a:extLst>
+          </p:cNvPr>
+          <p:cNvSpPr txBox="1"/>
+          <p:nvPr/>
+        </p:nvSpPr>
+        <p:spPr>
+          <a:xfrm>
+            <a:off x="7317254" y="440936"/>
+            <a:ext cx="2613993" cy="369332"/>
+          </a:xfrm>
+          <a:prstGeom prst="rect">
+            <a:avLst/>
+          </a:prstGeom>
+          <a:noFill/>
+        </p:spPr>
+        <p:txBody>
+          <a:bodyPr wrap="square" rtlCol="0">
+            <a:spAutoFit/>
+          </a:bodyPr>
+          <a:lstStyle/>
+          <a:p>
+            <a:r>
+              <a:rPr lang="en-US" dirty="0" err="1"/>
+              <a:t>DineInOrder</a:t>
+            </a:r>
+            <a:endParaRPr lang="en-IN" dirty="0"/>
+          </a:p>
+        </p:txBody>
+      </p:sp>
+      <p:cxnSp>
+        <p:nvCxnSpPr>
+          <p:cNvPr id="13" name="Straight Arrow Connector 17">
+            <a:extLst>
+              <a:ext uri="{FF2B5EF4-FFF2-40B4-BE49-F238E27FC236}">
+                <a16:creationId xmlns:a16="http://schemas.microsoft.com/office/drawing/2014/main" id="{7D843023-FB08-A881-1E87-3AEE5637CAA5}"/>
+              </a:ext>
+            </a:extLst>
+          </p:cNvPr>
+          <p:cNvCxnSpPr>
+            <a:cxnSpLocks/>
+            <a:stCxn id="3" idx="3"/>
+          </p:cNvCxnSpPr>
+          <p:nvPr/>
+        </p:nvCxnSpPr>
+        <p:spPr>
+          <a:xfrm flipV="1">
+            <a:off x="5739848" y="1689802"/>
+            <a:ext cx="1577406" cy="1048483"/>
+          </a:xfrm>
+          <a:prstGeom prst="bentConnector3">
+            <a:avLst>
+              <a:gd name="adj1" fmla="val 50000"/>
+            </a:avLst>
+          </a:prstGeom>
+          <a:ln>
+            <a:tailEnd type="triangle"/>
+          </a:ln>
+        </p:spPr>
+        <p:style>
+          <a:lnRef idx="1">
+            <a:schemeClr val="dk1"/>
+          </a:lnRef>
+          <a:fillRef idx="0">
+            <a:schemeClr val="dk1"/>
+          </a:fillRef>
+          <a:effectRef idx="0">
+            <a:schemeClr val="dk1"/>
+          </a:effectRef>
+          <a:fontRef idx="minor">
+            <a:schemeClr val="tx1"/>
+          </a:fontRef>
+        </p:style>
+      </p:cxnSp>
+      <p:sp>
+        <p:nvSpPr>
+          <p:cNvPr id="22" name="TextBox 21">
+            <a:extLst>
+              <a:ext uri="{FF2B5EF4-FFF2-40B4-BE49-F238E27FC236}">
+                <a16:creationId xmlns:a16="http://schemas.microsoft.com/office/drawing/2014/main" id="{E90A19C6-BA17-BC56-F24A-FAEE45302DE2}"/>
+              </a:ext>
+            </a:extLst>
+          </p:cNvPr>
+          <p:cNvSpPr txBox="1"/>
+          <p:nvPr/>
+        </p:nvSpPr>
+        <p:spPr>
+          <a:xfrm>
+            <a:off x="7317253" y="987577"/>
+            <a:ext cx="2613993" cy="1754326"/>
+          </a:xfrm>
+          <a:prstGeom prst="rect">
+            <a:avLst/>
+          </a:prstGeom>
+          <a:noFill/>
+        </p:spPr>
+        <p:txBody>
+          <a:bodyPr wrap="square" rtlCol="0">
+            <a:spAutoFit/>
+          </a:bodyPr>
+          <a:lstStyle/>
+          <a:p>
+            <a:r>
+              <a:rPr lang="en-US" dirty="0" err="1"/>
+              <a:t>TakeOrder</a:t>
+            </a:r>
+            <a:r>
+              <a:rPr lang="en-US" dirty="0"/>
+              <a:t>()</a:t>
+            </a:r>
+          </a:p>
+          <a:p>
+            <a:r>
+              <a:rPr lang="en-US" dirty="0" err="1"/>
+              <a:t>PrepareOrder</a:t>
+            </a:r>
+            <a:r>
+              <a:rPr lang="en-US" dirty="0"/>
+              <a:t>()</a:t>
+            </a:r>
+          </a:p>
+          <a:p>
+            <a:r>
+              <a:rPr lang="en-US" dirty="0"/>
+              <a:t>Service()</a:t>
+            </a:r>
+          </a:p>
+          <a:p>
+            <a:r>
+              <a:rPr lang="en-US" dirty="0" err="1"/>
+              <a:t>IsPayment</a:t>
+            </a:r>
+            <a:r>
+              <a:rPr lang="en-US" dirty="0"/>
+              <a:t>()</a:t>
+            </a:r>
+          </a:p>
+          <a:p>
+            <a:r>
+              <a:rPr lang="en-US" dirty="0" err="1"/>
+              <a:t>ProcessPayment</a:t>
+            </a:r>
+            <a:r>
+              <a:rPr lang="en-US" dirty="0"/>
+              <a:t>()</a:t>
+            </a:r>
+          </a:p>
+          <a:p>
+            <a:endParaRPr lang="en-US" dirty="0"/>
+          </a:p>
+        </p:txBody>
+      </p:sp>
+      <p:sp>
+        <p:nvSpPr>
+          <p:cNvPr id="25" name="Rectangle 24">
+            <a:extLst>
+              <a:ext uri="{FF2B5EF4-FFF2-40B4-BE49-F238E27FC236}">
+                <a16:creationId xmlns:a16="http://schemas.microsoft.com/office/drawing/2014/main" id="{5EA03F13-C671-B8A3-3568-1DD3D8371592}"/>
+              </a:ext>
+            </a:extLst>
+          </p:cNvPr>
+          <p:cNvSpPr/>
+          <p:nvPr/>
+        </p:nvSpPr>
+        <p:spPr>
+          <a:xfrm>
+            <a:off x="7317253" y="3117653"/>
+            <a:ext cx="2991679" cy="2301080"/>
+          </a:xfrm>
+          <a:prstGeom prst="rect">
+            <a:avLst/>
+          </a:prstGeom>
+          <a:noFill/>
+          <a:ln>
+            <a:solidFill>
+              <a:schemeClr val="bg2">
+                <a:lumMod val="10000"/>
+              </a:schemeClr>
+            </a:solidFill>
+          </a:ln>
+        </p:spPr>
+        <p:style>
+          <a:lnRef idx="2">
+            <a:schemeClr val="accent1">
+              <a:shade val="50000"/>
+            </a:schemeClr>
+          </a:lnRef>
+          <a:fillRef idx="1">
+            <a:schemeClr val="accent1"/>
+          </a:fillRef>
+          <a:effectRef idx="0">
+            <a:schemeClr val="accent1"/>
+          </a:effectRef>
+          <a:fontRef idx="minor">
+            <a:schemeClr val="lt1"/>
+          </a:fontRef>
+        </p:style>
+        <p:txBody>
+          <a:bodyPr rtlCol="0" anchor="ctr"/>
+          <a:lstStyle/>
+          <a:p>
+            <a:pPr algn="ctr"/>
+            <a:endParaRPr lang="en-IN"/>
+          </a:p>
+        </p:txBody>
+      </p:sp>
+      <p:cxnSp>
+        <p:nvCxnSpPr>
+          <p:cNvPr id="26" name="Straight Connector 25">
+            <a:extLst>
+              <a:ext uri="{FF2B5EF4-FFF2-40B4-BE49-F238E27FC236}">
+                <a16:creationId xmlns:a16="http://schemas.microsoft.com/office/drawing/2014/main" id="{63A25A13-CBB5-B342-2092-9ABF58C11691}"/>
+              </a:ext>
+            </a:extLst>
+          </p:cNvPr>
+          <p:cNvCxnSpPr>
+            <a:cxnSpLocks/>
+          </p:cNvCxnSpPr>
+          <p:nvPr/>
+        </p:nvCxnSpPr>
+        <p:spPr>
+          <a:xfrm>
+            <a:off x="7317253" y="3701492"/>
+            <a:ext cx="2991679" cy="0"/>
+          </a:xfrm>
+          <a:prstGeom prst="line">
+            <a:avLst/>
+          </a:prstGeom>
+          <a:ln>
+            <a:solidFill>
+              <a:schemeClr val="tx1">
+                <a:lumMod val="95000"/>
+                <a:lumOff val="5000"/>
+              </a:schemeClr>
+            </a:solidFill>
+          </a:ln>
+        </p:spPr>
+        <p:style>
+          <a:lnRef idx="1">
+            <a:schemeClr val="accent1"/>
+          </a:lnRef>
+          <a:fillRef idx="0">
+            <a:schemeClr val="accent1"/>
+          </a:fillRef>
+          <a:effectRef idx="0">
+            <a:schemeClr val="accent1"/>
+          </a:effectRef>
+          <a:fontRef idx="minor">
+            <a:schemeClr val="tx1"/>
+          </a:fontRef>
+        </p:style>
+      </p:cxnSp>
+      <p:sp>
+        <p:nvSpPr>
+          <p:cNvPr id="27" name="TextBox 26">
+            <a:extLst>
+              <a:ext uri="{FF2B5EF4-FFF2-40B4-BE49-F238E27FC236}">
+                <a16:creationId xmlns:a16="http://schemas.microsoft.com/office/drawing/2014/main" id="{BAB02D4C-F2C9-AF10-C7BF-D929EB3120E5}"/>
+              </a:ext>
+            </a:extLst>
+          </p:cNvPr>
+          <p:cNvSpPr txBox="1"/>
+          <p:nvPr/>
+        </p:nvSpPr>
+        <p:spPr>
+          <a:xfrm>
+            <a:off x="7317253" y="3221179"/>
+            <a:ext cx="2613993" cy="369332"/>
+          </a:xfrm>
+          <a:prstGeom prst="rect">
+            <a:avLst/>
+          </a:prstGeom>
+          <a:noFill/>
+        </p:spPr>
+        <p:txBody>
+          <a:bodyPr wrap="square" rtlCol="0">
+            <a:spAutoFit/>
+          </a:bodyPr>
+          <a:lstStyle/>
+          <a:p>
+            <a:r>
+              <a:rPr lang="en-US" dirty="0" err="1"/>
+              <a:t>TakeAwayOrder</a:t>
+            </a:r>
+            <a:endParaRPr lang="en-IN" dirty="0"/>
+          </a:p>
+        </p:txBody>
+      </p:sp>
+      <p:sp>
+        <p:nvSpPr>
+          <p:cNvPr id="28" name="TextBox 27">
+            <a:extLst>
+              <a:ext uri="{FF2B5EF4-FFF2-40B4-BE49-F238E27FC236}">
+                <a16:creationId xmlns:a16="http://schemas.microsoft.com/office/drawing/2014/main" id="{01FCC91E-1B87-F160-E14C-59D4331B2F97}"/>
+              </a:ext>
+            </a:extLst>
+          </p:cNvPr>
+          <p:cNvSpPr txBox="1"/>
+          <p:nvPr/>
+        </p:nvSpPr>
+        <p:spPr>
+          <a:xfrm>
+            <a:off x="7317253" y="3812474"/>
+            <a:ext cx="2613993" cy="1754326"/>
+          </a:xfrm>
+          <a:prstGeom prst="rect">
+            <a:avLst/>
+          </a:prstGeom>
+          <a:noFill/>
+        </p:spPr>
+        <p:txBody>
+          <a:bodyPr wrap="square" rtlCol="0">
+            <a:spAutoFit/>
+          </a:bodyPr>
+          <a:lstStyle/>
+          <a:p>
+            <a:r>
+              <a:rPr lang="en-US" dirty="0" err="1"/>
+              <a:t>TakeOrder</a:t>
+            </a:r>
+            <a:r>
+              <a:rPr lang="en-US" dirty="0"/>
+              <a:t>()</a:t>
+            </a:r>
+          </a:p>
+          <a:p>
+            <a:r>
+              <a:rPr lang="en-US" dirty="0" err="1"/>
+              <a:t>PrepareOrder</a:t>
+            </a:r>
+            <a:r>
+              <a:rPr lang="en-US" dirty="0"/>
+              <a:t>()</a:t>
+            </a:r>
+          </a:p>
+          <a:p>
+            <a:r>
+              <a:rPr lang="en-US" dirty="0"/>
+              <a:t>Service()</a:t>
+            </a:r>
+          </a:p>
+          <a:p>
+            <a:r>
+              <a:rPr lang="en-US" dirty="0" err="1"/>
+              <a:t>IsPayment</a:t>
+            </a:r>
+            <a:r>
+              <a:rPr lang="en-US" dirty="0"/>
+              <a:t>()</a:t>
+            </a:r>
+          </a:p>
+          <a:p>
+            <a:r>
+              <a:rPr lang="en-US" dirty="0" err="1"/>
+              <a:t>ProcessPayment</a:t>
+            </a:r>
+            <a:r>
+              <a:rPr lang="en-US" dirty="0"/>
+              <a:t>()</a:t>
+            </a:r>
+          </a:p>
+          <a:p>
+            <a:endParaRPr lang="en-US" dirty="0"/>
+          </a:p>
+        </p:txBody>
+      </p:sp>
+      <p:cxnSp>
+        <p:nvCxnSpPr>
+          <p:cNvPr id="29" name="Straight Arrow Connector 17">
+            <a:extLst>
+              <a:ext uri="{FF2B5EF4-FFF2-40B4-BE49-F238E27FC236}">
+                <a16:creationId xmlns:a16="http://schemas.microsoft.com/office/drawing/2014/main" id="{BF048B4C-25AE-3D92-35D9-13FB36430248}"/>
+              </a:ext>
+            </a:extLst>
+          </p:cNvPr>
+          <p:cNvCxnSpPr>
+            <a:cxnSpLocks/>
+            <a:stCxn id="3" idx="3"/>
+            <a:endCxn id="28" idx="1"/>
+          </p:cNvCxnSpPr>
+          <p:nvPr/>
+        </p:nvCxnSpPr>
+        <p:spPr>
+          <a:xfrm>
+            <a:off x="5739848" y="2738285"/>
+            <a:ext cx="1577405" cy="1951352"/>
+          </a:xfrm>
+          <a:prstGeom prst="bentConnector3">
+            <a:avLst>
+              <a:gd name="adj1" fmla="val 50000"/>
+            </a:avLst>
+          </a:prstGeom>
+          <a:ln>
+            <a:tailEnd type="triangle"/>
+          </a:ln>
+        </p:spPr>
+        <p:style>
+          <a:lnRef idx="1">
+            <a:schemeClr val="dk1"/>
+          </a:lnRef>
+          <a:fillRef idx="0">
+            <a:schemeClr val="dk1"/>
+          </a:fillRef>
+          <a:effectRef idx="0">
+            <a:schemeClr val="dk1"/>
+          </a:effectRef>
+          <a:fontRef idx="minor">
+            <a:schemeClr val="tx1"/>
+          </a:fontRef>
+        </p:style>
+      </p:cxnSp>
+    </p:spTree>
+    <p:extLst>
+      <p:ext uri="{BB962C8B-B14F-4D97-AF65-F5344CB8AC3E}">
+        <p14:creationId xmlns:p14="http://schemas.microsoft.com/office/powerpoint/2010/main" val="192732721"/>
       </p:ext>
     </p:extLst>
   </p:cSld>

</xml_diff>

<commit_message>
Commited for Command Design Pattern
</commit_message>
<xml_diff>
--- a/UMLDiagrams.pptx
+++ b/UMLDiagrams.pptx
@@ -5,7 +5,7 @@
     <p:sldMasterId id="2147483648" r:id="rId1"/>
   </p:sldMasterIdLst>
   <p:notesMasterIdLst>
-    <p:notesMasterId r:id="rId16"/>
+    <p:notesMasterId r:id="rId17"/>
   </p:notesMasterIdLst>
   <p:sldIdLst>
     <p:sldId id="256" r:id="rId2"/>
@@ -22,6 +22,7 @@
     <p:sldId id="355" r:id="rId13"/>
     <p:sldId id="356" r:id="rId14"/>
     <p:sldId id="357" r:id="rId15"/>
+    <p:sldId id="358" r:id="rId16"/>
   </p:sldIdLst>
   <p:sldSz cx="12192000" cy="6858000"/>
   <p:notesSz cx="6858000" cy="9144000"/>
@@ -131,7 +132,7 @@
 <file path=ppt/revisionInfo.xml><?xml version="1.0" encoding="utf-8"?>
 <p1510:revInfo xmlns:a="http://schemas.openxmlformats.org/drawingml/2006/main" xmlns:r="http://schemas.openxmlformats.org/officeDocument/2006/relationships" xmlns:p1510="http://schemas.microsoft.com/office/powerpoint/2015/10/main">
   <p1510:revLst>
-    <p1510:client id="{034AA59E-D954-44E8-84AB-C770C7EA240B}" v="22" dt="2023-09-12T06:06:51.001"/>
+    <p1510:client id="{034AA59E-D954-44E8-84AB-C770C7EA240B}" v="25" dt="2023-09-12T09:49:00.740"/>
   </p1510:revLst>
 </p1510:revInfo>
 </file>
@@ -141,7 +142,7 @@
   <pc:docChgLst>
     <pc:chgData name="Manaswini Ray" userId="451f23f8-43b4-4daa-9511-0c9fb98bad1c" providerId="ADAL" clId="{034AA59E-D954-44E8-84AB-C770C7EA240B}"/>
     <pc:docChg chg="undo custSel addSld delSld modSld">
-      <pc:chgData name="Manaswini Ray" userId="451f23f8-43b4-4daa-9511-0c9fb98bad1c" providerId="ADAL" clId="{034AA59E-D954-44E8-84AB-C770C7EA240B}" dt="2023-09-12T06:09:59.970" v="529" actId="1076"/>
+      <pc:chgData name="Manaswini Ray" userId="451f23f8-43b4-4daa-9511-0c9fb98bad1c" providerId="ADAL" clId="{034AA59E-D954-44E8-84AB-C770C7EA240B}" dt="2023-09-12T09:49:13.491" v="729" actId="14100"/>
       <pc:docMkLst>
         <pc:docMk/>
       </pc:docMkLst>
@@ -953,6 +954,253 @@
             <pc:docMk/>
             <pc:sldMk cId="192732721" sldId="357"/>
             <ac:cxnSpMk id="29" creationId="{BF048B4C-25AE-3D92-35D9-13FB36430248}"/>
+          </ac:cxnSpMkLst>
+        </pc:cxnChg>
+      </pc:sldChg>
+      <pc:sldChg chg="addSp delSp modSp new mod">
+        <pc:chgData name="Manaswini Ray" userId="451f23f8-43b4-4daa-9511-0c9fb98bad1c" providerId="ADAL" clId="{034AA59E-D954-44E8-84AB-C770C7EA240B}" dt="2023-09-12T09:49:13.491" v="729" actId="14100"/>
+        <pc:sldMkLst>
+          <pc:docMk/>
+          <pc:sldMk cId="1015724697" sldId="358"/>
+        </pc:sldMkLst>
+        <pc:spChg chg="add mod">
+          <ac:chgData name="Manaswini Ray" userId="451f23f8-43b4-4daa-9511-0c9fb98bad1c" providerId="ADAL" clId="{034AA59E-D954-44E8-84AB-C770C7EA240B}" dt="2023-09-12T09:45:04.477" v="538" actId="20577"/>
+          <ac:spMkLst>
+            <pc:docMk/>
+            <pc:sldMk cId="1015724697" sldId="358"/>
+            <ac:spMk id="2" creationId="{F2CB681B-00B7-DC2A-B933-41791CBE6EE5}"/>
+          </ac:spMkLst>
+        </pc:spChg>
+        <pc:spChg chg="add mod">
+          <ac:chgData name="Manaswini Ray" userId="451f23f8-43b4-4daa-9511-0c9fb98bad1c" providerId="ADAL" clId="{034AA59E-D954-44E8-84AB-C770C7EA240B}" dt="2023-09-12T09:46:58.612" v="650" actId="14100"/>
+          <ac:spMkLst>
+            <pc:docMk/>
+            <pc:sldMk cId="1015724697" sldId="358"/>
+            <ac:spMk id="3" creationId="{25B40630-E552-8ECB-4D3D-72685DAD09FA}"/>
+          </ac:spMkLst>
+        </pc:spChg>
+        <pc:spChg chg="add mod">
+          <ac:chgData name="Manaswini Ray" userId="451f23f8-43b4-4daa-9511-0c9fb98bad1c" providerId="ADAL" clId="{034AA59E-D954-44E8-84AB-C770C7EA240B}" dt="2023-09-12T09:45:00.627" v="531"/>
+          <ac:spMkLst>
+            <pc:docMk/>
+            <pc:sldMk cId="1015724697" sldId="358"/>
+            <ac:spMk id="5" creationId="{4FDD9501-9DD8-6ED0-7334-FA7E3BF3BEA0}"/>
+          </ac:spMkLst>
+        </pc:spChg>
+        <pc:spChg chg="add mod">
+          <ac:chgData name="Manaswini Ray" userId="451f23f8-43b4-4daa-9511-0c9fb98bad1c" providerId="ADAL" clId="{034AA59E-D954-44E8-84AB-C770C7EA240B}" dt="2023-09-12T09:46:24.636" v="613" actId="20577"/>
+          <ac:spMkLst>
+            <pc:docMk/>
+            <pc:sldMk cId="1015724697" sldId="358"/>
+            <ac:spMk id="6" creationId="{3A492E49-445E-8C6D-B4C3-ADD5485FAC6D}"/>
+          </ac:spMkLst>
+        </pc:spChg>
+        <pc:spChg chg="add mod">
+          <ac:chgData name="Manaswini Ray" userId="451f23f8-43b4-4daa-9511-0c9fb98bad1c" providerId="ADAL" clId="{034AA59E-D954-44E8-84AB-C770C7EA240B}" dt="2023-09-12T09:45:47.773" v="600" actId="20577"/>
+          <ac:spMkLst>
+            <pc:docMk/>
+            <pc:sldMk cId="1015724697" sldId="358"/>
+            <ac:spMk id="7" creationId="{A52759B5-EFC4-B298-C5E9-37B5E08596E3}"/>
+          </ac:spMkLst>
+        </pc:spChg>
+        <pc:spChg chg="add mod">
+          <ac:chgData name="Manaswini Ray" userId="451f23f8-43b4-4daa-9511-0c9fb98bad1c" providerId="ADAL" clId="{034AA59E-D954-44E8-84AB-C770C7EA240B}" dt="2023-09-12T09:45:00.627" v="531"/>
+          <ac:spMkLst>
+            <pc:docMk/>
+            <pc:sldMk cId="1015724697" sldId="358"/>
+            <ac:spMk id="9" creationId="{4925CB76-5A90-034E-6278-57B8C3291E7A}"/>
+          </ac:spMkLst>
+        </pc:spChg>
+        <pc:spChg chg="add mod">
+          <ac:chgData name="Manaswini Ray" userId="451f23f8-43b4-4daa-9511-0c9fb98bad1c" providerId="ADAL" clId="{034AA59E-D954-44E8-84AB-C770C7EA240B}" dt="2023-09-12T09:45:00.627" v="531"/>
+          <ac:spMkLst>
+            <pc:docMk/>
+            <pc:sldMk cId="1015724697" sldId="358"/>
+            <ac:spMk id="10" creationId="{8FA31426-98D5-75C1-4E2E-661384166974}"/>
+          </ac:spMkLst>
+        </pc:spChg>
+        <pc:spChg chg="add mod">
+          <ac:chgData name="Manaswini Ray" userId="451f23f8-43b4-4daa-9511-0c9fb98bad1c" providerId="ADAL" clId="{034AA59E-D954-44E8-84AB-C770C7EA240B}" dt="2023-09-12T09:46:16.603" v="612" actId="20577"/>
+          <ac:spMkLst>
+            <pc:docMk/>
+            <pc:sldMk cId="1015724697" sldId="358"/>
+            <ac:spMk id="12" creationId="{BE68C8C3-ADC8-30C1-A0C2-556EC8801832}"/>
+          </ac:spMkLst>
+        </pc:spChg>
+        <pc:spChg chg="add mod">
+          <ac:chgData name="Manaswini Ray" userId="451f23f8-43b4-4daa-9511-0c9fb98bad1c" providerId="ADAL" clId="{034AA59E-D954-44E8-84AB-C770C7EA240B}" dt="2023-09-12T09:48:49.418" v="721" actId="1076"/>
+          <ac:spMkLst>
+            <pc:docMk/>
+            <pc:sldMk cId="1015724697" sldId="358"/>
+            <ac:spMk id="14" creationId="{AEADE538-F99A-6DAB-1C8C-2C2525A72428}"/>
+          </ac:spMkLst>
+        </pc:spChg>
+        <pc:spChg chg="add mod">
+          <ac:chgData name="Manaswini Ray" userId="451f23f8-43b4-4daa-9511-0c9fb98bad1c" providerId="ADAL" clId="{034AA59E-D954-44E8-84AB-C770C7EA240B}" dt="2023-09-12T09:48:49.418" v="721" actId="1076"/>
+          <ac:spMkLst>
+            <pc:docMk/>
+            <pc:sldMk cId="1015724697" sldId="358"/>
+            <ac:spMk id="16" creationId="{9C9A4925-5924-02A9-D2F8-869F37DE56CA}"/>
+          </ac:spMkLst>
+        </pc:spChg>
+        <pc:spChg chg="add del mod">
+          <ac:chgData name="Manaswini Ray" userId="451f23f8-43b4-4daa-9511-0c9fb98bad1c" providerId="ADAL" clId="{034AA59E-D954-44E8-84AB-C770C7EA240B}" dt="2023-09-12T09:48:21.826" v="717" actId="478"/>
+          <ac:spMkLst>
+            <pc:docMk/>
+            <pc:sldMk cId="1015724697" sldId="358"/>
+            <ac:spMk id="17" creationId="{71C6E26B-D7E8-97D8-7A3E-B9893E016E7F}"/>
+          </ac:spMkLst>
+        </pc:spChg>
+        <pc:spChg chg="add del mod">
+          <ac:chgData name="Manaswini Ray" userId="451f23f8-43b4-4daa-9511-0c9fb98bad1c" providerId="ADAL" clId="{034AA59E-D954-44E8-84AB-C770C7EA240B}" dt="2023-09-12T09:48:30.738" v="718" actId="478"/>
+          <ac:spMkLst>
+            <pc:docMk/>
+            <pc:sldMk cId="1015724697" sldId="358"/>
+            <ac:spMk id="19" creationId="{493F8E19-1AD1-8A96-9C6E-9C0B579345EC}"/>
+          </ac:spMkLst>
+        </pc:spChg>
+        <pc:spChg chg="add mod">
+          <ac:chgData name="Manaswini Ray" userId="451f23f8-43b4-4daa-9511-0c9fb98bad1c" providerId="ADAL" clId="{034AA59E-D954-44E8-84AB-C770C7EA240B}" dt="2023-09-12T09:46:53.634" v="648" actId="20577"/>
+          <ac:spMkLst>
+            <pc:docMk/>
+            <pc:sldMk cId="1015724697" sldId="358"/>
+            <ac:spMk id="22" creationId="{D67C1322-2659-1D34-83BF-E04E54B83F71}"/>
+          </ac:spMkLst>
+        </pc:spChg>
+        <pc:spChg chg="add del mod">
+          <ac:chgData name="Manaswini Ray" userId="451f23f8-43b4-4daa-9511-0c9fb98bad1c" providerId="ADAL" clId="{034AA59E-D954-44E8-84AB-C770C7EA240B}" dt="2023-09-12T09:48:30.738" v="718" actId="478"/>
+          <ac:spMkLst>
+            <pc:docMk/>
+            <pc:sldMk cId="1015724697" sldId="358"/>
+            <ac:spMk id="23" creationId="{A885CB41-95A4-9AD7-95F5-F7BA4A2240C7}"/>
+          </ac:spMkLst>
+        </pc:spChg>
+        <pc:spChg chg="add mod">
+          <ac:chgData name="Manaswini Ray" userId="451f23f8-43b4-4daa-9511-0c9fb98bad1c" providerId="ADAL" clId="{034AA59E-D954-44E8-84AB-C770C7EA240B}" dt="2023-09-12T09:48:49.418" v="721" actId="1076"/>
+          <ac:spMkLst>
+            <pc:docMk/>
+            <pc:sldMk cId="1015724697" sldId="358"/>
+            <ac:spMk id="24" creationId="{69EE61E6-D212-FFBB-21D0-758EE0519DDF}"/>
+          </ac:spMkLst>
+        </pc:spChg>
+        <pc:spChg chg="add mod">
+          <ac:chgData name="Manaswini Ray" userId="451f23f8-43b4-4daa-9511-0c9fb98bad1c" providerId="ADAL" clId="{034AA59E-D954-44E8-84AB-C770C7EA240B}" dt="2023-09-12T09:48:43.512" v="720" actId="1076"/>
+          <ac:spMkLst>
+            <pc:docMk/>
+            <pc:sldMk cId="1015724697" sldId="358"/>
+            <ac:spMk id="25" creationId="{600707B9-8428-BCF3-A4D8-852FBA1B7248}"/>
+          </ac:spMkLst>
+        </pc:spChg>
+        <pc:spChg chg="add mod">
+          <ac:chgData name="Manaswini Ray" userId="451f23f8-43b4-4daa-9511-0c9fb98bad1c" providerId="ADAL" clId="{034AA59E-D954-44E8-84AB-C770C7EA240B}" dt="2023-09-12T09:48:43.512" v="720" actId="1076"/>
+          <ac:spMkLst>
+            <pc:docMk/>
+            <pc:sldMk cId="1015724697" sldId="358"/>
+            <ac:spMk id="27" creationId="{83CBF423-0784-E3E4-F7D2-BE176220764A}"/>
+          </ac:spMkLst>
+        </pc:spChg>
+        <pc:spChg chg="add mod">
+          <ac:chgData name="Manaswini Ray" userId="451f23f8-43b4-4daa-9511-0c9fb98bad1c" providerId="ADAL" clId="{034AA59E-D954-44E8-84AB-C770C7EA240B}" dt="2023-09-12T09:48:43.512" v="720" actId="1076"/>
+          <ac:spMkLst>
+            <pc:docMk/>
+            <pc:sldMk cId="1015724697" sldId="358"/>
+            <ac:spMk id="28" creationId="{113E73D3-E701-4501-3233-106A54959C37}"/>
+          </ac:spMkLst>
+        </pc:spChg>
+        <pc:cxnChg chg="add mod">
+          <ac:chgData name="Manaswini Ray" userId="451f23f8-43b4-4daa-9511-0c9fb98bad1c" providerId="ADAL" clId="{034AA59E-D954-44E8-84AB-C770C7EA240B}" dt="2023-09-12T09:45:00.627" v="531"/>
+          <ac:cxnSpMkLst>
+            <pc:docMk/>
+            <pc:sldMk cId="1015724697" sldId="358"/>
+            <ac:cxnSpMk id="4" creationId="{FE91AC64-2A6B-FC7C-2AFE-86A3BDF7FE58}"/>
+          </ac:cxnSpMkLst>
+        </pc:cxnChg>
+        <pc:cxnChg chg="add mod">
+          <ac:chgData name="Manaswini Ray" userId="451f23f8-43b4-4daa-9511-0c9fb98bad1c" providerId="ADAL" clId="{034AA59E-D954-44E8-84AB-C770C7EA240B}" dt="2023-09-12T09:45:47.773" v="600" actId="20577"/>
+          <ac:cxnSpMkLst>
+            <pc:docMk/>
+            <pc:sldMk cId="1015724697" sldId="358"/>
+            <ac:cxnSpMk id="8" creationId="{B5F5BEF4-7B62-211B-424D-41A93EB2C774}"/>
+          </ac:cxnSpMkLst>
+        </pc:cxnChg>
+        <pc:cxnChg chg="add mod">
+          <ac:chgData name="Manaswini Ray" userId="451f23f8-43b4-4daa-9511-0c9fb98bad1c" providerId="ADAL" clId="{034AA59E-D954-44E8-84AB-C770C7EA240B}" dt="2023-09-12T09:45:00.627" v="531"/>
+          <ac:cxnSpMkLst>
+            <pc:docMk/>
+            <pc:sldMk cId="1015724697" sldId="358"/>
+            <ac:cxnSpMk id="11" creationId="{D099C62A-9D22-7082-76F5-AE387AD9395B}"/>
+          </ac:cxnSpMkLst>
+        </pc:cxnChg>
+        <pc:cxnChg chg="add mod">
+          <ac:chgData name="Manaswini Ray" userId="451f23f8-43b4-4daa-9511-0c9fb98bad1c" providerId="ADAL" clId="{034AA59E-D954-44E8-84AB-C770C7EA240B}" dt="2023-09-12T09:48:52.273" v="722" actId="1076"/>
+          <ac:cxnSpMkLst>
+            <pc:docMk/>
+            <pc:sldMk cId="1015724697" sldId="358"/>
+            <ac:cxnSpMk id="13" creationId="{EB4081E2-CFDB-66F7-A551-ABE9DB42D28F}"/>
+          </ac:cxnSpMkLst>
+        </pc:cxnChg>
+        <pc:cxnChg chg="add mod">
+          <ac:chgData name="Manaswini Ray" userId="451f23f8-43b4-4daa-9511-0c9fb98bad1c" providerId="ADAL" clId="{034AA59E-D954-44E8-84AB-C770C7EA240B}" dt="2023-09-12T09:48:49.418" v="721" actId="1076"/>
+          <ac:cxnSpMkLst>
+            <pc:docMk/>
+            <pc:sldMk cId="1015724697" sldId="358"/>
+            <ac:cxnSpMk id="15" creationId="{D278CD99-E0A0-A26B-D180-7500F07CD370}"/>
+          </ac:cxnSpMkLst>
+        </pc:cxnChg>
+        <pc:cxnChg chg="add del mod">
+          <ac:chgData name="Manaswini Ray" userId="451f23f8-43b4-4daa-9511-0c9fb98bad1c" providerId="ADAL" clId="{034AA59E-D954-44E8-84AB-C770C7EA240B}" dt="2023-09-12T09:48:30.738" v="718" actId="478"/>
+          <ac:cxnSpMkLst>
+            <pc:docMk/>
+            <pc:sldMk cId="1015724697" sldId="358"/>
+            <ac:cxnSpMk id="18" creationId="{66C7229A-04B4-78DE-AC59-5B60B99DA864}"/>
+          </ac:cxnSpMkLst>
+        </pc:cxnChg>
+        <pc:cxnChg chg="add del mod">
+          <ac:chgData name="Manaswini Ray" userId="451f23f8-43b4-4daa-9511-0c9fb98bad1c" providerId="ADAL" clId="{034AA59E-D954-44E8-84AB-C770C7EA240B}" dt="2023-09-12T09:46:46.873" v="644" actId="478"/>
+          <ac:cxnSpMkLst>
+            <pc:docMk/>
+            <pc:sldMk cId="1015724697" sldId="358"/>
+            <ac:cxnSpMk id="20" creationId="{A3829F68-15AA-8164-27DE-CA2A2CAB3A6E}"/>
+          </ac:cxnSpMkLst>
+        </pc:cxnChg>
+        <pc:cxnChg chg="add del mod">
+          <ac:chgData name="Manaswini Ray" userId="451f23f8-43b4-4daa-9511-0c9fb98bad1c" providerId="ADAL" clId="{034AA59E-D954-44E8-84AB-C770C7EA240B}" dt="2023-09-12T09:46:44.824" v="643" actId="478"/>
+          <ac:cxnSpMkLst>
+            <pc:docMk/>
+            <pc:sldMk cId="1015724697" sldId="358"/>
+            <ac:cxnSpMk id="21" creationId="{C44B5B9E-CAE3-3622-DF8F-2FA4690219B0}"/>
+          </ac:cxnSpMkLst>
+        </pc:cxnChg>
+        <pc:cxnChg chg="add mod">
+          <ac:chgData name="Manaswini Ray" userId="451f23f8-43b4-4daa-9511-0c9fb98bad1c" providerId="ADAL" clId="{034AA59E-D954-44E8-84AB-C770C7EA240B}" dt="2023-09-12T09:48:43.512" v="720" actId="1076"/>
+          <ac:cxnSpMkLst>
+            <pc:docMk/>
+            <pc:sldMk cId="1015724697" sldId="358"/>
+            <ac:cxnSpMk id="26" creationId="{A226933B-C3C7-6279-6889-A694754EB90F}"/>
+          </ac:cxnSpMkLst>
+        </pc:cxnChg>
+        <pc:cxnChg chg="add del mod">
+          <ac:chgData name="Manaswini Ray" userId="451f23f8-43b4-4daa-9511-0c9fb98bad1c" providerId="ADAL" clId="{034AA59E-D954-44E8-84AB-C770C7EA240B}" dt="2023-09-12T09:46:49.196" v="646" actId="478"/>
+          <ac:cxnSpMkLst>
+            <pc:docMk/>
+            <pc:sldMk cId="1015724697" sldId="358"/>
+            <ac:cxnSpMk id="29" creationId="{2339DA3D-8E93-E32E-95D3-BD095A8E8680}"/>
+          </ac:cxnSpMkLst>
+        </pc:cxnChg>
+        <pc:cxnChg chg="add mod">
+          <ac:chgData name="Manaswini Ray" userId="451f23f8-43b4-4daa-9511-0c9fb98bad1c" providerId="ADAL" clId="{034AA59E-D954-44E8-84AB-C770C7EA240B}" dt="2023-09-12T09:48:59.448" v="725" actId="14100"/>
+          <ac:cxnSpMkLst>
+            <pc:docMk/>
+            <pc:sldMk cId="1015724697" sldId="358"/>
+            <ac:cxnSpMk id="31" creationId="{553546DA-C367-B04F-E5DE-D47D6D429573}"/>
+          </ac:cxnSpMkLst>
+        </pc:cxnChg>
+        <pc:cxnChg chg="add mod">
+          <ac:chgData name="Manaswini Ray" userId="451f23f8-43b4-4daa-9511-0c9fb98bad1c" providerId="ADAL" clId="{034AA59E-D954-44E8-84AB-C770C7EA240B}" dt="2023-09-12T09:49:13.491" v="729" actId="14100"/>
+          <ac:cxnSpMkLst>
+            <pc:docMk/>
+            <pc:sldMk cId="1015724697" sldId="358"/>
+            <ac:cxnSpMk id="34" creationId="{49E619A2-1E48-0393-CF9F-0BA7F4BB7CDD}"/>
           </ac:cxnSpMkLst>
         </pc:cxnChg>
       </pc:sldChg>
@@ -13127,6 +13375,1099 @@
     <p:extLst>
       <p:ext uri="{BB962C8B-B14F-4D97-AF65-F5344CB8AC3E}">
         <p14:creationId xmlns:p14="http://schemas.microsoft.com/office/powerpoint/2010/main" val="192732721"/>
+      </p:ext>
+    </p:extLst>
+  </p:cSld>
+  <p:clrMapOvr>
+    <a:masterClrMapping/>
+  </p:clrMapOvr>
+</p:sld>
+</file>
+
+<file path=ppt/slides/slide15.xml><?xml version="1.0" encoding="utf-8"?>
+<p:sld xmlns:a="http://schemas.openxmlformats.org/drawingml/2006/main" xmlns:r="http://schemas.openxmlformats.org/officeDocument/2006/relationships" xmlns:p="http://schemas.openxmlformats.org/presentationml/2006/main">
+  <p:cSld>
+    <p:spTree>
+      <p:nvGrpSpPr>
+        <p:cNvPr id="1" name=""/>
+        <p:cNvGrpSpPr/>
+        <p:nvPr/>
+      </p:nvGrpSpPr>
+      <p:grpSpPr>
+        <a:xfrm>
+          <a:off x="0" y="0"/>
+          <a:ext cx="0" cy="0"/>
+          <a:chOff x="0" y="0"/>
+          <a:chExt cx="0" cy="0"/>
+        </a:xfrm>
+      </p:grpSpPr>
+      <p:sp>
+        <p:nvSpPr>
+          <p:cNvPr id="2" name="TextBox 1">
+            <a:extLst>
+              <a:ext uri="{FF2B5EF4-FFF2-40B4-BE49-F238E27FC236}">
+                <a16:creationId xmlns:a16="http://schemas.microsoft.com/office/drawing/2014/main" id="{F2CB681B-00B7-DC2A-B933-41791CBE6EE5}"/>
+              </a:ext>
+            </a:extLst>
+          </p:cNvPr>
+          <p:cNvSpPr txBox="1"/>
+          <p:nvPr/>
+        </p:nvSpPr>
+        <p:spPr>
+          <a:xfrm>
+            <a:off x="252248" y="393403"/>
+            <a:ext cx="6138040" cy="400110"/>
+          </a:xfrm>
+          <a:prstGeom prst="rect">
+            <a:avLst/>
+          </a:prstGeom>
+          <a:noFill/>
+        </p:spPr>
+        <p:txBody>
+          <a:bodyPr wrap="square">
+            <a:spAutoFit/>
+          </a:bodyPr>
+          <a:lstStyle/>
+          <a:p>
+            <a:r>
+              <a:rPr lang="en-US" sz="2000" b="1" u="sng" dirty="0">
+                <a:solidFill>
+                  <a:srgbClr val="000000"/>
+                </a:solidFill>
+              </a:rPr>
+              <a:t>Command </a:t>
+            </a:r>
+            <a:r>
+              <a:rPr lang="en-IN" sz="2000" b="1" u="sng" dirty="0">
+                <a:solidFill>
+                  <a:srgbClr val="000000"/>
+                </a:solidFill>
+              </a:rPr>
+              <a:t>Design Pattern</a:t>
+            </a:r>
+            <a:endParaRPr lang="en-IN" sz="2000" b="1" u="sng" dirty="0"/>
+          </a:p>
+        </p:txBody>
+      </p:sp>
+      <p:sp>
+        <p:nvSpPr>
+          <p:cNvPr id="3" name="Rectangle 2">
+            <a:extLst>
+              <a:ext uri="{FF2B5EF4-FFF2-40B4-BE49-F238E27FC236}">
+                <a16:creationId xmlns:a16="http://schemas.microsoft.com/office/drawing/2014/main" id="{25B40630-E552-8ECB-4D3D-72685DAD09FA}"/>
+              </a:ext>
+            </a:extLst>
+          </p:cNvPr>
+          <p:cNvSpPr/>
+          <p:nvPr/>
+        </p:nvSpPr>
+        <p:spPr>
+          <a:xfrm>
+            <a:off x="2748168" y="1579830"/>
+            <a:ext cx="2991679" cy="1858921"/>
+          </a:xfrm>
+          <a:prstGeom prst="rect">
+            <a:avLst/>
+          </a:prstGeom>
+          <a:noFill/>
+          <a:ln>
+            <a:solidFill>
+              <a:schemeClr val="bg2">
+                <a:lumMod val="10000"/>
+              </a:schemeClr>
+            </a:solidFill>
+          </a:ln>
+        </p:spPr>
+        <p:style>
+          <a:lnRef idx="2">
+            <a:schemeClr val="accent1">
+              <a:shade val="50000"/>
+            </a:schemeClr>
+          </a:lnRef>
+          <a:fillRef idx="1">
+            <a:schemeClr val="accent1"/>
+          </a:fillRef>
+          <a:effectRef idx="0">
+            <a:schemeClr val="accent1"/>
+          </a:effectRef>
+          <a:fontRef idx="minor">
+            <a:schemeClr val="lt1"/>
+          </a:fontRef>
+        </p:style>
+        <p:txBody>
+          <a:bodyPr rtlCol="0" anchor="ctr"/>
+          <a:lstStyle/>
+          <a:p>
+            <a:pPr algn="ctr"/>
+            <a:endParaRPr lang="en-IN"/>
+          </a:p>
+        </p:txBody>
+      </p:sp>
+      <p:cxnSp>
+        <p:nvCxnSpPr>
+          <p:cNvPr id="4" name="Straight Connector 3">
+            <a:extLst>
+              <a:ext uri="{FF2B5EF4-FFF2-40B4-BE49-F238E27FC236}">
+                <a16:creationId xmlns:a16="http://schemas.microsoft.com/office/drawing/2014/main" id="{FE91AC64-2A6B-FC7C-2AFE-86A3BDF7FE58}"/>
+              </a:ext>
+            </a:extLst>
+          </p:cNvPr>
+          <p:cNvCxnSpPr>
+            <a:cxnSpLocks/>
+          </p:cNvCxnSpPr>
+          <p:nvPr/>
+        </p:nvCxnSpPr>
+        <p:spPr>
+          <a:xfrm>
+            <a:off x="2748168" y="2237170"/>
+            <a:ext cx="2991679" cy="0"/>
+          </a:xfrm>
+          <a:prstGeom prst="line">
+            <a:avLst/>
+          </a:prstGeom>
+          <a:ln>
+            <a:solidFill>
+              <a:schemeClr val="tx1">
+                <a:lumMod val="95000"/>
+                <a:lumOff val="5000"/>
+              </a:schemeClr>
+            </a:solidFill>
+          </a:ln>
+        </p:spPr>
+        <p:style>
+          <a:lnRef idx="1">
+            <a:schemeClr val="accent1"/>
+          </a:lnRef>
+          <a:fillRef idx="0">
+            <a:schemeClr val="accent1"/>
+          </a:fillRef>
+          <a:effectRef idx="0">
+            <a:schemeClr val="accent1"/>
+          </a:effectRef>
+          <a:fontRef idx="minor">
+            <a:schemeClr val="tx1"/>
+          </a:fontRef>
+        </p:style>
+      </p:cxnSp>
+      <p:sp>
+        <p:nvSpPr>
+          <p:cNvPr id="5" name="TextBox 4">
+            <a:extLst>
+              <a:ext uri="{FF2B5EF4-FFF2-40B4-BE49-F238E27FC236}">
+                <a16:creationId xmlns:a16="http://schemas.microsoft.com/office/drawing/2014/main" id="{4FDD9501-9DD8-6ED0-7334-FA7E3BF3BEA0}"/>
+              </a:ext>
+            </a:extLst>
+          </p:cNvPr>
+          <p:cNvSpPr txBox="1"/>
+          <p:nvPr/>
+        </p:nvSpPr>
+        <p:spPr>
+          <a:xfrm>
+            <a:off x="583216" y="1332637"/>
+            <a:ext cx="1373138" cy="369332"/>
+          </a:xfrm>
+          <a:prstGeom prst="rect">
+            <a:avLst/>
+          </a:prstGeom>
+          <a:noFill/>
+        </p:spPr>
+        <p:txBody>
+          <a:bodyPr wrap="square" rtlCol="0">
+            <a:spAutoFit/>
+          </a:bodyPr>
+          <a:lstStyle/>
+          <a:p>
+            <a:r>
+              <a:rPr lang="en-US" dirty="0"/>
+              <a:t>Client</a:t>
+            </a:r>
+            <a:endParaRPr lang="en-IN" dirty="0"/>
+          </a:p>
+        </p:txBody>
+      </p:sp>
+      <p:sp>
+        <p:nvSpPr>
+          <p:cNvPr id="6" name="TextBox 5">
+            <a:extLst>
+              <a:ext uri="{FF2B5EF4-FFF2-40B4-BE49-F238E27FC236}">
+                <a16:creationId xmlns:a16="http://schemas.microsoft.com/office/drawing/2014/main" id="{3A492E49-445E-8C6D-B4C3-ADD5485FAC6D}"/>
+              </a:ext>
+            </a:extLst>
+          </p:cNvPr>
+          <p:cNvSpPr txBox="1"/>
+          <p:nvPr/>
+        </p:nvSpPr>
+        <p:spPr>
+          <a:xfrm>
+            <a:off x="2773015" y="1708739"/>
+            <a:ext cx="2613993" cy="369332"/>
+          </a:xfrm>
+          <a:prstGeom prst="rect">
+            <a:avLst/>
+          </a:prstGeom>
+          <a:noFill/>
+        </p:spPr>
+        <p:txBody>
+          <a:bodyPr wrap="square" rtlCol="0">
+            <a:spAutoFit/>
+          </a:bodyPr>
+          <a:lstStyle/>
+          <a:p>
+            <a:r>
+              <a:rPr lang="en-US" dirty="0" err="1"/>
+              <a:t>IButton</a:t>
+            </a:r>
+            <a:endParaRPr lang="en-IN" dirty="0"/>
+          </a:p>
+        </p:txBody>
+      </p:sp>
+      <p:sp>
+        <p:nvSpPr>
+          <p:cNvPr id="7" name="TextBox 6">
+            <a:extLst>
+              <a:ext uri="{FF2B5EF4-FFF2-40B4-BE49-F238E27FC236}">
+                <a16:creationId xmlns:a16="http://schemas.microsoft.com/office/drawing/2014/main" id="{A52759B5-EFC4-B298-C5E9-37B5E08596E3}"/>
+              </a:ext>
+            </a:extLst>
+          </p:cNvPr>
+          <p:cNvSpPr txBox="1"/>
+          <p:nvPr/>
+        </p:nvSpPr>
+        <p:spPr>
+          <a:xfrm>
+            <a:off x="2748168" y="2515421"/>
+            <a:ext cx="2613993" cy="923330"/>
+          </a:xfrm>
+          <a:prstGeom prst="rect">
+            <a:avLst/>
+          </a:prstGeom>
+          <a:noFill/>
+        </p:spPr>
+        <p:txBody>
+          <a:bodyPr wrap="square" rtlCol="0">
+            <a:spAutoFit/>
+          </a:bodyPr>
+          <a:lstStyle/>
+          <a:p>
+            <a:r>
+              <a:rPr lang="en-US" dirty="0" err="1"/>
+              <a:t>PressForExectution</a:t>
+            </a:r>
+            <a:r>
+              <a:rPr lang="en-US" dirty="0"/>
+              <a:t>()</a:t>
+            </a:r>
+          </a:p>
+          <a:p>
+            <a:r>
+              <a:rPr lang="en-US" dirty="0" err="1"/>
+              <a:t>PressToStopExecution</a:t>
+            </a:r>
+            <a:r>
+              <a:rPr lang="en-US" dirty="0"/>
+              <a:t>()</a:t>
+            </a:r>
+          </a:p>
+          <a:p>
+            <a:endParaRPr lang="en-US" dirty="0"/>
+          </a:p>
+        </p:txBody>
+      </p:sp>
+      <p:cxnSp>
+        <p:nvCxnSpPr>
+          <p:cNvPr id="8" name="Straight Arrow Connector 17">
+            <a:extLst>
+              <a:ext uri="{FF2B5EF4-FFF2-40B4-BE49-F238E27FC236}">
+                <a16:creationId xmlns:a16="http://schemas.microsoft.com/office/drawing/2014/main" id="{B5F5BEF4-7B62-211B-424D-41A93EB2C774}"/>
+              </a:ext>
+            </a:extLst>
+          </p:cNvPr>
+          <p:cNvCxnSpPr>
+            <a:cxnSpLocks/>
+            <a:stCxn id="9" idx="2"/>
+            <a:endCxn id="7" idx="1"/>
+          </p:cNvCxnSpPr>
+          <p:nvPr/>
+        </p:nvCxnSpPr>
+        <p:spPr>
+          <a:xfrm rot="16200000" flipH="1">
+            <a:off x="1481101" y="1710018"/>
+            <a:ext cx="1064203" cy="1469932"/>
+          </a:xfrm>
+          <a:prstGeom prst="bentConnector2">
+            <a:avLst/>
+          </a:prstGeom>
+          <a:ln>
+            <a:tailEnd type="triangle"/>
+          </a:ln>
+        </p:spPr>
+        <p:style>
+          <a:lnRef idx="1">
+            <a:schemeClr val="dk1"/>
+          </a:lnRef>
+          <a:fillRef idx="0">
+            <a:schemeClr val="dk1"/>
+          </a:fillRef>
+          <a:effectRef idx="0">
+            <a:schemeClr val="dk1"/>
+          </a:effectRef>
+          <a:fontRef idx="minor">
+            <a:schemeClr val="tx1"/>
+          </a:fontRef>
+        </p:style>
+      </p:cxnSp>
+      <p:sp>
+        <p:nvSpPr>
+          <p:cNvPr id="9" name="Rectangle 8">
+            <a:extLst>
+              <a:ext uri="{FF2B5EF4-FFF2-40B4-BE49-F238E27FC236}">
+                <a16:creationId xmlns:a16="http://schemas.microsoft.com/office/drawing/2014/main" id="{4925CB76-5A90-034E-6278-57B8C3291E7A}"/>
+              </a:ext>
+            </a:extLst>
+          </p:cNvPr>
+          <p:cNvSpPr/>
+          <p:nvPr/>
+        </p:nvSpPr>
+        <p:spPr>
+          <a:xfrm>
+            <a:off x="252248" y="1147106"/>
+            <a:ext cx="2051975" cy="765777"/>
+          </a:xfrm>
+          <a:prstGeom prst="rect">
+            <a:avLst/>
+          </a:prstGeom>
+          <a:noFill/>
+          <a:ln>
+            <a:solidFill>
+              <a:schemeClr val="bg2">
+                <a:lumMod val="10000"/>
+              </a:schemeClr>
+            </a:solidFill>
+          </a:ln>
+        </p:spPr>
+        <p:style>
+          <a:lnRef idx="2">
+            <a:schemeClr val="accent1">
+              <a:shade val="50000"/>
+            </a:schemeClr>
+          </a:lnRef>
+          <a:fillRef idx="1">
+            <a:schemeClr val="accent1"/>
+          </a:fillRef>
+          <a:effectRef idx="0">
+            <a:schemeClr val="accent1"/>
+          </a:effectRef>
+          <a:fontRef idx="minor">
+            <a:schemeClr val="lt1"/>
+          </a:fontRef>
+        </p:style>
+        <p:txBody>
+          <a:bodyPr rtlCol="0" anchor="ctr"/>
+          <a:lstStyle/>
+          <a:p>
+            <a:pPr algn="ctr"/>
+            <a:endParaRPr lang="en-IN"/>
+          </a:p>
+        </p:txBody>
+      </p:sp>
+      <p:sp>
+        <p:nvSpPr>
+          <p:cNvPr id="10" name="Rectangle 9">
+            <a:extLst>
+              <a:ext uri="{FF2B5EF4-FFF2-40B4-BE49-F238E27FC236}">
+                <a16:creationId xmlns:a16="http://schemas.microsoft.com/office/drawing/2014/main" id="{8FA31426-98D5-75C1-4E2E-661384166974}"/>
+              </a:ext>
+            </a:extLst>
+          </p:cNvPr>
+          <p:cNvSpPr/>
+          <p:nvPr/>
+        </p:nvSpPr>
+        <p:spPr>
+          <a:xfrm>
+            <a:off x="7292408" y="322457"/>
+            <a:ext cx="2991679" cy="1755613"/>
+          </a:xfrm>
+          <a:prstGeom prst="rect">
+            <a:avLst/>
+          </a:prstGeom>
+          <a:noFill/>
+          <a:ln>
+            <a:solidFill>
+              <a:schemeClr val="bg2">
+                <a:lumMod val="10000"/>
+              </a:schemeClr>
+            </a:solidFill>
+          </a:ln>
+        </p:spPr>
+        <p:style>
+          <a:lnRef idx="2">
+            <a:schemeClr val="accent1">
+              <a:shade val="50000"/>
+            </a:schemeClr>
+          </a:lnRef>
+          <a:fillRef idx="1">
+            <a:schemeClr val="accent1"/>
+          </a:fillRef>
+          <a:effectRef idx="0">
+            <a:schemeClr val="accent1"/>
+          </a:effectRef>
+          <a:fontRef idx="minor">
+            <a:schemeClr val="lt1"/>
+          </a:fontRef>
+        </p:style>
+        <p:txBody>
+          <a:bodyPr rtlCol="0" anchor="ctr"/>
+          <a:lstStyle/>
+          <a:p>
+            <a:pPr algn="ctr"/>
+            <a:endParaRPr lang="en-IN"/>
+          </a:p>
+        </p:txBody>
+      </p:sp>
+      <p:cxnSp>
+        <p:nvCxnSpPr>
+          <p:cNvPr id="11" name="Straight Connector 10">
+            <a:extLst>
+              <a:ext uri="{FF2B5EF4-FFF2-40B4-BE49-F238E27FC236}">
+                <a16:creationId xmlns:a16="http://schemas.microsoft.com/office/drawing/2014/main" id="{D099C62A-9D22-7082-76F5-AE387AD9395B}"/>
+              </a:ext>
+            </a:extLst>
+          </p:cNvPr>
+          <p:cNvCxnSpPr>
+            <a:cxnSpLocks/>
+          </p:cNvCxnSpPr>
+          <p:nvPr/>
+        </p:nvCxnSpPr>
+        <p:spPr>
+          <a:xfrm>
+            <a:off x="7292408" y="958525"/>
+            <a:ext cx="2991679" cy="0"/>
+          </a:xfrm>
+          <a:prstGeom prst="line">
+            <a:avLst/>
+          </a:prstGeom>
+          <a:ln>
+            <a:solidFill>
+              <a:schemeClr val="tx1">
+                <a:lumMod val="95000"/>
+                <a:lumOff val="5000"/>
+              </a:schemeClr>
+            </a:solidFill>
+          </a:ln>
+        </p:spPr>
+        <p:style>
+          <a:lnRef idx="1">
+            <a:schemeClr val="accent1"/>
+          </a:lnRef>
+          <a:fillRef idx="0">
+            <a:schemeClr val="accent1"/>
+          </a:fillRef>
+          <a:effectRef idx="0">
+            <a:schemeClr val="accent1"/>
+          </a:effectRef>
+          <a:fontRef idx="minor">
+            <a:schemeClr val="tx1"/>
+          </a:fontRef>
+        </p:style>
+      </p:cxnSp>
+      <p:sp>
+        <p:nvSpPr>
+          <p:cNvPr id="12" name="TextBox 11">
+            <a:extLst>
+              <a:ext uri="{FF2B5EF4-FFF2-40B4-BE49-F238E27FC236}">
+                <a16:creationId xmlns:a16="http://schemas.microsoft.com/office/drawing/2014/main" id="{BE68C8C3-ADC8-30C1-A0C2-556EC8801832}"/>
+              </a:ext>
+            </a:extLst>
+          </p:cNvPr>
+          <p:cNvSpPr txBox="1"/>
+          <p:nvPr/>
+        </p:nvSpPr>
+        <p:spPr>
+          <a:xfrm>
+            <a:off x="7317254" y="440936"/>
+            <a:ext cx="2613993" cy="369332"/>
+          </a:xfrm>
+          <a:prstGeom prst="rect">
+            <a:avLst/>
+          </a:prstGeom>
+          <a:noFill/>
+        </p:spPr>
+        <p:txBody>
+          <a:bodyPr wrap="square" rtlCol="0">
+            <a:spAutoFit/>
+          </a:bodyPr>
+          <a:lstStyle/>
+          <a:p>
+            <a:r>
+              <a:rPr lang="en-US" dirty="0" err="1"/>
+              <a:t>ICommand</a:t>
+            </a:r>
+            <a:endParaRPr lang="en-IN" dirty="0"/>
+          </a:p>
+        </p:txBody>
+      </p:sp>
+      <p:cxnSp>
+        <p:nvCxnSpPr>
+          <p:cNvPr id="13" name="Straight Arrow Connector 17">
+            <a:extLst>
+              <a:ext uri="{FF2B5EF4-FFF2-40B4-BE49-F238E27FC236}">
+                <a16:creationId xmlns:a16="http://schemas.microsoft.com/office/drawing/2014/main" id="{EB4081E2-CFDB-66F7-A551-ABE9DB42D28F}"/>
+              </a:ext>
+            </a:extLst>
+          </p:cNvPr>
+          <p:cNvCxnSpPr>
+            <a:cxnSpLocks/>
+          </p:cNvCxnSpPr>
+          <p:nvPr/>
+        </p:nvCxnSpPr>
+        <p:spPr>
+          <a:xfrm flipV="1">
+            <a:off x="5739847" y="1682200"/>
+            <a:ext cx="1577406" cy="827401"/>
+          </a:xfrm>
+          <a:prstGeom prst="bentConnector3">
+            <a:avLst>
+              <a:gd name="adj1" fmla="val 50000"/>
+            </a:avLst>
+          </a:prstGeom>
+          <a:ln>
+            <a:tailEnd type="triangle"/>
+          </a:ln>
+        </p:spPr>
+        <p:style>
+          <a:lnRef idx="1">
+            <a:schemeClr val="dk1"/>
+          </a:lnRef>
+          <a:fillRef idx="0">
+            <a:schemeClr val="dk1"/>
+          </a:fillRef>
+          <a:effectRef idx="0">
+            <a:schemeClr val="dk1"/>
+          </a:effectRef>
+          <a:fontRef idx="minor">
+            <a:schemeClr val="tx1"/>
+          </a:fontRef>
+        </p:style>
+      </p:cxnSp>
+      <p:sp>
+        <p:nvSpPr>
+          <p:cNvPr id="14" name="Rectangle 13">
+            <a:extLst>
+              <a:ext uri="{FF2B5EF4-FFF2-40B4-BE49-F238E27FC236}">
+                <a16:creationId xmlns:a16="http://schemas.microsoft.com/office/drawing/2014/main" id="{AEADE538-F99A-6DAB-1C8C-2C2525A72428}"/>
+              </a:ext>
+            </a:extLst>
+          </p:cNvPr>
+          <p:cNvSpPr/>
+          <p:nvPr/>
+        </p:nvSpPr>
+        <p:spPr>
+          <a:xfrm>
+            <a:off x="4894448" y="4809586"/>
+            <a:ext cx="2991679" cy="1639456"/>
+          </a:xfrm>
+          <a:prstGeom prst="rect">
+            <a:avLst/>
+          </a:prstGeom>
+          <a:noFill/>
+          <a:ln>
+            <a:solidFill>
+              <a:schemeClr val="bg2">
+                <a:lumMod val="10000"/>
+              </a:schemeClr>
+            </a:solidFill>
+          </a:ln>
+        </p:spPr>
+        <p:style>
+          <a:lnRef idx="2">
+            <a:schemeClr val="accent1">
+              <a:shade val="50000"/>
+            </a:schemeClr>
+          </a:lnRef>
+          <a:fillRef idx="1">
+            <a:schemeClr val="accent1"/>
+          </a:fillRef>
+          <a:effectRef idx="0">
+            <a:schemeClr val="accent1"/>
+          </a:effectRef>
+          <a:fontRef idx="minor">
+            <a:schemeClr val="lt1"/>
+          </a:fontRef>
+        </p:style>
+        <p:txBody>
+          <a:bodyPr rtlCol="0" anchor="ctr"/>
+          <a:lstStyle/>
+          <a:p>
+            <a:pPr algn="ctr"/>
+            <a:endParaRPr lang="en-IN"/>
+          </a:p>
+        </p:txBody>
+      </p:sp>
+      <p:cxnSp>
+        <p:nvCxnSpPr>
+          <p:cNvPr id="15" name="Straight Connector 14">
+            <a:extLst>
+              <a:ext uri="{FF2B5EF4-FFF2-40B4-BE49-F238E27FC236}">
+                <a16:creationId xmlns:a16="http://schemas.microsoft.com/office/drawing/2014/main" id="{D278CD99-E0A0-A26B-D180-7500F07CD370}"/>
+              </a:ext>
+            </a:extLst>
+          </p:cNvPr>
+          <p:cNvCxnSpPr>
+            <a:cxnSpLocks/>
+          </p:cNvCxnSpPr>
+          <p:nvPr/>
+        </p:nvCxnSpPr>
+        <p:spPr>
+          <a:xfrm>
+            <a:off x="4894448" y="5393424"/>
+            <a:ext cx="2991679" cy="0"/>
+          </a:xfrm>
+          <a:prstGeom prst="line">
+            <a:avLst/>
+          </a:prstGeom>
+          <a:ln>
+            <a:solidFill>
+              <a:schemeClr val="tx1">
+                <a:lumMod val="95000"/>
+                <a:lumOff val="5000"/>
+              </a:schemeClr>
+            </a:solidFill>
+          </a:ln>
+        </p:spPr>
+        <p:style>
+          <a:lnRef idx="1">
+            <a:schemeClr val="accent1"/>
+          </a:lnRef>
+          <a:fillRef idx="0">
+            <a:schemeClr val="accent1"/>
+          </a:fillRef>
+          <a:effectRef idx="0">
+            <a:schemeClr val="accent1"/>
+          </a:effectRef>
+          <a:fontRef idx="minor">
+            <a:schemeClr val="tx1"/>
+          </a:fontRef>
+        </p:style>
+      </p:cxnSp>
+      <p:sp>
+        <p:nvSpPr>
+          <p:cNvPr id="16" name="TextBox 15">
+            <a:extLst>
+              <a:ext uri="{FF2B5EF4-FFF2-40B4-BE49-F238E27FC236}">
+                <a16:creationId xmlns:a16="http://schemas.microsoft.com/office/drawing/2014/main" id="{9C9A4925-5924-02A9-D2F8-869F37DE56CA}"/>
+              </a:ext>
+            </a:extLst>
+          </p:cNvPr>
+          <p:cNvSpPr txBox="1"/>
+          <p:nvPr/>
+        </p:nvSpPr>
+        <p:spPr>
+          <a:xfrm>
+            <a:off x="4894448" y="4913111"/>
+            <a:ext cx="2613993" cy="369332"/>
+          </a:xfrm>
+          <a:prstGeom prst="rect">
+            <a:avLst/>
+          </a:prstGeom>
+          <a:noFill/>
+        </p:spPr>
+        <p:txBody>
+          <a:bodyPr wrap="square" rtlCol="0">
+            <a:spAutoFit/>
+          </a:bodyPr>
+          <a:lstStyle/>
+          <a:p>
+            <a:r>
+              <a:rPr lang="en-US" dirty="0" err="1"/>
+              <a:t>ILight</a:t>
+            </a:r>
+            <a:endParaRPr lang="en-IN" dirty="0"/>
+          </a:p>
+        </p:txBody>
+      </p:sp>
+      <p:sp>
+        <p:nvSpPr>
+          <p:cNvPr id="22" name="TextBox 21">
+            <a:extLst>
+              <a:ext uri="{FF2B5EF4-FFF2-40B4-BE49-F238E27FC236}">
+                <a16:creationId xmlns:a16="http://schemas.microsoft.com/office/drawing/2014/main" id="{D67C1322-2659-1D34-83BF-E04E54B83F71}"/>
+              </a:ext>
+            </a:extLst>
+          </p:cNvPr>
+          <p:cNvSpPr txBox="1"/>
+          <p:nvPr/>
+        </p:nvSpPr>
+        <p:spPr>
+          <a:xfrm>
+            <a:off x="7317253" y="987577"/>
+            <a:ext cx="2613993" cy="646331"/>
+          </a:xfrm>
+          <a:prstGeom prst="rect">
+            <a:avLst/>
+          </a:prstGeom>
+          <a:noFill/>
+        </p:spPr>
+        <p:txBody>
+          <a:bodyPr wrap="square" rtlCol="0">
+            <a:spAutoFit/>
+          </a:bodyPr>
+          <a:lstStyle/>
+          <a:p>
+            <a:r>
+              <a:rPr lang="en-US" dirty="0" err="1"/>
+              <a:t>StartExecution</a:t>
+            </a:r>
+            <a:r>
+              <a:rPr lang="en-US" dirty="0"/>
+              <a:t>()</a:t>
+            </a:r>
+          </a:p>
+          <a:p>
+            <a:r>
+              <a:rPr lang="en-US" dirty="0" err="1"/>
+              <a:t>StopExecution</a:t>
+            </a:r>
+            <a:r>
+              <a:rPr lang="en-US" dirty="0"/>
+              <a:t>()</a:t>
+            </a:r>
+          </a:p>
+        </p:txBody>
+      </p:sp>
+      <p:sp>
+        <p:nvSpPr>
+          <p:cNvPr id="24" name="TextBox 23">
+            <a:extLst>
+              <a:ext uri="{FF2B5EF4-FFF2-40B4-BE49-F238E27FC236}">
+                <a16:creationId xmlns:a16="http://schemas.microsoft.com/office/drawing/2014/main" id="{69EE61E6-D212-FFBB-21D0-758EE0519DDF}"/>
+              </a:ext>
+            </a:extLst>
+          </p:cNvPr>
+          <p:cNvSpPr txBox="1"/>
+          <p:nvPr/>
+        </p:nvSpPr>
+        <p:spPr>
+          <a:xfrm>
+            <a:off x="4989042" y="5525711"/>
+            <a:ext cx="2613993" cy="923330"/>
+          </a:xfrm>
+          <a:prstGeom prst="rect">
+            <a:avLst/>
+          </a:prstGeom>
+          <a:noFill/>
+        </p:spPr>
+        <p:txBody>
+          <a:bodyPr wrap="square" rtlCol="0">
+            <a:spAutoFit/>
+          </a:bodyPr>
+          <a:lstStyle/>
+          <a:p>
+            <a:r>
+              <a:rPr lang="en-US" dirty="0" err="1"/>
+              <a:t>TurnOn</a:t>
+            </a:r>
+            <a:r>
+              <a:rPr lang="en-US" dirty="0"/>
+              <a:t>()</a:t>
+            </a:r>
+          </a:p>
+          <a:p>
+            <a:r>
+              <a:rPr lang="en-US" dirty="0" err="1"/>
+              <a:t>TurnOff</a:t>
+            </a:r>
+            <a:r>
+              <a:rPr lang="en-US" dirty="0"/>
+              <a:t>()</a:t>
+            </a:r>
+          </a:p>
+          <a:p>
+            <a:endParaRPr lang="en-US" dirty="0"/>
+          </a:p>
+        </p:txBody>
+      </p:sp>
+      <p:sp>
+        <p:nvSpPr>
+          <p:cNvPr id="25" name="Rectangle 24">
+            <a:extLst>
+              <a:ext uri="{FF2B5EF4-FFF2-40B4-BE49-F238E27FC236}">
+                <a16:creationId xmlns:a16="http://schemas.microsoft.com/office/drawing/2014/main" id="{600707B9-8428-BCF3-A4D8-852FBA1B7248}"/>
+              </a:ext>
+            </a:extLst>
+          </p:cNvPr>
+          <p:cNvSpPr/>
+          <p:nvPr/>
+        </p:nvSpPr>
+        <p:spPr>
+          <a:xfrm>
+            <a:off x="8435406" y="4740166"/>
+            <a:ext cx="2991679" cy="1724430"/>
+          </a:xfrm>
+          <a:prstGeom prst="rect">
+            <a:avLst/>
+          </a:prstGeom>
+          <a:noFill/>
+          <a:ln>
+            <a:solidFill>
+              <a:schemeClr val="bg2">
+                <a:lumMod val="10000"/>
+              </a:schemeClr>
+            </a:solidFill>
+          </a:ln>
+        </p:spPr>
+        <p:style>
+          <a:lnRef idx="2">
+            <a:schemeClr val="accent1">
+              <a:shade val="50000"/>
+            </a:schemeClr>
+          </a:lnRef>
+          <a:fillRef idx="1">
+            <a:schemeClr val="accent1"/>
+          </a:fillRef>
+          <a:effectRef idx="0">
+            <a:schemeClr val="accent1"/>
+          </a:effectRef>
+          <a:fontRef idx="minor">
+            <a:schemeClr val="lt1"/>
+          </a:fontRef>
+        </p:style>
+        <p:txBody>
+          <a:bodyPr rtlCol="0" anchor="ctr"/>
+          <a:lstStyle/>
+          <a:p>
+            <a:pPr algn="ctr"/>
+            <a:endParaRPr lang="en-IN"/>
+          </a:p>
+        </p:txBody>
+      </p:sp>
+      <p:cxnSp>
+        <p:nvCxnSpPr>
+          <p:cNvPr id="26" name="Straight Connector 25">
+            <a:extLst>
+              <a:ext uri="{FF2B5EF4-FFF2-40B4-BE49-F238E27FC236}">
+                <a16:creationId xmlns:a16="http://schemas.microsoft.com/office/drawing/2014/main" id="{A226933B-C3C7-6279-6889-A694754EB90F}"/>
+              </a:ext>
+            </a:extLst>
+          </p:cNvPr>
+          <p:cNvCxnSpPr>
+            <a:cxnSpLocks/>
+          </p:cNvCxnSpPr>
+          <p:nvPr/>
+        </p:nvCxnSpPr>
+        <p:spPr>
+          <a:xfrm>
+            <a:off x="8435406" y="5324004"/>
+            <a:ext cx="2991679" cy="0"/>
+          </a:xfrm>
+          <a:prstGeom prst="line">
+            <a:avLst/>
+          </a:prstGeom>
+          <a:ln>
+            <a:solidFill>
+              <a:schemeClr val="tx1">
+                <a:lumMod val="95000"/>
+                <a:lumOff val="5000"/>
+              </a:schemeClr>
+            </a:solidFill>
+          </a:ln>
+        </p:spPr>
+        <p:style>
+          <a:lnRef idx="1">
+            <a:schemeClr val="accent1"/>
+          </a:lnRef>
+          <a:fillRef idx="0">
+            <a:schemeClr val="accent1"/>
+          </a:fillRef>
+          <a:effectRef idx="0">
+            <a:schemeClr val="accent1"/>
+          </a:effectRef>
+          <a:fontRef idx="minor">
+            <a:schemeClr val="tx1"/>
+          </a:fontRef>
+        </p:style>
+      </p:cxnSp>
+      <p:sp>
+        <p:nvSpPr>
+          <p:cNvPr id="27" name="TextBox 26">
+            <a:extLst>
+              <a:ext uri="{FF2B5EF4-FFF2-40B4-BE49-F238E27FC236}">
+                <a16:creationId xmlns:a16="http://schemas.microsoft.com/office/drawing/2014/main" id="{83CBF423-0784-E3E4-F7D2-BE176220764A}"/>
+              </a:ext>
+            </a:extLst>
+          </p:cNvPr>
+          <p:cNvSpPr txBox="1"/>
+          <p:nvPr/>
+        </p:nvSpPr>
+        <p:spPr>
+          <a:xfrm>
+            <a:off x="8435406" y="4843691"/>
+            <a:ext cx="2613993" cy="369332"/>
+          </a:xfrm>
+          <a:prstGeom prst="rect">
+            <a:avLst/>
+          </a:prstGeom>
+          <a:noFill/>
+        </p:spPr>
+        <p:txBody>
+          <a:bodyPr wrap="square" rtlCol="0">
+            <a:spAutoFit/>
+          </a:bodyPr>
+          <a:lstStyle/>
+          <a:p>
+            <a:r>
+              <a:rPr lang="en-US" dirty="0" err="1"/>
+              <a:t>ICamera</a:t>
+            </a:r>
+            <a:endParaRPr lang="en-IN" dirty="0"/>
+          </a:p>
+        </p:txBody>
+      </p:sp>
+      <p:sp>
+        <p:nvSpPr>
+          <p:cNvPr id="28" name="TextBox 27">
+            <a:extLst>
+              <a:ext uri="{FF2B5EF4-FFF2-40B4-BE49-F238E27FC236}">
+                <a16:creationId xmlns:a16="http://schemas.microsoft.com/office/drawing/2014/main" id="{113E73D3-E701-4501-3233-106A54959C37}"/>
+              </a:ext>
+            </a:extLst>
+          </p:cNvPr>
+          <p:cNvSpPr txBox="1"/>
+          <p:nvPr/>
+        </p:nvSpPr>
+        <p:spPr>
+          <a:xfrm>
+            <a:off x="8435406" y="5541266"/>
+            <a:ext cx="2613993" cy="923330"/>
+          </a:xfrm>
+          <a:prstGeom prst="rect">
+            <a:avLst/>
+          </a:prstGeom>
+          <a:noFill/>
+        </p:spPr>
+        <p:txBody>
+          <a:bodyPr wrap="square" rtlCol="0">
+            <a:spAutoFit/>
+          </a:bodyPr>
+          <a:lstStyle/>
+          <a:p>
+            <a:r>
+              <a:rPr lang="en-US" dirty="0" err="1"/>
+              <a:t>StartRecording</a:t>
+            </a:r>
+            <a:r>
+              <a:rPr lang="en-US" dirty="0"/>
+              <a:t>()</a:t>
+            </a:r>
+          </a:p>
+          <a:p>
+            <a:r>
+              <a:rPr lang="en-US" dirty="0" err="1"/>
+              <a:t>StopRecording</a:t>
+            </a:r>
+            <a:r>
+              <a:rPr lang="en-US" dirty="0"/>
+              <a:t>()</a:t>
+            </a:r>
+          </a:p>
+          <a:p>
+            <a:endParaRPr lang="en-US" dirty="0"/>
+          </a:p>
+        </p:txBody>
+      </p:sp>
+      <p:cxnSp>
+        <p:nvCxnSpPr>
+          <p:cNvPr id="31" name="Straight Arrow Connector 17">
+            <a:extLst>
+              <a:ext uri="{FF2B5EF4-FFF2-40B4-BE49-F238E27FC236}">
+                <a16:creationId xmlns:a16="http://schemas.microsoft.com/office/drawing/2014/main" id="{553546DA-C367-B04F-E5DE-D47D6D429573}"/>
+              </a:ext>
+            </a:extLst>
+          </p:cNvPr>
+          <p:cNvCxnSpPr>
+            <a:cxnSpLocks/>
+            <a:stCxn id="14" idx="0"/>
+            <a:endCxn id="10" idx="2"/>
+          </p:cNvCxnSpPr>
+          <p:nvPr/>
+        </p:nvCxnSpPr>
+        <p:spPr>
+          <a:xfrm rot="5400000" flipH="1" flipV="1">
+            <a:off x="6223510" y="2244848"/>
+            <a:ext cx="2731516" cy="2397960"/>
+          </a:xfrm>
+          <a:prstGeom prst="bentConnector3">
+            <a:avLst>
+              <a:gd name="adj1" fmla="val 50000"/>
+            </a:avLst>
+          </a:prstGeom>
+          <a:ln>
+            <a:tailEnd type="triangle"/>
+          </a:ln>
+        </p:spPr>
+        <p:style>
+          <a:lnRef idx="1">
+            <a:schemeClr val="dk1"/>
+          </a:lnRef>
+          <a:fillRef idx="0">
+            <a:schemeClr val="dk1"/>
+          </a:fillRef>
+          <a:effectRef idx="0">
+            <a:schemeClr val="dk1"/>
+          </a:effectRef>
+          <a:fontRef idx="minor">
+            <a:schemeClr val="tx1"/>
+          </a:fontRef>
+        </p:style>
+      </p:cxnSp>
+      <p:cxnSp>
+        <p:nvCxnSpPr>
+          <p:cNvPr id="34" name="Straight Arrow Connector 17">
+            <a:extLst>
+              <a:ext uri="{FF2B5EF4-FFF2-40B4-BE49-F238E27FC236}">
+                <a16:creationId xmlns:a16="http://schemas.microsoft.com/office/drawing/2014/main" id="{49E619A2-1E48-0393-CF9F-0BA7F4BB7CDD}"/>
+              </a:ext>
+            </a:extLst>
+          </p:cNvPr>
+          <p:cNvCxnSpPr>
+            <a:cxnSpLocks/>
+            <a:stCxn id="25" idx="0"/>
+            <a:endCxn id="10" idx="2"/>
+          </p:cNvCxnSpPr>
+          <p:nvPr/>
+        </p:nvCxnSpPr>
+        <p:spPr>
+          <a:xfrm rot="16200000" flipV="1">
+            <a:off x="8028699" y="2837619"/>
+            <a:ext cx="2662096" cy="1142998"/>
+          </a:xfrm>
+          <a:prstGeom prst="bentConnector3">
+            <a:avLst>
+              <a:gd name="adj1" fmla="val 48816"/>
+            </a:avLst>
+          </a:prstGeom>
+          <a:ln>
+            <a:tailEnd type="triangle"/>
+          </a:ln>
+        </p:spPr>
+        <p:style>
+          <a:lnRef idx="1">
+            <a:schemeClr val="dk1"/>
+          </a:lnRef>
+          <a:fillRef idx="0">
+            <a:schemeClr val="dk1"/>
+          </a:fillRef>
+          <a:effectRef idx="0">
+            <a:schemeClr val="dk1"/>
+          </a:effectRef>
+          <a:fontRef idx="minor">
+            <a:schemeClr val="tx1"/>
+          </a:fontRef>
+        </p:style>
+      </p:cxnSp>
+    </p:spTree>
+    <p:extLst>
+      <p:ext uri="{BB962C8B-B14F-4D97-AF65-F5344CB8AC3E}">
+        <p14:creationId xmlns:p14="http://schemas.microsoft.com/office/powerpoint/2010/main" val="1015724697"/>
       </p:ext>
     </p:extLst>
   </p:cSld>

</xml_diff>

<commit_message>
Code corrected for Chain Of Resposibility
</commit_message>
<xml_diff>
--- a/UMLDiagrams.pptx
+++ b/UMLDiagrams.pptx
@@ -143,7 +143,7 @@
   <pc:docChgLst>
     <pc:chgData name="Manaswini Ray" userId="451f23f8-43b4-4daa-9511-0c9fb98bad1c" providerId="ADAL" clId="{034AA59E-D954-44E8-84AB-C770C7EA240B}"/>
     <pc:docChg chg="undo custSel addSld delSld modSld">
-      <pc:chgData name="Manaswini Ray" userId="451f23f8-43b4-4daa-9511-0c9fb98bad1c" providerId="ADAL" clId="{034AA59E-D954-44E8-84AB-C770C7EA240B}" dt="2023-09-12T15:37:46.288" v="872" actId="14100"/>
+      <pc:chgData name="Manaswini Ray" userId="451f23f8-43b4-4daa-9511-0c9fb98bad1c" providerId="ADAL" clId="{034AA59E-D954-44E8-84AB-C770C7EA240B}" dt="2023-09-12T18:03:59.773" v="886" actId="20577"/>
       <pc:docMkLst>
         <pc:docMk/>
       </pc:docMkLst>
@@ -162,7 +162,7 @@
         </pc:sldMkLst>
       </pc:sldChg>
       <pc:sldChg chg="addSp delSp modSp new mod">
-        <pc:chgData name="Manaswini Ray" userId="451f23f8-43b4-4daa-9511-0c9fb98bad1c" providerId="ADAL" clId="{034AA59E-D954-44E8-84AB-C770C7EA240B}" dt="2023-09-11T08:02:38.331" v="172" actId="20577"/>
+        <pc:chgData name="Manaswini Ray" userId="451f23f8-43b4-4daa-9511-0c9fb98bad1c" providerId="ADAL" clId="{034AA59E-D954-44E8-84AB-C770C7EA240B}" dt="2023-09-12T18:03:59.773" v="886" actId="20577"/>
         <pc:sldMkLst>
           <pc:docMk/>
           <pc:sldMk cId="2287967513" sldId="355"/>
@@ -200,7 +200,7 @@
           </ac:spMkLst>
         </pc:spChg>
         <pc:spChg chg="add mod">
-          <ac:chgData name="Manaswini Ray" userId="451f23f8-43b4-4daa-9511-0c9fb98bad1c" providerId="ADAL" clId="{034AA59E-D954-44E8-84AB-C770C7EA240B}" dt="2023-09-11T08:01:55.191" v="118" actId="20577"/>
+          <ac:chgData name="Manaswini Ray" userId="451f23f8-43b4-4daa-9511-0c9fb98bad1c" providerId="ADAL" clId="{034AA59E-D954-44E8-84AB-C770C7EA240B}" dt="2023-09-12T18:03:59.773" v="886" actId="20577"/>
           <ac:spMkLst>
             <pc:docMk/>
             <pc:sldMk cId="2287967513" sldId="355"/>
@@ -10235,7 +10235,7 @@
           <a:p>
             <a:r>
               <a:rPr lang="en-US" dirty="0" err="1"/>
-              <a:t>ExpenseApproval</a:t>
+              <a:t>ApproveExpense</a:t>
             </a:r>
             <a:r>
               <a:rPr lang="en-US" dirty="0"/>

</xml_diff>

<commit_message>
Committed For Strategy Design Pattern
</commit_message>
<xml_diff>
--- a/UMLDiagrams.pptx
+++ b/UMLDiagrams.pptx
@@ -5,7 +5,7 @@
     <p:sldMasterId id="2147483648" r:id="rId1"/>
   </p:sldMasterIdLst>
   <p:notesMasterIdLst>
-    <p:notesMasterId r:id="rId18"/>
+    <p:notesMasterId r:id="rId19"/>
   </p:notesMasterIdLst>
   <p:sldIdLst>
     <p:sldId id="256" r:id="rId2"/>
@@ -24,6 +24,7 @@
     <p:sldId id="357" r:id="rId15"/>
     <p:sldId id="358" r:id="rId16"/>
     <p:sldId id="359" r:id="rId17"/>
+    <p:sldId id="360" r:id="rId18"/>
   </p:sldIdLst>
   <p:sldSz cx="12192000" cy="6858000"/>
   <p:notesSz cx="6858000" cy="9144000"/>
@@ -133,7 +134,7 @@
 <file path=ppt/revisionInfo.xml><?xml version="1.0" encoding="utf-8"?>
 <p1510:revInfo xmlns:a="http://schemas.openxmlformats.org/drawingml/2006/main" xmlns:r="http://schemas.openxmlformats.org/officeDocument/2006/relationships" xmlns:p1510="http://schemas.microsoft.com/office/powerpoint/2015/10/main">
   <p1510:revLst>
-    <p1510:client id="{034AA59E-D954-44E8-84AB-C770C7EA240B}" v="35" dt="2023-09-12T15:36:55.420"/>
+    <p1510:client id="{034AA59E-D954-44E8-84AB-C770C7EA240B}" v="37" dt="2023-09-13T10:45:01.163"/>
   </p1510:revLst>
 </p1510:revInfo>
 </file>
@@ -143,7 +144,7 @@
   <pc:docChgLst>
     <pc:chgData name="Manaswini Ray" userId="451f23f8-43b4-4daa-9511-0c9fb98bad1c" providerId="ADAL" clId="{034AA59E-D954-44E8-84AB-C770C7EA240B}"/>
     <pc:docChg chg="undo custSel addSld delSld modSld">
-      <pc:chgData name="Manaswini Ray" userId="451f23f8-43b4-4daa-9511-0c9fb98bad1c" providerId="ADAL" clId="{034AA59E-D954-44E8-84AB-C770C7EA240B}" dt="2023-09-12T18:03:59.773" v="886" actId="20577"/>
+      <pc:chgData name="Manaswini Ray" userId="451f23f8-43b4-4daa-9511-0c9fb98bad1c" providerId="ADAL" clId="{034AA59E-D954-44E8-84AB-C770C7EA240B}" dt="2023-09-13T10:45:29.047" v="1021" actId="20577"/>
       <pc:docMkLst>
         <pc:docMk/>
       </pc:docMkLst>
@@ -1385,6 +1386,197 @@
             <pc:docMk/>
             <pc:sldMk cId="276909994" sldId="359"/>
             <ac:cxnSpMk id="31" creationId="{D3614B25-D716-99F5-DAC4-7A29F4E53D25}"/>
+          </ac:cxnSpMkLst>
+        </pc:cxnChg>
+      </pc:sldChg>
+      <pc:sldChg chg="addSp modSp new mod">
+        <pc:chgData name="Manaswini Ray" userId="451f23f8-43b4-4daa-9511-0c9fb98bad1c" providerId="ADAL" clId="{034AA59E-D954-44E8-84AB-C770C7EA240B}" dt="2023-09-13T10:45:29.047" v="1021" actId="20577"/>
+        <pc:sldMkLst>
+          <pc:docMk/>
+          <pc:sldMk cId="3915814131" sldId="360"/>
+        </pc:sldMkLst>
+        <pc:spChg chg="add mod">
+          <ac:chgData name="Manaswini Ray" userId="451f23f8-43b4-4daa-9511-0c9fb98bad1c" providerId="ADAL" clId="{034AA59E-D954-44E8-84AB-C770C7EA240B}" dt="2023-09-13T10:41:07.993" v="896" actId="20577"/>
+          <ac:spMkLst>
+            <pc:docMk/>
+            <pc:sldMk cId="3915814131" sldId="360"/>
+            <ac:spMk id="2" creationId="{3FFFD708-42CC-60A0-DC30-AD272C845EA8}"/>
+          </ac:spMkLst>
+        </pc:spChg>
+        <pc:spChg chg="add mod">
+          <ac:chgData name="Manaswini Ray" userId="451f23f8-43b4-4daa-9511-0c9fb98bad1c" providerId="ADAL" clId="{034AA59E-D954-44E8-84AB-C770C7EA240B}" dt="2023-09-13T10:43:11.894" v="940" actId="14100"/>
+          <ac:spMkLst>
+            <pc:docMk/>
+            <pc:sldMk cId="3915814131" sldId="360"/>
+            <ac:spMk id="3" creationId="{9AB2EB6D-C79B-41F5-6FAF-6522384BBE93}"/>
+          </ac:spMkLst>
+        </pc:spChg>
+        <pc:spChg chg="add mod">
+          <ac:chgData name="Manaswini Ray" userId="451f23f8-43b4-4daa-9511-0c9fb98bad1c" providerId="ADAL" clId="{034AA59E-D954-44E8-84AB-C770C7EA240B}" dt="2023-09-13T10:41:03.714" v="888"/>
+          <ac:spMkLst>
+            <pc:docMk/>
+            <pc:sldMk cId="3915814131" sldId="360"/>
+            <ac:spMk id="5" creationId="{72E5852C-1F58-EF65-DE2E-1ADA3C721797}"/>
+          </ac:spMkLst>
+        </pc:spChg>
+        <pc:spChg chg="add mod">
+          <ac:chgData name="Manaswini Ray" userId="451f23f8-43b4-4daa-9511-0c9fb98bad1c" providerId="ADAL" clId="{034AA59E-D954-44E8-84AB-C770C7EA240B}" dt="2023-09-13T10:42:28.328" v="935" actId="20577"/>
+          <ac:spMkLst>
+            <pc:docMk/>
+            <pc:sldMk cId="3915814131" sldId="360"/>
+            <ac:spMk id="6" creationId="{55BEC3AC-9BC8-82BE-2AD3-8A052A6E7622}"/>
+          </ac:spMkLst>
+        </pc:spChg>
+        <pc:spChg chg="add mod">
+          <ac:chgData name="Manaswini Ray" userId="451f23f8-43b4-4daa-9511-0c9fb98bad1c" providerId="ADAL" clId="{034AA59E-D954-44E8-84AB-C770C7EA240B}" dt="2023-09-13T10:43:19.589" v="941" actId="14100"/>
+          <ac:spMkLst>
+            <pc:docMk/>
+            <pc:sldMk cId="3915814131" sldId="360"/>
+            <ac:spMk id="7" creationId="{37F74894-DF9F-0233-2F63-8E7552008CA8}"/>
+          </ac:spMkLst>
+        </pc:spChg>
+        <pc:spChg chg="add mod">
+          <ac:chgData name="Manaswini Ray" userId="451f23f8-43b4-4daa-9511-0c9fb98bad1c" providerId="ADAL" clId="{034AA59E-D954-44E8-84AB-C770C7EA240B}" dt="2023-09-13T10:41:03.714" v="888"/>
+          <ac:spMkLst>
+            <pc:docMk/>
+            <pc:sldMk cId="3915814131" sldId="360"/>
+            <ac:spMk id="8" creationId="{9985CF84-2526-6C25-109B-A1E2C0048244}"/>
+          </ac:spMkLst>
+        </pc:spChg>
+        <pc:spChg chg="add mod">
+          <ac:chgData name="Manaswini Ray" userId="451f23f8-43b4-4daa-9511-0c9fb98bad1c" providerId="ADAL" clId="{034AA59E-D954-44E8-84AB-C770C7EA240B}" dt="2023-09-13T10:41:56.898" v="920" actId="14100"/>
+          <ac:spMkLst>
+            <pc:docMk/>
+            <pc:sldMk cId="3915814131" sldId="360"/>
+            <ac:spMk id="9" creationId="{FA3EA33C-CC93-5A6D-38BF-E6207711E17A}"/>
+          </ac:spMkLst>
+        </pc:spChg>
+        <pc:spChg chg="add mod">
+          <ac:chgData name="Manaswini Ray" userId="451f23f8-43b4-4daa-9511-0c9fb98bad1c" providerId="ADAL" clId="{034AA59E-D954-44E8-84AB-C770C7EA240B}" dt="2023-09-13T10:41:30.703" v="917" actId="20577"/>
+          <ac:spMkLst>
+            <pc:docMk/>
+            <pc:sldMk cId="3915814131" sldId="360"/>
+            <ac:spMk id="11" creationId="{181966D9-9F7B-41F4-AA2A-EEEF8CEA7E06}"/>
+          </ac:spMkLst>
+        </pc:spChg>
+        <pc:spChg chg="add mod">
+          <ac:chgData name="Manaswini Ray" userId="451f23f8-43b4-4daa-9511-0c9fb98bad1c" providerId="ADAL" clId="{034AA59E-D954-44E8-84AB-C770C7EA240B}" dt="2023-09-13T10:43:38.737" v="944" actId="207"/>
+          <ac:spMkLst>
+            <pc:docMk/>
+            <pc:sldMk cId="3915814131" sldId="360"/>
+            <ac:spMk id="12" creationId="{AE8C5707-84E7-5F7B-C038-1EDFEFC90250}"/>
+          </ac:spMkLst>
+        </pc:spChg>
+        <pc:spChg chg="add mod">
+          <ac:chgData name="Manaswini Ray" userId="451f23f8-43b4-4daa-9511-0c9fb98bad1c" providerId="ADAL" clId="{034AA59E-D954-44E8-84AB-C770C7EA240B}" dt="2023-09-13T10:44:36.735" v="971" actId="20577"/>
+          <ac:spMkLst>
+            <pc:docMk/>
+            <pc:sldMk cId="3915814131" sldId="360"/>
+            <ac:spMk id="14" creationId="{0C5AE01F-464E-71D3-697A-77F40A94F056}"/>
+          </ac:spMkLst>
+        </pc:spChg>
+        <pc:spChg chg="add mod">
+          <ac:chgData name="Manaswini Ray" userId="451f23f8-43b4-4daa-9511-0c9fb98bad1c" providerId="ADAL" clId="{034AA59E-D954-44E8-84AB-C770C7EA240B}" dt="2023-09-13T10:41:03.714" v="888"/>
+          <ac:spMkLst>
+            <pc:docMk/>
+            <pc:sldMk cId="3915814131" sldId="360"/>
+            <ac:spMk id="15" creationId="{B4A369D3-3C23-81B6-5F7A-5DA14BF4C07D}"/>
+          </ac:spMkLst>
+        </pc:spChg>
+        <pc:spChg chg="add mod">
+          <ac:chgData name="Manaswini Ray" userId="451f23f8-43b4-4daa-9511-0c9fb98bad1c" providerId="ADAL" clId="{034AA59E-D954-44E8-84AB-C770C7EA240B}" dt="2023-09-13T10:44:55.556" v="1005" actId="1076"/>
+          <ac:spMkLst>
+            <pc:docMk/>
+            <pc:sldMk cId="3915814131" sldId="360"/>
+            <ac:spMk id="16" creationId="{D9E5380A-3790-41EA-E2D4-ED09DA342162}"/>
+          </ac:spMkLst>
+        </pc:spChg>
+        <pc:spChg chg="add mod">
+          <ac:chgData name="Manaswini Ray" userId="451f23f8-43b4-4daa-9511-0c9fb98bad1c" providerId="ADAL" clId="{034AA59E-D954-44E8-84AB-C770C7EA240B}" dt="2023-09-13T10:41:03.714" v="888"/>
+          <ac:spMkLst>
+            <pc:docMk/>
+            <pc:sldMk cId="3915814131" sldId="360"/>
+            <ac:spMk id="17" creationId="{CCB98DF0-B42A-6E0B-2A96-6505A875815C}"/>
+          </ac:spMkLst>
+        </pc:spChg>
+        <pc:spChg chg="add mod">
+          <ac:chgData name="Manaswini Ray" userId="451f23f8-43b4-4daa-9511-0c9fb98bad1c" providerId="ADAL" clId="{034AA59E-D954-44E8-84AB-C770C7EA240B}" dt="2023-09-13T10:45:21.054" v="1017" actId="14100"/>
+          <ac:spMkLst>
+            <pc:docMk/>
+            <pc:sldMk cId="3915814131" sldId="360"/>
+            <ac:spMk id="35" creationId="{6701FEDD-B8D6-F7B1-9884-492A7B850956}"/>
+          </ac:spMkLst>
+        </pc:spChg>
+        <pc:spChg chg="add mod">
+          <ac:chgData name="Manaswini Ray" userId="451f23f8-43b4-4daa-9511-0c9fb98bad1c" providerId="ADAL" clId="{034AA59E-D954-44E8-84AB-C770C7EA240B}" dt="2023-09-13T10:45:04.446" v="1007" actId="1076"/>
+          <ac:spMkLst>
+            <pc:docMk/>
+            <pc:sldMk cId="3915814131" sldId="360"/>
+            <ac:spMk id="36" creationId="{520E9B03-D05E-BAA2-CEFC-E5B6586F64D2}"/>
+          </ac:spMkLst>
+        </pc:spChg>
+        <pc:spChg chg="add mod">
+          <ac:chgData name="Manaswini Ray" userId="451f23f8-43b4-4daa-9511-0c9fb98bad1c" providerId="ADAL" clId="{034AA59E-D954-44E8-84AB-C770C7EA240B}" dt="2023-09-13T10:45:29.047" v="1021" actId="20577"/>
+          <ac:spMkLst>
+            <pc:docMk/>
+            <pc:sldMk cId="3915814131" sldId="360"/>
+            <ac:spMk id="37" creationId="{AF5B8F7A-DCAB-6BA4-11BD-E5265A679449}"/>
+          </ac:spMkLst>
+        </pc:spChg>
+        <pc:spChg chg="add mod">
+          <ac:chgData name="Manaswini Ray" userId="451f23f8-43b4-4daa-9511-0c9fb98bad1c" providerId="ADAL" clId="{034AA59E-D954-44E8-84AB-C770C7EA240B}" dt="2023-09-13T10:45:04.446" v="1007" actId="1076"/>
+          <ac:spMkLst>
+            <pc:docMk/>
+            <pc:sldMk cId="3915814131" sldId="360"/>
+            <ac:spMk id="38" creationId="{52FE1A19-7758-17EA-46EE-17246BC389B3}"/>
+          </ac:spMkLst>
+        </pc:spChg>
+        <pc:cxnChg chg="add mod">
+          <ac:chgData name="Manaswini Ray" userId="451f23f8-43b4-4daa-9511-0c9fb98bad1c" providerId="ADAL" clId="{034AA59E-D954-44E8-84AB-C770C7EA240B}" dt="2023-09-13T10:43:26.974" v="942" actId="14100"/>
+          <ac:cxnSpMkLst>
+            <pc:docMk/>
+            <pc:sldMk cId="3915814131" sldId="360"/>
+            <ac:cxnSpMk id="4" creationId="{65B3E460-9AAE-D170-2D27-45D43855F183}"/>
+          </ac:cxnSpMkLst>
+        </pc:cxnChg>
+        <pc:cxnChg chg="add mod">
+          <ac:chgData name="Manaswini Ray" userId="451f23f8-43b4-4daa-9511-0c9fb98bad1c" providerId="ADAL" clId="{034AA59E-D954-44E8-84AB-C770C7EA240B}" dt="2023-09-13T10:41:03.714" v="888"/>
+          <ac:cxnSpMkLst>
+            <pc:docMk/>
+            <pc:sldMk cId="3915814131" sldId="360"/>
+            <ac:cxnSpMk id="10" creationId="{C2AF493B-A3D3-ABA8-3415-6CEB2B6B39FB}"/>
+          </ac:cxnSpMkLst>
+        </pc:cxnChg>
+        <pc:cxnChg chg="add mod">
+          <ac:chgData name="Manaswini Ray" userId="451f23f8-43b4-4daa-9511-0c9fb98bad1c" providerId="ADAL" clId="{034AA59E-D954-44E8-84AB-C770C7EA240B}" dt="2023-09-13T10:43:11.894" v="940" actId="14100"/>
+          <ac:cxnSpMkLst>
+            <pc:docMk/>
+            <pc:sldMk cId="3915814131" sldId="360"/>
+            <ac:cxnSpMk id="13" creationId="{0C7B6316-526A-3EE8-445B-FDC0D22A5D0D}"/>
+          </ac:cxnSpMkLst>
+        </pc:cxnChg>
+        <pc:cxnChg chg="add mod">
+          <ac:chgData name="Manaswini Ray" userId="451f23f8-43b4-4daa-9511-0c9fb98bad1c" providerId="ADAL" clId="{034AA59E-D954-44E8-84AB-C770C7EA240B}" dt="2023-09-13T10:44:27.478" v="948" actId="14100"/>
+          <ac:cxnSpMkLst>
+            <pc:docMk/>
+            <pc:sldMk cId="3915814131" sldId="360"/>
+            <ac:cxnSpMk id="18" creationId="{F88C3840-719C-9FB2-F54C-4B29D97BB088}"/>
+          </ac:cxnSpMkLst>
+        </pc:cxnChg>
+        <pc:cxnChg chg="add mod">
+          <ac:chgData name="Manaswini Ray" userId="451f23f8-43b4-4daa-9511-0c9fb98bad1c" providerId="ADAL" clId="{034AA59E-D954-44E8-84AB-C770C7EA240B}" dt="2023-09-13T10:44:21.567" v="947" actId="14100"/>
+          <ac:cxnSpMkLst>
+            <pc:docMk/>
+            <pc:sldMk cId="3915814131" sldId="360"/>
+            <ac:cxnSpMk id="19" creationId="{2CC5B049-CC97-CA52-2E1B-4CDDDBFB90FC}"/>
+          </ac:cxnSpMkLst>
+        </pc:cxnChg>
+        <pc:cxnChg chg="add mod">
+          <ac:chgData name="Manaswini Ray" userId="451f23f8-43b4-4daa-9511-0c9fb98bad1c" providerId="ADAL" clId="{034AA59E-D954-44E8-84AB-C770C7EA240B}" dt="2023-09-13T10:44:05.698" v="946" actId="14100"/>
+          <ac:cxnSpMkLst>
+            <pc:docMk/>
+            <pc:sldMk cId="3915814131" sldId="360"/>
+            <ac:cxnSpMk id="20" creationId="{B1AFC1C3-4EE2-C261-D00F-889440E94B5E}"/>
           </ac:cxnSpMkLst>
         </pc:cxnChg>
       </pc:sldChg>
@@ -15543,6 +15735,1217 @@
     <p:extLst>
       <p:ext uri="{BB962C8B-B14F-4D97-AF65-F5344CB8AC3E}">
         <p14:creationId xmlns:p14="http://schemas.microsoft.com/office/powerpoint/2010/main" val="276909994"/>
+      </p:ext>
+    </p:extLst>
+  </p:cSld>
+  <p:clrMapOvr>
+    <a:masterClrMapping/>
+  </p:clrMapOvr>
+</p:sld>
+</file>
+
+<file path=ppt/slides/slide17.xml><?xml version="1.0" encoding="utf-8"?>
+<p:sld xmlns:a="http://schemas.openxmlformats.org/drawingml/2006/main" xmlns:r="http://schemas.openxmlformats.org/officeDocument/2006/relationships" xmlns:p="http://schemas.openxmlformats.org/presentationml/2006/main">
+  <p:cSld>
+    <p:spTree>
+      <p:nvGrpSpPr>
+        <p:cNvPr id="1" name=""/>
+        <p:cNvGrpSpPr/>
+        <p:nvPr/>
+      </p:nvGrpSpPr>
+      <p:grpSpPr>
+        <a:xfrm>
+          <a:off x="0" y="0"/>
+          <a:ext cx="0" cy="0"/>
+          <a:chOff x="0" y="0"/>
+          <a:chExt cx="0" cy="0"/>
+        </a:xfrm>
+      </p:grpSpPr>
+      <p:sp>
+        <p:nvSpPr>
+          <p:cNvPr id="2" name="TextBox 1">
+            <a:extLst>
+              <a:ext uri="{FF2B5EF4-FFF2-40B4-BE49-F238E27FC236}">
+                <a16:creationId xmlns:a16="http://schemas.microsoft.com/office/drawing/2014/main" id="{3FFFD708-42CC-60A0-DC30-AD272C845EA8}"/>
+              </a:ext>
+            </a:extLst>
+          </p:cNvPr>
+          <p:cNvSpPr txBox="1"/>
+          <p:nvPr/>
+        </p:nvSpPr>
+        <p:spPr>
+          <a:xfrm>
+            <a:off x="252248" y="393403"/>
+            <a:ext cx="6138040" cy="400110"/>
+          </a:xfrm>
+          <a:prstGeom prst="rect">
+            <a:avLst/>
+          </a:prstGeom>
+          <a:noFill/>
+        </p:spPr>
+        <p:txBody>
+          <a:bodyPr wrap="square">
+            <a:spAutoFit/>
+          </a:bodyPr>
+          <a:lstStyle/>
+          <a:p>
+            <a:r>
+              <a:rPr lang="en-US" sz="2000" b="1" u="sng" dirty="0" err="1">
+                <a:solidFill>
+                  <a:srgbClr val="000000"/>
+                </a:solidFill>
+              </a:rPr>
+              <a:t>Startegy</a:t>
+            </a:r>
+            <a:r>
+              <a:rPr lang="en-US" sz="2000" b="1" u="sng" dirty="0">
+                <a:solidFill>
+                  <a:srgbClr val="000000"/>
+                </a:solidFill>
+              </a:rPr>
+              <a:t> </a:t>
+            </a:r>
+            <a:r>
+              <a:rPr lang="en-IN" sz="2000" b="1" u="sng" dirty="0">
+                <a:solidFill>
+                  <a:srgbClr val="000000"/>
+                </a:solidFill>
+              </a:rPr>
+              <a:t>Design Pattern</a:t>
+            </a:r>
+            <a:endParaRPr lang="en-IN" sz="2000" b="1" u="sng" dirty="0"/>
+          </a:p>
+        </p:txBody>
+      </p:sp>
+      <p:sp>
+        <p:nvSpPr>
+          <p:cNvPr id="3" name="Rectangle 2">
+            <a:extLst>
+              <a:ext uri="{FF2B5EF4-FFF2-40B4-BE49-F238E27FC236}">
+                <a16:creationId xmlns:a16="http://schemas.microsoft.com/office/drawing/2014/main" id="{9AB2EB6D-C79B-41F5-6FAF-6522384BBE93}"/>
+              </a:ext>
+            </a:extLst>
+          </p:cNvPr>
+          <p:cNvSpPr/>
+          <p:nvPr/>
+        </p:nvSpPr>
+        <p:spPr>
+          <a:xfrm>
+            <a:off x="2401556" y="1579830"/>
+            <a:ext cx="3338291" cy="2102496"/>
+          </a:xfrm>
+          <a:prstGeom prst="rect">
+            <a:avLst/>
+          </a:prstGeom>
+          <a:noFill/>
+          <a:ln>
+            <a:solidFill>
+              <a:schemeClr val="bg2">
+                <a:lumMod val="10000"/>
+              </a:schemeClr>
+            </a:solidFill>
+          </a:ln>
+        </p:spPr>
+        <p:style>
+          <a:lnRef idx="2">
+            <a:schemeClr val="accent1">
+              <a:shade val="50000"/>
+            </a:schemeClr>
+          </a:lnRef>
+          <a:fillRef idx="1">
+            <a:schemeClr val="accent1"/>
+          </a:fillRef>
+          <a:effectRef idx="0">
+            <a:schemeClr val="accent1"/>
+          </a:effectRef>
+          <a:fontRef idx="minor">
+            <a:schemeClr val="lt1"/>
+          </a:fontRef>
+        </p:style>
+        <p:txBody>
+          <a:bodyPr rtlCol="0" anchor="ctr"/>
+          <a:lstStyle/>
+          <a:p>
+            <a:pPr algn="ctr"/>
+            <a:endParaRPr lang="en-IN"/>
+          </a:p>
+        </p:txBody>
+      </p:sp>
+      <p:cxnSp>
+        <p:nvCxnSpPr>
+          <p:cNvPr id="4" name="Straight Connector 3">
+            <a:extLst>
+              <a:ext uri="{FF2B5EF4-FFF2-40B4-BE49-F238E27FC236}">
+                <a16:creationId xmlns:a16="http://schemas.microsoft.com/office/drawing/2014/main" id="{65B3E460-9AAE-D170-2D27-45D43855F183}"/>
+              </a:ext>
+            </a:extLst>
+          </p:cNvPr>
+          <p:cNvCxnSpPr>
+            <a:cxnSpLocks/>
+          </p:cNvCxnSpPr>
+          <p:nvPr/>
+        </p:nvCxnSpPr>
+        <p:spPr>
+          <a:xfrm flipV="1">
+            <a:off x="2401556" y="2237170"/>
+            <a:ext cx="3338291" cy="19662"/>
+          </a:xfrm>
+          <a:prstGeom prst="line">
+            <a:avLst/>
+          </a:prstGeom>
+          <a:ln>
+            <a:solidFill>
+              <a:schemeClr val="tx1">
+                <a:lumMod val="95000"/>
+                <a:lumOff val="5000"/>
+              </a:schemeClr>
+            </a:solidFill>
+          </a:ln>
+        </p:spPr>
+        <p:style>
+          <a:lnRef idx="1">
+            <a:schemeClr val="accent1"/>
+          </a:lnRef>
+          <a:fillRef idx="0">
+            <a:schemeClr val="accent1"/>
+          </a:fillRef>
+          <a:effectRef idx="0">
+            <a:schemeClr val="accent1"/>
+          </a:effectRef>
+          <a:fontRef idx="minor">
+            <a:schemeClr val="tx1"/>
+          </a:fontRef>
+        </p:style>
+      </p:cxnSp>
+      <p:sp>
+        <p:nvSpPr>
+          <p:cNvPr id="5" name="TextBox 4">
+            <a:extLst>
+              <a:ext uri="{FF2B5EF4-FFF2-40B4-BE49-F238E27FC236}">
+                <a16:creationId xmlns:a16="http://schemas.microsoft.com/office/drawing/2014/main" id="{72E5852C-1F58-EF65-DE2E-1ADA3C721797}"/>
+              </a:ext>
+            </a:extLst>
+          </p:cNvPr>
+          <p:cNvSpPr txBox="1"/>
+          <p:nvPr/>
+        </p:nvSpPr>
+        <p:spPr>
+          <a:xfrm>
+            <a:off x="583216" y="1332637"/>
+            <a:ext cx="1373138" cy="369332"/>
+          </a:xfrm>
+          <a:prstGeom prst="rect">
+            <a:avLst/>
+          </a:prstGeom>
+          <a:noFill/>
+        </p:spPr>
+        <p:txBody>
+          <a:bodyPr wrap="square" rtlCol="0">
+            <a:spAutoFit/>
+          </a:bodyPr>
+          <a:lstStyle/>
+          <a:p>
+            <a:r>
+              <a:rPr lang="en-US" dirty="0"/>
+              <a:t>Client</a:t>
+            </a:r>
+            <a:endParaRPr lang="en-IN" dirty="0"/>
+          </a:p>
+        </p:txBody>
+      </p:sp>
+      <p:sp>
+        <p:nvSpPr>
+          <p:cNvPr id="6" name="TextBox 5">
+            <a:extLst>
+              <a:ext uri="{FF2B5EF4-FFF2-40B4-BE49-F238E27FC236}">
+                <a16:creationId xmlns:a16="http://schemas.microsoft.com/office/drawing/2014/main" id="{55BEC3AC-9BC8-82BE-2AD3-8A052A6E7622}"/>
+              </a:ext>
+            </a:extLst>
+          </p:cNvPr>
+          <p:cNvSpPr txBox="1"/>
+          <p:nvPr/>
+        </p:nvSpPr>
+        <p:spPr>
+          <a:xfrm>
+            <a:off x="2748168" y="1701969"/>
+            <a:ext cx="2613993" cy="369332"/>
+          </a:xfrm>
+          <a:prstGeom prst="rect">
+            <a:avLst/>
+          </a:prstGeom>
+          <a:noFill/>
+        </p:spPr>
+        <p:txBody>
+          <a:bodyPr wrap="square" rtlCol="0">
+            <a:spAutoFit/>
+          </a:bodyPr>
+          <a:lstStyle/>
+          <a:p>
+            <a:r>
+              <a:rPr lang="en-US" dirty="0" err="1"/>
+              <a:t>ITravelContext</a:t>
+            </a:r>
+            <a:endParaRPr lang="en-IN" dirty="0"/>
+          </a:p>
+        </p:txBody>
+      </p:sp>
+      <p:sp>
+        <p:nvSpPr>
+          <p:cNvPr id="7" name="TextBox 6">
+            <a:extLst>
+              <a:ext uri="{FF2B5EF4-FFF2-40B4-BE49-F238E27FC236}">
+                <a16:creationId xmlns:a16="http://schemas.microsoft.com/office/drawing/2014/main" id="{37F74894-DF9F-0233-2F63-8E7552008CA8}"/>
+              </a:ext>
+            </a:extLst>
+          </p:cNvPr>
+          <p:cNvSpPr txBox="1"/>
+          <p:nvPr/>
+        </p:nvSpPr>
+        <p:spPr>
+          <a:xfrm>
+            <a:off x="2401556" y="2321356"/>
+            <a:ext cx="3338291" cy="830997"/>
+          </a:xfrm>
+          <a:prstGeom prst="rect">
+            <a:avLst/>
+          </a:prstGeom>
+          <a:noFill/>
+        </p:spPr>
+        <p:txBody>
+          <a:bodyPr wrap="square" rtlCol="0">
+            <a:spAutoFit/>
+          </a:bodyPr>
+          <a:lstStyle/>
+          <a:p>
+            <a:r>
+              <a:rPr lang="en-IN" sz="1600" dirty="0">
+                <a:solidFill>
+                  <a:schemeClr val="tx1">
+                    <a:lumMod val="95000"/>
+                    <a:lumOff val="5000"/>
+                  </a:schemeClr>
+                </a:solidFill>
+              </a:rPr>
+              <a:t>void </a:t>
+            </a:r>
+            <a:r>
+              <a:rPr lang="en-IN" sz="1600" dirty="0" err="1">
+                <a:solidFill>
+                  <a:schemeClr val="tx1">
+                    <a:lumMod val="95000"/>
+                    <a:lumOff val="5000"/>
+                  </a:schemeClr>
+                </a:solidFill>
+              </a:rPr>
+              <a:t>SetTravelStartegy</a:t>
+            </a:r>
+            <a:r>
+              <a:rPr lang="en-IN" sz="1600" dirty="0">
+                <a:solidFill>
+                  <a:schemeClr val="tx1">
+                    <a:lumMod val="95000"/>
+                    <a:lumOff val="5000"/>
+                  </a:schemeClr>
+                </a:solidFill>
+              </a:rPr>
+              <a:t>(</a:t>
+            </a:r>
+            <a:r>
+              <a:rPr lang="en-IN" sz="1600" dirty="0" err="1">
+                <a:solidFill>
+                  <a:schemeClr val="tx1">
+                    <a:lumMod val="95000"/>
+                    <a:lumOff val="5000"/>
+                  </a:schemeClr>
+                </a:solidFill>
+              </a:rPr>
+              <a:t>ITravelStrategy</a:t>
+            </a:r>
+            <a:r>
+              <a:rPr lang="en-IN" sz="1600" dirty="0">
+                <a:solidFill>
+                  <a:schemeClr val="tx1">
+                    <a:lumMod val="95000"/>
+                    <a:lumOff val="5000"/>
+                  </a:schemeClr>
+                </a:solidFill>
+              </a:rPr>
+              <a:t> </a:t>
+            </a:r>
+            <a:r>
+              <a:rPr lang="en-IN" sz="1600" dirty="0" err="1">
+                <a:solidFill>
+                  <a:schemeClr val="tx1">
+                    <a:lumMod val="95000"/>
+                    <a:lumOff val="5000"/>
+                  </a:schemeClr>
+                </a:solidFill>
+              </a:rPr>
+              <a:t>travelStrategy</a:t>
+            </a:r>
+            <a:r>
+              <a:rPr lang="en-IN" sz="1600" dirty="0">
+                <a:solidFill>
+                  <a:schemeClr val="tx1">
+                    <a:lumMod val="95000"/>
+                    <a:lumOff val="5000"/>
+                  </a:schemeClr>
+                </a:solidFill>
+              </a:rPr>
+              <a:t>);</a:t>
+            </a:r>
+          </a:p>
+          <a:p>
+            <a:r>
+              <a:rPr lang="en-IN" sz="1600" dirty="0">
+                <a:solidFill>
+                  <a:schemeClr val="tx1">
+                    <a:lumMod val="95000"/>
+                    <a:lumOff val="5000"/>
+                  </a:schemeClr>
+                </a:solidFill>
+              </a:rPr>
+              <a:t>string </a:t>
+            </a:r>
+            <a:r>
+              <a:rPr lang="en-IN" sz="1600" dirty="0" err="1">
+                <a:solidFill>
+                  <a:schemeClr val="tx1">
+                    <a:lumMod val="95000"/>
+                    <a:lumOff val="5000"/>
+                  </a:schemeClr>
+                </a:solidFill>
+              </a:rPr>
+              <a:t>TravelToCollege</a:t>
+            </a:r>
+            <a:r>
+              <a:rPr lang="en-IN" sz="1600" dirty="0">
+                <a:solidFill>
+                  <a:schemeClr val="tx1">
+                    <a:lumMod val="95000"/>
+                    <a:lumOff val="5000"/>
+                  </a:schemeClr>
+                </a:solidFill>
+              </a:rPr>
+              <a:t>();</a:t>
+            </a:r>
+            <a:endParaRPr lang="en-US" sz="1600" dirty="0">
+              <a:solidFill>
+                <a:schemeClr val="tx1">
+                  <a:lumMod val="95000"/>
+                  <a:lumOff val="5000"/>
+                </a:schemeClr>
+              </a:solidFill>
+            </a:endParaRPr>
+          </a:p>
+        </p:txBody>
+      </p:sp>
+      <p:sp>
+        <p:nvSpPr>
+          <p:cNvPr id="8" name="Rectangle 7">
+            <a:extLst>
+              <a:ext uri="{FF2B5EF4-FFF2-40B4-BE49-F238E27FC236}">
+                <a16:creationId xmlns:a16="http://schemas.microsoft.com/office/drawing/2014/main" id="{9985CF84-2526-6C25-109B-A1E2C0048244}"/>
+              </a:ext>
+            </a:extLst>
+          </p:cNvPr>
+          <p:cNvSpPr/>
+          <p:nvPr/>
+        </p:nvSpPr>
+        <p:spPr>
+          <a:xfrm>
+            <a:off x="252248" y="1147106"/>
+            <a:ext cx="2051975" cy="765777"/>
+          </a:xfrm>
+          <a:prstGeom prst="rect">
+            <a:avLst/>
+          </a:prstGeom>
+          <a:noFill/>
+          <a:ln>
+            <a:solidFill>
+              <a:schemeClr val="bg2">
+                <a:lumMod val="10000"/>
+              </a:schemeClr>
+            </a:solidFill>
+          </a:ln>
+        </p:spPr>
+        <p:style>
+          <a:lnRef idx="2">
+            <a:schemeClr val="accent1">
+              <a:shade val="50000"/>
+            </a:schemeClr>
+          </a:lnRef>
+          <a:fillRef idx="1">
+            <a:schemeClr val="accent1"/>
+          </a:fillRef>
+          <a:effectRef idx="0">
+            <a:schemeClr val="accent1"/>
+          </a:effectRef>
+          <a:fontRef idx="minor">
+            <a:schemeClr val="lt1"/>
+          </a:fontRef>
+        </p:style>
+        <p:txBody>
+          <a:bodyPr rtlCol="0" anchor="ctr"/>
+          <a:lstStyle/>
+          <a:p>
+            <a:pPr algn="ctr"/>
+            <a:endParaRPr lang="en-IN"/>
+          </a:p>
+        </p:txBody>
+      </p:sp>
+      <p:sp>
+        <p:nvSpPr>
+          <p:cNvPr id="9" name="Rectangle 8">
+            <a:extLst>
+              <a:ext uri="{FF2B5EF4-FFF2-40B4-BE49-F238E27FC236}">
+                <a16:creationId xmlns:a16="http://schemas.microsoft.com/office/drawing/2014/main" id="{FA3EA33C-CC93-5A6D-38BF-E6207711E17A}"/>
+              </a:ext>
+            </a:extLst>
+          </p:cNvPr>
+          <p:cNvSpPr/>
+          <p:nvPr/>
+        </p:nvSpPr>
+        <p:spPr>
+          <a:xfrm>
+            <a:off x="2616789" y="4226570"/>
+            <a:ext cx="3653382" cy="1858921"/>
+          </a:xfrm>
+          <a:prstGeom prst="rect">
+            <a:avLst/>
+          </a:prstGeom>
+          <a:noFill/>
+          <a:ln>
+            <a:solidFill>
+              <a:schemeClr val="bg2">
+                <a:lumMod val="10000"/>
+              </a:schemeClr>
+            </a:solidFill>
+          </a:ln>
+        </p:spPr>
+        <p:style>
+          <a:lnRef idx="2">
+            <a:schemeClr val="accent1">
+              <a:shade val="50000"/>
+            </a:schemeClr>
+          </a:lnRef>
+          <a:fillRef idx="1">
+            <a:schemeClr val="accent1"/>
+          </a:fillRef>
+          <a:effectRef idx="0">
+            <a:schemeClr val="accent1"/>
+          </a:effectRef>
+          <a:fontRef idx="minor">
+            <a:schemeClr val="lt1"/>
+          </a:fontRef>
+        </p:style>
+        <p:txBody>
+          <a:bodyPr rtlCol="0" anchor="ctr"/>
+          <a:lstStyle/>
+          <a:p>
+            <a:pPr algn="ctr"/>
+            <a:endParaRPr lang="en-IN"/>
+          </a:p>
+        </p:txBody>
+      </p:sp>
+      <p:cxnSp>
+        <p:nvCxnSpPr>
+          <p:cNvPr id="10" name="Straight Connector 9">
+            <a:extLst>
+              <a:ext uri="{FF2B5EF4-FFF2-40B4-BE49-F238E27FC236}">
+                <a16:creationId xmlns:a16="http://schemas.microsoft.com/office/drawing/2014/main" id="{C2AF493B-A3D3-ABA8-3415-6CEB2B6B39FB}"/>
+              </a:ext>
+            </a:extLst>
+          </p:cNvPr>
+          <p:cNvCxnSpPr>
+            <a:cxnSpLocks/>
+          </p:cNvCxnSpPr>
+          <p:nvPr/>
+        </p:nvCxnSpPr>
+        <p:spPr>
+          <a:xfrm>
+            <a:off x="2616789" y="4883910"/>
+            <a:ext cx="2991679" cy="0"/>
+          </a:xfrm>
+          <a:prstGeom prst="line">
+            <a:avLst/>
+          </a:prstGeom>
+          <a:ln>
+            <a:solidFill>
+              <a:schemeClr val="tx1">
+                <a:lumMod val="95000"/>
+                <a:lumOff val="5000"/>
+              </a:schemeClr>
+            </a:solidFill>
+          </a:ln>
+        </p:spPr>
+        <p:style>
+          <a:lnRef idx="1">
+            <a:schemeClr val="accent1"/>
+          </a:lnRef>
+          <a:fillRef idx="0">
+            <a:schemeClr val="accent1"/>
+          </a:fillRef>
+          <a:effectRef idx="0">
+            <a:schemeClr val="accent1"/>
+          </a:effectRef>
+          <a:fontRef idx="minor">
+            <a:schemeClr val="tx1"/>
+          </a:fontRef>
+        </p:style>
+      </p:cxnSp>
+      <p:sp>
+        <p:nvSpPr>
+          <p:cNvPr id="11" name="TextBox 10">
+            <a:extLst>
+              <a:ext uri="{FF2B5EF4-FFF2-40B4-BE49-F238E27FC236}">
+                <a16:creationId xmlns:a16="http://schemas.microsoft.com/office/drawing/2014/main" id="{181966D9-9F7B-41F4-AA2A-EEEF8CEA7E06}"/>
+              </a:ext>
+            </a:extLst>
+          </p:cNvPr>
+          <p:cNvSpPr txBox="1"/>
+          <p:nvPr/>
+        </p:nvSpPr>
+        <p:spPr>
+          <a:xfrm>
+            <a:off x="2616789" y="4348709"/>
+            <a:ext cx="2613993" cy="369332"/>
+          </a:xfrm>
+          <a:prstGeom prst="rect">
+            <a:avLst/>
+          </a:prstGeom>
+          <a:noFill/>
+        </p:spPr>
+        <p:txBody>
+          <a:bodyPr wrap="square" rtlCol="0">
+            <a:spAutoFit/>
+          </a:bodyPr>
+          <a:lstStyle/>
+          <a:p>
+            <a:r>
+              <a:rPr lang="en-US" dirty="0" err="1"/>
+              <a:t>ITravelStrategy</a:t>
+            </a:r>
+            <a:endParaRPr lang="en-IN" dirty="0"/>
+          </a:p>
+        </p:txBody>
+      </p:sp>
+      <p:sp>
+        <p:nvSpPr>
+          <p:cNvPr id="12" name="TextBox 11">
+            <a:extLst>
+              <a:ext uri="{FF2B5EF4-FFF2-40B4-BE49-F238E27FC236}">
+                <a16:creationId xmlns:a16="http://schemas.microsoft.com/office/drawing/2014/main" id="{AE8C5707-84E7-5F7B-C038-1EDFEFC90250}"/>
+              </a:ext>
+            </a:extLst>
+          </p:cNvPr>
+          <p:cNvSpPr txBox="1"/>
+          <p:nvPr/>
+        </p:nvSpPr>
+        <p:spPr>
+          <a:xfrm>
+            <a:off x="2616789" y="5054594"/>
+            <a:ext cx="3211255" cy="369332"/>
+          </a:xfrm>
+          <a:prstGeom prst="rect">
+            <a:avLst/>
+          </a:prstGeom>
+          <a:noFill/>
+        </p:spPr>
+        <p:txBody>
+          <a:bodyPr wrap="square" rtlCol="0">
+            <a:spAutoFit/>
+          </a:bodyPr>
+          <a:lstStyle/>
+          <a:p>
+            <a:r>
+              <a:rPr lang="en-IN" sz="1800" dirty="0">
+                <a:solidFill>
+                  <a:schemeClr val="tx1">
+                    <a:lumMod val="95000"/>
+                    <a:lumOff val="5000"/>
+                  </a:schemeClr>
+                </a:solidFill>
+              </a:rPr>
+              <a:t>string </a:t>
+            </a:r>
+            <a:r>
+              <a:rPr lang="en-IN" sz="1800" dirty="0" err="1">
+                <a:solidFill>
+                  <a:schemeClr val="tx1">
+                    <a:lumMod val="95000"/>
+                    <a:lumOff val="5000"/>
+                  </a:schemeClr>
+                </a:solidFill>
+              </a:rPr>
+              <a:t>TravelToCollege</a:t>
+            </a:r>
+            <a:r>
+              <a:rPr lang="en-IN" sz="1800" dirty="0">
+                <a:solidFill>
+                  <a:schemeClr val="tx1">
+                    <a:lumMod val="95000"/>
+                    <a:lumOff val="5000"/>
+                  </a:schemeClr>
+                </a:solidFill>
+              </a:rPr>
+              <a:t>();</a:t>
+            </a:r>
+            <a:endParaRPr lang="en-US" dirty="0">
+              <a:solidFill>
+                <a:schemeClr val="tx1">
+                  <a:lumMod val="95000"/>
+                  <a:lumOff val="5000"/>
+                </a:schemeClr>
+              </a:solidFill>
+            </a:endParaRPr>
+          </a:p>
+        </p:txBody>
+      </p:sp>
+      <p:cxnSp>
+        <p:nvCxnSpPr>
+          <p:cNvPr id="13" name="Straight Arrow Connector 17">
+            <a:extLst>
+              <a:ext uri="{FF2B5EF4-FFF2-40B4-BE49-F238E27FC236}">
+                <a16:creationId xmlns:a16="http://schemas.microsoft.com/office/drawing/2014/main" id="{0C7B6316-526A-3EE8-445B-FDC0D22A5D0D}"/>
+              </a:ext>
+            </a:extLst>
+          </p:cNvPr>
+          <p:cNvCxnSpPr>
+            <a:cxnSpLocks/>
+            <a:stCxn id="3" idx="3"/>
+            <a:endCxn id="9" idx="0"/>
+          </p:cNvCxnSpPr>
+          <p:nvPr/>
+        </p:nvCxnSpPr>
+        <p:spPr>
+          <a:xfrm flipH="1">
+            <a:off x="4443480" y="2631078"/>
+            <a:ext cx="1296367" cy="1595492"/>
+          </a:xfrm>
+          <a:prstGeom prst="bentConnector4">
+            <a:avLst>
+              <a:gd name="adj1" fmla="val -17634"/>
+              <a:gd name="adj2" fmla="val 82944"/>
+            </a:avLst>
+          </a:prstGeom>
+          <a:ln>
+            <a:tailEnd type="triangle"/>
+          </a:ln>
+        </p:spPr>
+        <p:style>
+          <a:lnRef idx="1">
+            <a:schemeClr val="dk1"/>
+          </a:lnRef>
+          <a:fillRef idx="0">
+            <a:schemeClr val="dk1"/>
+          </a:fillRef>
+          <a:effectRef idx="0">
+            <a:schemeClr val="dk1"/>
+          </a:effectRef>
+          <a:fontRef idx="minor">
+            <a:schemeClr val="tx1"/>
+          </a:fontRef>
+        </p:style>
+      </p:cxnSp>
+      <p:sp>
+        <p:nvSpPr>
+          <p:cNvPr id="14" name="TextBox 13">
+            <a:extLst>
+              <a:ext uri="{FF2B5EF4-FFF2-40B4-BE49-F238E27FC236}">
+                <a16:creationId xmlns:a16="http://schemas.microsoft.com/office/drawing/2014/main" id="{0C5AE01F-464E-71D3-697A-77F40A94F056}"/>
+              </a:ext>
+            </a:extLst>
+          </p:cNvPr>
+          <p:cNvSpPr txBox="1"/>
+          <p:nvPr/>
+        </p:nvSpPr>
+        <p:spPr>
+          <a:xfrm>
+            <a:off x="7273050" y="802766"/>
+            <a:ext cx="1373138" cy="369332"/>
+          </a:xfrm>
+          <a:prstGeom prst="rect">
+            <a:avLst/>
+          </a:prstGeom>
+          <a:noFill/>
+        </p:spPr>
+        <p:txBody>
+          <a:bodyPr wrap="square" rtlCol="0">
+            <a:spAutoFit/>
+          </a:bodyPr>
+          <a:lstStyle/>
+          <a:p>
+            <a:r>
+              <a:rPr lang="en-US" dirty="0" err="1"/>
+              <a:t>BusStrategy</a:t>
+            </a:r>
+            <a:endParaRPr lang="en-IN" dirty="0"/>
+          </a:p>
+        </p:txBody>
+      </p:sp>
+      <p:sp>
+        <p:nvSpPr>
+          <p:cNvPr id="15" name="Rectangle 14">
+            <a:extLst>
+              <a:ext uri="{FF2B5EF4-FFF2-40B4-BE49-F238E27FC236}">
+                <a16:creationId xmlns:a16="http://schemas.microsoft.com/office/drawing/2014/main" id="{B4A369D3-3C23-81B6-5F7A-5DA14BF4C07D}"/>
+              </a:ext>
+            </a:extLst>
+          </p:cNvPr>
+          <p:cNvSpPr/>
+          <p:nvPr/>
+        </p:nvSpPr>
+        <p:spPr>
+          <a:xfrm>
+            <a:off x="6942082" y="617235"/>
+            <a:ext cx="2051975" cy="765777"/>
+          </a:xfrm>
+          <a:prstGeom prst="rect">
+            <a:avLst/>
+          </a:prstGeom>
+          <a:noFill/>
+          <a:ln>
+            <a:solidFill>
+              <a:schemeClr val="bg2">
+                <a:lumMod val="10000"/>
+              </a:schemeClr>
+            </a:solidFill>
+          </a:ln>
+        </p:spPr>
+        <p:style>
+          <a:lnRef idx="2">
+            <a:schemeClr val="accent1">
+              <a:shade val="50000"/>
+            </a:schemeClr>
+          </a:lnRef>
+          <a:fillRef idx="1">
+            <a:schemeClr val="accent1"/>
+          </a:fillRef>
+          <a:effectRef idx="0">
+            <a:schemeClr val="accent1"/>
+          </a:effectRef>
+          <a:fontRef idx="minor">
+            <a:schemeClr val="lt1"/>
+          </a:fontRef>
+        </p:style>
+        <p:txBody>
+          <a:bodyPr rtlCol="0" anchor="ctr"/>
+          <a:lstStyle/>
+          <a:p>
+            <a:pPr algn="ctr"/>
+            <a:endParaRPr lang="en-IN"/>
+          </a:p>
+        </p:txBody>
+      </p:sp>
+      <p:sp>
+        <p:nvSpPr>
+          <p:cNvPr id="16" name="TextBox 15">
+            <a:extLst>
+              <a:ext uri="{FF2B5EF4-FFF2-40B4-BE49-F238E27FC236}">
+                <a16:creationId xmlns:a16="http://schemas.microsoft.com/office/drawing/2014/main" id="{D9E5380A-3790-41EA-E2D4-ED09DA342162}"/>
+              </a:ext>
+            </a:extLst>
+          </p:cNvPr>
+          <p:cNvSpPr txBox="1"/>
+          <p:nvPr/>
+        </p:nvSpPr>
+        <p:spPr>
+          <a:xfrm>
+            <a:off x="6955483" y="2256832"/>
+            <a:ext cx="2051975" cy="369332"/>
+          </a:xfrm>
+          <a:prstGeom prst="rect">
+            <a:avLst/>
+          </a:prstGeom>
+          <a:noFill/>
+        </p:spPr>
+        <p:txBody>
+          <a:bodyPr wrap="square" rtlCol="0">
+            <a:spAutoFit/>
+          </a:bodyPr>
+          <a:lstStyle/>
+          <a:p>
+            <a:r>
+              <a:rPr lang="en-US" dirty="0" err="1"/>
+              <a:t>MetroTrainStrategy</a:t>
+            </a:r>
+            <a:endParaRPr lang="en-IN" dirty="0"/>
+          </a:p>
+        </p:txBody>
+      </p:sp>
+      <p:sp>
+        <p:nvSpPr>
+          <p:cNvPr id="17" name="Rectangle 16">
+            <a:extLst>
+              <a:ext uri="{FF2B5EF4-FFF2-40B4-BE49-F238E27FC236}">
+                <a16:creationId xmlns:a16="http://schemas.microsoft.com/office/drawing/2014/main" id="{CCB98DF0-B42A-6E0B-2A96-6505A875815C}"/>
+              </a:ext>
+            </a:extLst>
+          </p:cNvPr>
+          <p:cNvSpPr/>
+          <p:nvPr/>
+        </p:nvSpPr>
+        <p:spPr>
+          <a:xfrm>
+            <a:off x="6942082" y="2071301"/>
+            <a:ext cx="2051975" cy="765777"/>
+          </a:xfrm>
+          <a:prstGeom prst="rect">
+            <a:avLst/>
+          </a:prstGeom>
+          <a:noFill/>
+          <a:ln>
+            <a:solidFill>
+              <a:schemeClr val="bg2">
+                <a:lumMod val="10000"/>
+              </a:schemeClr>
+            </a:solidFill>
+          </a:ln>
+        </p:spPr>
+        <p:style>
+          <a:lnRef idx="2">
+            <a:schemeClr val="accent1">
+              <a:shade val="50000"/>
+            </a:schemeClr>
+          </a:lnRef>
+          <a:fillRef idx="1">
+            <a:schemeClr val="accent1"/>
+          </a:fillRef>
+          <a:effectRef idx="0">
+            <a:schemeClr val="accent1"/>
+          </a:effectRef>
+          <a:fontRef idx="minor">
+            <a:schemeClr val="lt1"/>
+          </a:fontRef>
+        </p:style>
+        <p:txBody>
+          <a:bodyPr rtlCol="0" anchor="ctr"/>
+          <a:lstStyle/>
+          <a:p>
+            <a:pPr algn="ctr"/>
+            <a:endParaRPr lang="en-IN"/>
+          </a:p>
+        </p:txBody>
+      </p:sp>
+      <p:cxnSp>
+        <p:nvCxnSpPr>
+          <p:cNvPr id="18" name="Straight Arrow Connector 17">
+            <a:extLst>
+              <a:ext uri="{FF2B5EF4-FFF2-40B4-BE49-F238E27FC236}">
+                <a16:creationId xmlns:a16="http://schemas.microsoft.com/office/drawing/2014/main" id="{F88C3840-719C-9FB2-F54C-4B29D97BB088}"/>
+              </a:ext>
+            </a:extLst>
+          </p:cNvPr>
+          <p:cNvCxnSpPr>
+            <a:cxnSpLocks/>
+            <a:stCxn id="9" idx="3"/>
+            <a:endCxn id="15" idx="1"/>
+          </p:cNvCxnSpPr>
+          <p:nvPr/>
+        </p:nvCxnSpPr>
+        <p:spPr>
+          <a:xfrm flipV="1">
+            <a:off x="6270171" y="1000124"/>
+            <a:ext cx="671911" cy="4155907"/>
+          </a:xfrm>
+          <a:prstGeom prst="bentConnector3">
+            <a:avLst>
+              <a:gd name="adj1" fmla="val 50000"/>
+            </a:avLst>
+          </a:prstGeom>
+          <a:ln>
+            <a:tailEnd type="triangle"/>
+          </a:ln>
+        </p:spPr>
+        <p:style>
+          <a:lnRef idx="1">
+            <a:schemeClr val="dk1"/>
+          </a:lnRef>
+          <a:fillRef idx="0">
+            <a:schemeClr val="dk1"/>
+          </a:fillRef>
+          <a:effectRef idx="0">
+            <a:schemeClr val="dk1"/>
+          </a:effectRef>
+          <a:fontRef idx="minor">
+            <a:schemeClr val="tx1"/>
+          </a:fontRef>
+        </p:style>
+      </p:cxnSp>
+      <p:cxnSp>
+        <p:nvCxnSpPr>
+          <p:cNvPr id="19" name="Straight Arrow Connector 17">
+            <a:extLst>
+              <a:ext uri="{FF2B5EF4-FFF2-40B4-BE49-F238E27FC236}">
+                <a16:creationId xmlns:a16="http://schemas.microsoft.com/office/drawing/2014/main" id="{2CC5B049-CC97-CA52-2E1B-4CDDDBFB90FC}"/>
+              </a:ext>
+            </a:extLst>
+          </p:cNvPr>
+          <p:cNvCxnSpPr>
+            <a:cxnSpLocks/>
+            <a:stCxn id="9" idx="3"/>
+            <a:endCxn id="17" idx="1"/>
+          </p:cNvCxnSpPr>
+          <p:nvPr/>
+        </p:nvCxnSpPr>
+        <p:spPr>
+          <a:xfrm flipV="1">
+            <a:off x="6270171" y="2454190"/>
+            <a:ext cx="671911" cy="2701841"/>
+          </a:xfrm>
+          <a:prstGeom prst="bentConnector3">
+            <a:avLst>
+              <a:gd name="adj1" fmla="val 50000"/>
+            </a:avLst>
+          </a:prstGeom>
+          <a:ln>
+            <a:tailEnd type="triangle"/>
+          </a:ln>
+        </p:spPr>
+        <p:style>
+          <a:lnRef idx="1">
+            <a:schemeClr val="dk1"/>
+          </a:lnRef>
+          <a:fillRef idx="0">
+            <a:schemeClr val="dk1"/>
+          </a:fillRef>
+          <a:effectRef idx="0">
+            <a:schemeClr val="dk1"/>
+          </a:effectRef>
+          <a:fontRef idx="minor">
+            <a:schemeClr val="tx1"/>
+          </a:fontRef>
+        </p:style>
+      </p:cxnSp>
+      <p:cxnSp>
+        <p:nvCxnSpPr>
+          <p:cNvPr id="20" name="Straight Arrow Connector 17">
+            <a:extLst>
+              <a:ext uri="{FF2B5EF4-FFF2-40B4-BE49-F238E27FC236}">
+                <a16:creationId xmlns:a16="http://schemas.microsoft.com/office/drawing/2014/main" id="{B1AFC1C3-4EE2-C261-D00F-889440E94B5E}"/>
+              </a:ext>
+            </a:extLst>
+          </p:cNvPr>
+          <p:cNvCxnSpPr>
+            <a:cxnSpLocks/>
+            <a:endCxn id="7" idx="1"/>
+          </p:cNvCxnSpPr>
+          <p:nvPr/>
+        </p:nvCxnSpPr>
+        <p:spPr>
+          <a:xfrm>
+            <a:off x="1278235" y="1912883"/>
+            <a:ext cx="1123321" cy="823972"/>
+          </a:xfrm>
+          <a:prstGeom prst="bentConnector3">
+            <a:avLst>
+              <a:gd name="adj1" fmla="val 50000"/>
+            </a:avLst>
+          </a:prstGeom>
+          <a:ln>
+            <a:tailEnd type="triangle"/>
+          </a:ln>
+        </p:spPr>
+        <p:style>
+          <a:lnRef idx="1">
+            <a:schemeClr val="dk1"/>
+          </a:lnRef>
+          <a:fillRef idx="0">
+            <a:schemeClr val="dk1"/>
+          </a:fillRef>
+          <a:effectRef idx="0">
+            <a:schemeClr val="dk1"/>
+          </a:effectRef>
+          <a:fontRef idx="minor">
+            <a:schemeClr val="tx1"/>
+          </a:fontRef>
+        </p:style>
+      </p:cxnSp>
+      <p:sp>
+        <p:nvSpPr>
+          <p:cNvPr id="35" name="TextBox 34">
+            <a:extLst>
+              <a:ext uri="{FF2B5EF4-FFF2-40B4-BE49-F238E27FC236}">
+                <a16:creationId xmlns:a16="http://schemas.microsoft.com/office/drawing/2014/main" id="{6701FEDD-B8D6-F7B1-9884-492A7B850956}"/>
+              </a:ext>
+            </a:extLst>
+          </p:cNvPr>
+          <p:cNvSpPr txBox="1"/>
+          <p:nvPr/>
+        </p:nvSpPr>
+        <p:spPr>
+          <a:xfrm>
+            <a:off x="7307542" y="3513540"/>
+            <a:ext cx="1605346" cy="369332"/>
+          </a:xfrm>
+          <a:prstGeom prst="rect">
+            <a:avLst/>
+          </a:prstGeom>
+          <a:noFill/>
+        </p:spPr>
+        <p:txBody>
+          <a:bodyPr wrap="square" rtlCol="0">
+            <a:spAutoFit/>
+          </a:bodyPr>
+          <a:lstStyle/>
+          <a:p>
+            <a:r>
+              <a:rPr lang="en-US" dirty="0" err="1"/>
+              <a:t>AutoStrategy</a:t>
+            </a:r>
+            <a:endParaRPr lang="en-IN" dirty="0"/>
+          </a:p>
+        </p:txBody>
+      </p:sp>
+      <p:sp>
+        <p:nvSpPr>
+          <p:cNvPr id="36" name="Rectangle 35">
+            <a:extLst>
+              <a:ext uri="{FF2B5EF4-FFF2-40B4-BE49-F238E27FC236}">
+                <a16:creationId xmlns:a16="http://schemas.microsoft.com/office/drawing/2014/main" id="{520E9B03-D05E-BAA2-CEFC-E5B6586F64D2}"/>
+              </a:ext>
+            </a:extLst>
+          </p:cNvPr>
+          <p:cNvSpPr/>
+          <p:nvPr/>
+        </p:nvSpPr>
+        <p:spPr>
+          <a:xfrm>
+            <a:off x="6976574" y="3328009"/>
+            <a:ext cx="2051975" cy="765777"/>
+          </a:xfrm>
+          <a:prstGeom prst="rect">
+            <a:avLst/>
+          </a:prstGeom>
+          <a:noFill/>
+          <a:ln>
+            <a:solidFill>
+              <a:schemeClr val="bg2">
+                <a:lumMod val="10000"/>
+              </a:schemeClr>
+            </a:solidFill>
+          </a:ln>
+        </p:spPr>
+        <p:style>
+          <a:lnRef idx="2">
+            <a:schemeClr val="accent1">
+              <a:shade val="50000"/>
+            </a:schemeClr>
+          </a:lnRef>
+          <a:fillRef idx="1">
+            <a:schemeClr val="accent1"/>
+          </a:fillRef>
+          <a:effectRef idx="0">
+            <a:schemeClr val="accent1"/>
+          </a:effectRef>
+          <a:fontRef idx="minor">
+            <a:schemeClr val="lt1"/>
+          </a:fontRef>
+        </p:style>
+        <p:txBody>
+          <a:bodyPr rtlCol="0" anchor="ctr"/>
+          <a:lstStyle/>
+          <a:p>
+            <a:pPr algn="ctr"/>
+            <a:endParaRPr lang="en-IN"/>
+          </a:p>
+        </p:txBody>
+      </p:sp>
+      <p:sp>
+        <p:nvSpPr>
+          <p:cNvPr id="37" name="TextBox 36">
+            <a:extLst>
+              <a:ext uri="{FF2B5EF4-FFF2-40B4-BE49-F238E27FC236}">
+                <a16:creationId xmlns:a16="http://schemas.microsoft.com/office/drawing/2014/main" id="{AF5B8F7A-DCAB-6BA4-11BD-E5265A679449}"/>
+              </a:ext>
+            </a:extLst>
+          </p:cNvPr>
+          <p:cNvSpPr txBox="1"/>
+          <p:nvPr/>
+        </p:nvSpPr>
+        <p:spPr>
+          <a:xfrm>
+            <a:off x="6989975" y="4967606"/>
+            <a:ext cx="2051975" cy="369332"/>
+          </a:xfrm>
+          <a:prstGeom prst="rect">
+            <a:avLst/>
+          </a:prstGeom>
+          <a:noFill/>
+        </p:spPr>
+        <p:txBody>
+          <a:bodyPr wrap="square" rtlCol="0">
+            <a:spAutoFit/>
+          </a:bodyPr>
+          <a:lstStyle/>
+          <a:p>
+            <a:r>
+              <a:rPr lang="en-US"/>
+              <a:t>CabStrategy</a:t>
+            </a:r>
+            <a:endParaRPr lang="en-IN" dirty="0"/>
+          </a:p>
+        </p:txBody>
+      </p:sp>
+      <p:sp>
+        <p:nvSpPr>
+          <p:cNvPr id="38" name="Rectangle 37">
+            <a:extLst>
+              <a:ext uri="{FF2B5EF4-FFF2-40B4-BE49-F238E27FC236}">
+                <a16:creationId xmlns:a16="http://schemas.microsoft.com/office/drawing/2014/main" id="{52FE1A19-7758-17EA-46EE-17246BC389B3}"/>
+              </a:ext>
+            </a:extLst>
+          </p:cNvPr>
+          <p:cNvSpPr/>
+          <p:nvPr/>
+        </p:nvSpPr>
+        <p:spPr>
+          <a:xfrm>
+            <a:off x="6976574" y="4782075"/>
+            <a:ext cx="2051975" cy="765777"/>
+          </a:xfrm>
+          <a:prstGeom prst="rect">
+            <a:avLst/>
+          </a:prstGeom>
+          <a:noFill/>
+          <a:ln>
+            <a:solidFill>
+              <a:schemeClr val="bg2">
+                <a:lumMod val="10000"/>
+              </a:schemeClr>
+            </a:solidFill>
+          </a:ln>
+        </p:spPr>
+        <p:style>
+          <a:lnRef idx="2">
+            <a:schemeClr val="accent1">
+              <a:shade val="50000"/>
+            </a:schemeClr>
+          </a:lnRef>
+          <a:fillRef idx="1">
+            <a:schemeClr val="accent1"/>
+          </a:fillRef>
+          <a:effectRef idx="0">
+            <a:schemeClr val="accent1"/>
+          </a:effectRef>
+          <a:fontRef idx="minor">
+            <a:schemeClr val="lt1"/>
+          </a:fontRef>
+        </p:style>
+        <p:txBody>
+          <a:bodyPr rtlCol="0" anchor="ctr"/>
+          <a:lstStyle/>
+          <a:p>
+            <a:pPr algn="ctr"/>
+            <a:endParaRPr lang="en-IN"/>
+          </a:p>
+        </p:txBody>
+      </p:sp>
+    </p:spTree>
+    <p:extLst>
+      <p:ext uri="{BB962C8B-B14F-4D97-AF65-F5344CB8AC3E}">
+        <p14:creationId xmlns:p14="http://schemas.microsoft.com/office/powerpoint/2010/main" val="3915814131"/>
       </p:ext>
     </p:extLst>
   </p:cSld>

</xml_diff>

<commit_message>
Committed for Mediator Design Pattern
</commit_message>
<xml_diff>
--- a/UMLDiagrams.pptx
+++ b/UMLDiagrams.pptx
@@ -5,7 +5,7 @@
     <p:sldMasterId id="2147483648" r:id="rId1"/>
   </p:sldMasterIdLst>
   <p:notesMasterIdLst>
-    <p:notesMasterId r:id="rId20"/>
+    <p:notesMasterId r:id="rId21"/>
   </p:notesMasterIdLst>
   <p:sldIdLst>
     <p:sldId id="256" r:id="rId2"/>
@@ -26,6 +26,7 @@
     <p:sldId id="359" r:id="rId17"/>
     <p:sldId id="360" r:id="rId18"/>
     <p:sldId id="361" r:id="rId19"/>
+    <p:sldId id="362" r:id="rId20"/>
   </p:sldIdLst>
   <p:sldSz cx="12192000" cy="6858000"/>
   <p:notesSz cx="6858000" cy="9144000"/>
@@ -135,7 +136,7 @@
 <file path=ppt/revisionInfo.xml><?xml version="1.0" encoding="utf-8"?>
 <p1510:revInfo xmlns:a="http://schemas.openxmlformats.org/drawingml/2006/main" xmlns:r="http://schemas.openxmlformats.org/officeDocument/2006/relationships" xmlns:p1510="http://schemas.microsoft.com/office/powerpoint/2015/10/main">
   <p1510:revLst>
-    <p1510:client id="{034AA59E-D954-44E8-84AB-C770C7EA240B}" v="57" dt="2023-09-14T08:34:20.520"/>
+    <p1510:client id="{034AA59E-D954-44E8-84AB-C770C7EA240B}" v="70" dt="2023-09-14T10:34:06.179"/>
   </p1510:revLst>
 </p1510:revInfo>
 </file>
@@ -145,10 +146,33 @@
   <pc:docChgLst>
     <pc:chgData name="Manaswini Ray" userId="451f23f8-43b4-4daa-9511-0c9fb98bad1c" providerId="ADAL" clId="{034AA59E-D954-44E8-84AB-C770C7EA240B}"/>
     <pc:docChg chg="undo custSel addSld delSld modSld">
-      <pc:chgData name="Manaswini Ray" userId="451f23f8-43b4-4daa-9511-0c9fb98bad1c" providerId="ADAL" clId="{034AA59E-D954-44E8-84AB-C770C7EA240B}" dt="2023-09-14T08:37:23.762" v="1509" actId="478"/>
+      <pc:chgData name="Manaswini Ray" userId="451f23f8-43b4-4daa-9511-0c9fb98bad1c" providerId="ADAL" clId="{034AA59E-D954-44E8-84AB-C770C7EA240B}" dt="2023-09-14T11:16:37.611" v="2016" actId="20577"/>
       <pc:docMkLst>
         <pc:docMk/>
       </pc:docMkLst>
+      <pc:sldChg chg="delSp modSp mod">
+        <pc:chgData name="Manaswini Ray" userId="451f23f8-43b4-4daa-9511-0c9fb98bad1c" providerId="ADAL" clId="{034AA59E-D954-44E8-84AB-C770C7EA240B}" dt="2023-09-14T10:17:49.755" v="1539" actId="1076"/>
+        <pc:sldMkLst>
+          <pc:docMk/>
+          <pc:sldMk cId="2212599346" sldId="256"/>
+        </pc:sldMkLst>
+        <pc:spChg chg="mod">
+          <ac:chgData name="Manaswini Ray" userId="451f23f8-43b4-4daa-9511-0c9fb98bad1c" providerId="ADAL" clId="{034AA59E-D954-44E8-84AB-C770C7EA240B}" dt="2023-09-14T10:17:49.755" v="1539" actId="1076"/>
+          <ac:spMkLst>
+            <pc:docMk/>
+            <pc:sldMk cId="2212599346" sldId="256"/>
+            <ac:spMk id="2" creationId="{7A3FB08A-5CA4-6908-89AA-246F695D769E}"/>
+          </ac:spMkLst>
+        </pc:spChg>
+        <pc:spChg chg="del">
+          <ac:chgData name="Manaswini Ray" userId="451f23f8-43b4-4daa-9511-0c9fb98bad1c" providerId="ADAL" clId="{034AA59E-D954-44E8-84AB-C770C7EA240B}" dt="2023-09-14T10:17:27.277" v="1510" actId="478"/>
+          <ac:spMkLst>
+            <pc:docMk/>
+            <pc:sldMk cId="2212599346" sldId="256"/>
+            <ac:spMk id="3" creationId="{44716E92-FEB4-D571-8FAF-8381E74ECB33}"/>
+          </ac:spMkLst>
+        </pc:spChg>
+      </pc:sldChg>
       <pc:sldChg chg="new del">
         <pc:chgData name="Manaswini Ray" userId="451f23f8-43b4-4daa-9511-0c9fb98bad1c" providerId="ADAL" clId="{034AA59E-D954-44E8-84AB-C770C7EA240B}" dt="2023-09-11T06:36:59.563" v="2" actId="2696"/>
         <pc:sldMkLst>
@@ -1479,7 +1503,7 @@
         </pc:cxnChg>
       </pc:sldChg>
       <pc:sldChg chg="addSp delSp modSp new mod modAnim">
-        <pc:chgData name="Manaswini Ray" userId="451f23f8-43b4-4daa-9511-0c9fb98bad1c" providerId="ADAL" clId="{034AA59E-D954-44E8-84AB-C770C7EA240B}" dt="2023-09-14T08:21:08.878" v="1180" actId="14100"/>
+        <pc:chgData name="Manaswini Ray" userId="451f23f8-43b4-4daa-9511-0c9fb98bad1c" providerId="ADAL" clId="{034AA59E-D954-44E8-84AB-C770C7EA240B}" dt="2023-09-14T10:31:13.444" v="1823"/>
         <pc:sldMkLst>
           <pc:docMk/>
           <pc:sldMk cId="3915814131" sldId="360"/>
@@ -1588,6 +1612,70 @@
             <ac:spMk id="17" creationId="{CCB98DF0-B42A-6E0B-2A96-6505A875815C}"/>
           </ac:spMkLst>
         </pc:spChg>
+        <pc:spChg chg="add del mod">
+          <ac:chgData name="Manaswini Ray" userId="451f23f8-43b4-4daa-9511-0c9fb98bad1c" providerId="ADAL" clId="{034AA59E-D954-44E8-84AB-C770C7EA240B}" dt="2023-09-14T10:31:13.444" v="1823"/>
+          <ac:spMkLst>
+            <pc:docMk/>
+            <pc:sldMk cId="3915814131" sldId="360"/>
+            <ac:spMk id="19" creationId="{9FD73D94-F9FE-7EBA-F3A6-80C45F6C863D}"/>
+          </ac:spMkLst>
+        </pc:spChg>
+        <pc:spChg chg="add del mod">
+          <ac:chgData name="Manaswini Ray" userId="451f23f8-43b4-4daa-9511-0c9fb98bad1c" providerId="ADAL" clId="{034AA59E-D954-44E8-84AB-C770C7EA240B}" dt="2023-09-14T10:31:13.444" v="1823"/>
+          <ac:spMkLst>
+            <pc:docMk/>
+            <pc:sldMk cId="3915814131" sldId="360"/>
+            <ac:spMk id="22" creationId="{A10852FC-8E11-0FB6-294C-68E9484C80A3}"/>
+          </ac:spMkLst>
+        </pc:spChg>
+        <pc:spChg chg="add del mod">
+          <ac:chgData name="Manaswini Ray" userId="451f23f8-43b4-4daa-9511-0c9fb98bad1c" providerId="ADAL" clId="{034AA59E-D954-44E8-84AB-C770C7EA240B}" dt="2023-09-14T10:31:13.444" v="1823"/>
+          <ac:spMkLst>
+            <pc:docMk/>
+            <pc:sldMk cId="3915814131" sldId="360"/>
+            <ac:spMk id="23" creationId="{69A21763-40D0-F95C-CD23-4915B19E7805}"/>
+          </ac:spMkLst>
+        </pc:spChg>
+        <pc:spChg chg="add del mod">
+          <ac:chgData name="Manaswini Ray" userId="451f23f8-43b4-4daa-9511-0c9fb98bad1c" providerId="ADAL" clId="{034AA59E-D954-44E8-84AB-C770C7EA240B}" dt="2023-09-14T10:31:13.444" v="1823"/>
+          <ac:spMkLst>
+            <pc:docMk/>
+            <pc:sldMk cId="3915814131" sldId="360"/>
+            <ac:spMk id="24" creationId="{A36B7A0D-4E45-B726-5351-24175132DB7A}"/>
+          </ac:spMkLst>
+        </pc:spChg>
+        <pc:spChg chg="add del mod">
+          <ac:chgData name="Manaswini Ray" userId="451f23f8-43b4-4daa-9511-0c9fb98bad1c" providerId="ADAL" clId="{034AA59E-D954-44E8-84AB-C770C7EA240B}" dt="2023-09-14T10:31:13.444" v="1823"/>
+          <ac:spMkLst>
+            <pc:docMk/>
+            <pc:sldMk cId="3915814131" sldId="360"/>
+            <ac:spMk id="26" creationId="{A2DC764B-466E-AD89-E70A-A8E998979EC4}"/>
+          </ac:spMkLst>
+        </pc:spChg>
+        <pc:spChg chg="add del mod">
+          <ac:chgData name="Manaswini Ray" userId="451f23f8-43b4-4daa-9511-0c9fb98bad1c" providerId="ADAL" clId="{034AA59E-D954-44E8-84AB-C770C7EA240B}" dt="2023-09-14T10:31:13.444" v="1823"/>
+          <ac:spMkLst>
+            <pc:docMk/>
+            <pc:sldMk cId="3915814131" sldId="360"/>
+            <ac:spMk id="27" creationId="{E25AC591-1C5A-0C1A-5901-9A52BC3AEAC6}"/>
+          </ac:spMkLst>
+        </pc:spChg>
+        <pc:spChg chg="add del mod">
+          <ac:chgData name="Manaswini Ray" userId="451f23f8-43b4-4daa-9511-0c9fb98bad1c" providerId="ADAL" clId="{034AA59E-D954-44E8-84AB-C770C7EA240B}" dt="2023-09-14T10:31:13.444" v="1823"/>
+          <ac:spMkLst>
+            <pc:docMk/>
+            <pc:sldMk cId="3915814131" sldId="360"/>
+            <ac:spMk id="28" creationId="{44C885AC-3E5F-C501-1196-4BE83CCF52E8}"/>
+          </ac:spMkLst>
+        </pc:spChg>
+        <pc:spChg chg="add del mod">
+          <ac:chgData name="Manaswini Ray" userId="451f23f8-43b4-4daa-9511-0c9fb98bad1c" providerId="ADAL" clId="{034AA59E-D954-44E8-84AB-C770C7EA240B}" dt="2023-09-14T10:31:13.444" v="1823"/>
+          <ac:spMkLst>
+            <pc:docMk/>
+            <pc:sldMk cId="3915814131" sldId="360"/>
+            <ac:spMk id="29" creationId="{059AA9D6-1792-4DF9-A4ED-7DCA0B7E5C15}"/>
+          </ac:spMkLst>
+        </pc:spChg>
         <pc:spChg chg="add mod">
           <ac:chgData name="Manaswini Ray" userId="451f23f8-43b4-4daa-9511-0c9fb98bad1c" providerId="ADAL" clId="{034AA59E-D954-44E8-84AB-C770C7EA240B}" dt="2023-09-13T10:45:21.054" v="1017" actId="14100"/>
           <ac:spMkLst>
@@ -1645,6 +1733,14 @@
           </ac:cxnSpMkLst>
         </pc:cxnChg>
         <pc:cxnChg chg="add del mod">
+          <ac:chgData name="Manaswini Ray" userId="451f23f8-43b4-4daa-9511-0c9fb98bad1c" providerId="ADAL" clId="{034AA59E-D954-44E8-84AB-C770C7EA240B}" dt="2023-09-14T10:31:13.444" v="1823"/>
+          <ac:cxnSpMkLst>
+            <pc:docMk/>
+            <pc:sldMk cId="3915814131" sldId="360"/>
+            <ac:cxnSpMk id="18" creationId="{B692B797-F93C-8518-0DBA-0D651A0E88B5}"/>
+          </ac:cxnSpMkLst>
+        </pc:cxnChg>
+        <pc:cxnChg chg="add del mod">
           <ac:chgData name="Manaswini Ray" userId="451f23f8-43b4-4daa-9511-0c9fb98bad1c" providerId="ADAL" clId="{034AA59E-D954-44E8-84AB-C770C7EA240B}" dt="2023-09-14T08:13:41.697" v="1100" actId="478"/>
           <ac:cxnSpMkLst>
             <pc:docMk/>
@@ -1692,12 +1788,36 @@
             <ac:cxnSpMk id="30" creationId="{60DEA466-A7E7-DD70-1726-1292A8E2EEEE}"/>
           </ac:cxnSpMkLst>
         </pc:cxnChg>
+        <pc:cxnChg chg="add del mod">
+          <ac:chgData name="Manaswini Ray" userId="451f23f8-43b4-4daa-9511-0c9fb98bad1c" providerId="ADAL" clId="{034AA59E-D954-44E8-84AB-C770C7EA240B}" dt="2023-09-14T10:31:13.444" v="1823"/>
+          <ac:cxnSpMkLst>
+            <pc:docMk/>
+            <pc:sldMk cId="3915814131" sldId="360"/>
+            <ac:cxnSpMk id="31" creationId="{7A4257C6-8D19-11CF-3A7E-C1609F1F2673}"/>
+          </ac:cxnSpMkLst>
+        </pc:cxnChg>
+        <pc:cxnChg chg="add del mod">
+          <ac:chgData name="Manaswini Ray" userId="451f23f8-43b4-4daa-9511-0c9fb98bad1c" providerId="ADAL" clId="{034AA59E-D954-44E8-84AB-C770C7EA240B}" dt="2023-09-14T10:31:13.444" v="1823"/>
+          <ac:cxnSpMkLst>
+            <pc:docMk/>
+            <pc:sldMk cId="3915814131" sldId="360"/>
+            <ac:cxnSpMk id="32" creationId="{432D1A07-C8C3-714D-4D79-EC87F547C7D5}"/>
+          </ac:cxnSpMkLst>
+        </pc:cxnChg>
         <pc:cxnChg chg="add mod">
           <ac:chgData name="Manaswini Ray" userId="451f23f8-43b4-4daa-9511-0c9fb98bad1c" providerId="ADAL" clId="{034AA59E-D954-44E8-84AB-C770C7EA240B}" dt="2023-09-14T08:15:34.396" v="1119" actId="14100"/>
           <ac:cxnSpMkLst>
             <pc:docMk/>
             <pc:sldMk cId="3915814131" sldId="360"/>
             <ac:cxnSpMk id="33" creationId="{AEF33027-B297-5AF4-AB8C-2A069A146E89}"/>
+          </ac:cxnSpMkLst>
+        </pc:cxnChg>
+        <pc:cxnChg chg="add del mod">
+          <ac:chgData name="Manaswini Ray" userId="451f23f8-43b4-4daa-9511-0c9fb98bad1c" providerId="ADAL" clId="{034AA59E-D954-44E8-84AB-C770C7EA240B}" dt="2023-09-14T10:31:13.444" v="1823"/>
+          <ac:cxnSpMkLst>
+            <pc:docMk/>
+            <pc:sldMk cId="3915814131" sldId="360"/>
+            <ac:cxnSpMk id="34" creationId="{370B986B-5912-FA3D-A51D-43C537DC5E57}"/>
           </ac:cxnSpMkLst>
         </pc:cxnChg>
       </pc:sldChg>
@@ -1969,6 +2089,429 @@
             <pc:docMk/>
             <pc:sldMk cId="3697082059" sldId="361"/>
             <ac:cxnSpMk id="62" creationId="{1EE55CE0-A791-7CD7-A744-4BAE857F660A}"/>
+          </ac:cxnSpMkLst>
+        </pc:cxnChg>
+      </pc:sldChg>
+      <pc:sldChg chg="addSp delSp modSp new mod delAnim modAnim">
+        <pc:chgData name="Manaswini Ray" userId="451f23f8-43b4-4daa-9511-0c9fb98bad1c" providerId="ADAL" clId="{034AA59E-D954-44E8-84AB-C770C7EA240B}" dt="2023-09-14T11:16:37.611" v="2016" actId="20577"/>
+        <pc:sldMkLst>
+          <pc:docMk/>
+          <pc:sldMk cId="592478941" sldId="362"/>
+        </pc:sldMkLst>
+        <pc:spChg chg="add del mod">
+          <ac:chgData name="Manaswini Ray" userId="451f23f8-43b4-4daa-9511-0c9fb98bad1c" providerId="ADAL" clId="{034AA59E-D954-44E8-84AB-C770C7EA240B}" dt="2023-09-14T10:32:04.912" v="1834" actId="1076"/>
+          <ac:spMkLst>
+            <pc:docMk/>
+            <pc:sldMk cId="592478941" sldId="362"/>
+            <ac:spMk id="2" creationId="{90926BF3-B67F-A716-5A8C-4B0813531291}"/>
+          </ac:spMkLst>
+        </pc:spChg>
+        <pc:spChg chg="add del mod">
+          <ac:chgData name="Manaswini Ray" userId="451f23f8-43b4-4daa-9511-0c9fb98bad1c" providerId="ADAL" clId="{034AA59E-D954-44E8-84AB-C770C7EA240B}" dt="2023-09-14T10:32:04.912" v="1834" actId="1076"/>
+          <ac:spMkLst>
+            <pc:docMk/>
+            <pc:sldMk cId="592478941" sldId="362"/>
+            <ac:spMk id="4" creationId="{4AA06174-5F79-5624-5CF4-7CE8EC51AECB}"/>
+          </ac:spMkLst>
+        </pc:spChg>
+        <pc:spChg chg="add del mod">
+          <ac:chgData name="Manaswini Ray" userId="451f23f8-43b4-4daa-9511-0c9fb98bad1c" providerId="ADAL" clId="{034AA59E-D954-44E8-84AB-C770C7EA240B}" dt="2023-09-14T10:26:35.939" v="1767" actId="478"/>
+          <ac:spMkLst>
+            <pc:docMk/>
+            <pc:sldMk cId="592478941" sldId="362"/>
+            <ac:spMk id="5" creationId="{A5942CE1-A21B-FB52-2DC9-B1B5FC147CC3}"/>
+          </ac:spMkLst>
+        </pc:spChg>
+        <pc:spChg chg="add del mod">
+          <ac:chgData name="Manaswini Ray" userId="451f23f8-43b4-4daa-9511-0c9fb98bad1c" providerId="ADAL" clId="{034AA59E-D954-44E8-84AB-C770C7EA240B}" dt="2023-09-14T10:26:45.413" v="1770" actId="478"/>
+          <ac:spMkLst>
+            <pc:docMk/>
+            <pc:sldMk cId="592478941" sldId="362"/>
+            <ac:spMk id="7" creationId="{F0454849-8630-CB9E-EC90-0C045F634D44}"/>
+          </ac:spMkLst>
+        </pc:spChg>
+        <pc:spChg chg="add del mod">
+          <ac:chgData name="Manaswini Ray" userId="451f23f8-43b4-4daa-9511-0c9fb98bad1c" providerId="ADAL" clId="{034AA59E-D954-44E8-84AB-C770C7EA240B}" dt="2023-09-14T10:37:44.484" v="1935" actId="20577"/>
+          <ac:spMkLst>
+            <pc:docMk/>
+            <pc:sldMk cId="592478941" sldId="362"/>
+            <ac:spMk id="8" creationId="{47420239-2D63-F19A-144B-2198282C2982}"/>
+          </ac:spMkLst>
+        </pc:spChg>
+        <pc:spChg chg="add del mod">
+          <ac:chgData name="Manaswini Ray" userId="451f23f8-43b4-4daa-9511-0c9fb98bad1c" providerId="ADAL" clId="{034AA59E-D954-44E8-84AB-C770C7EA240B}" dt="2023-09-14T10:26:48.928" v="1772" actId="478"/>
+          <ac:spMkLst>
+            <pc:docMk/>
+            <pc:sldMk cId="592478941" sldId="362"/>
+            <ac:spMk id="9" creationId="{624EB18C-926B-24F2-ABF1-66FD5A4D576A}"/>
+          </ac:spMkLst>
+        </pc:spChg>
+        <pc:spChg chg="add mod">
+          <ac:chgData name="Manaswini Ray" userId="451f23f8-43b4-4daa-9511-0c9fb98bad1c" providerId="ADAL" clId="{034AA59E-D954-44E8-84AB-C770C7EA240B}" dt="2023-09-14T10:42:21.716" v="1939"/>
+          <ac:spMkLst>
+            <pc:docMk/>
+            <pc:sldMk cId="592478941" sldId="362"/>
+            <ac:spMk id="12" creationId="{E45EFFC8-FBFB-D82B-6436-8FF4ADDA1C80}"/>
+          </ac:spMkLst>
+        </pc:spChg>
+        <pc:spChg chg="add del mod">
+          <ac:chgData name="Manaswini Ray" userId="451f23f8-43b4-4daa-9511-0c9fb98bad1c" providerId="ADAL" clId="{034AA59E-D954-44E8-84AB-C770C7EA240B}" dt="2023-09-14T10:23:46.826" v="1684" actId="478"/>
+          <ac:spMkLst>
+            <pc:docMk/>
+            <pc:sldMk cId="592478941" sldId="362"/>
+            <ac:spMk id="13" creationId="{637DF406-78FE-898B-DCEE-4393AE62987D}"/>
+          </ac:spMkLst>
+        </pc:spChg>
+        <pc:spChg chg="add del mod">
+          <ac:chgData name="Manaswini Ray" userId="451f23f8-43b4-4daa-9511-0c9fb98bad1c" providerId="ADAL" clId="{034AA59E-D954-44E8-84AB-C770C7EA240B}" dt="2023-09-14T10:23:46.826" v="1684" actId="478"/>
+          <ac:spMkLst>
+            <pc:docMk/>
+            <pc:sldMk cId="592478941" sldId="362"/>
+            <ac:spMk id="15" creationId="{C479A2B4-B333-9C5C-25F8-15B4B4AB70CC}"/>
+          </ac:spMkLst>
+        </pc:spChg>
+        <pc:spChg chg="add mod">
+          <ac:chgData name="Manaswini Ray" userId="451f23f8-43b4-4daa-9511-0c9fb98bad1c" providerId="ADAL" clId="{034AA59E-D954-44E8-84AB-C770C7EA240B}" dt="2023-09-14T10:32:19.990" v="1837" actId="1076"/>
+          <ac:spMkLst>
+            <pc:docMk/>
+            <pc:sldMk cId="592478941" sldId="362"/>
+            <ac:spMk id="16" creationId="{54BE5C6B-7195-1F79-C5E4-692E1AB63DB8}"/>
+          </ac:spMkLst>
+        </pc:spChg>
+        <pc:spChg chg="add mod">
+          <ac:chgData name="Manaswini Ray" userId="451f23f8-43b4-4daa-9511-0c9fb98bad1c" providerId="ADAL" clId="{034AA59E-D954-44E8-84AB-C770C7EA240B}" dt="2023-09-14T11:02:49.695" v="2014" actId="20577"/>
+          <ac:spMkLst>
+            <pc:docMk/>
+            <pc:sldMk cId="592478941" sldId="362"/>
+            <ac:spMk id="18" creationId="{18360850-E966-ED0C-449B-6F3F2E7ED487}"/>
+          </ac:spMkLst>
+        </pc:spChg>
+        <pc:spChg chg="add mod">
+          <ac:chgData name="Manaswini Ray" userId="451f23f8-43b4-4daa-9511-0c9fb98bad1c" providerId="ADAL" clId="{034AA59E-D954-44E8-84AB-C770C7EA240B}" dt="2023-09-14T10:42:31.787" v="1943"/>
+          <ac:spMkLst>
+            <pc:docMk/>
+            <pc:sldMk cId="592478941" sldId="362"/>
+            <ac:spMk id="19" creationId="{3A649D37-3738-2FC1-7328-6F647B0111EE}"/>
+          </ac:spMkLst>
+        </pc:spChg>
+        <pc:spChg chg="add mod">
+          <ac:chgData name="Manaswini Ray" userId="451f23f8-43b4-4daa-9511-0c9fb98bad1c" providerId="ADAL" clId="{034AA59E-D954-44E8-84AB-C770C7EA240B}" dt="2023-09-14T10:27:37.537" v="1780" actId="14100"/>
+          <ac:spMkLst>
+            <pc:docMk/>
+            <pc:sldMk cId="592478941" sldId="362"/>
+            <ac:spMk id="23" creationId="{970C95FE-A257-68AD-DDF5-39E771B603ED}"/>
+          </ac:spMkLst>
+        </pc:spChg>
+        <pc:spChg chg="add mod">
+          <ac:chgData name="Manaswini Ray" userId="451f23f8-43b4-4daa-9511-0c9fb98bad1c" providerId="ADAL" clId="{034AA59E-D954-44E8-84AB-C770C7EA240B}" dt="2023-09-14T10:27:05.331" v="1773" actId="1076"/>
+          <ac:spMkLst>
+            <pc:docMk/>
+            <pc:sldMk cId="592478941" sldId="362"/>
+            <ac:spMk id="25" creationId="{F3C2EB61-61D8-D50F-ED83-CEEFC6A1E427}"/>
+          </ac:spMkLst>
+        </pc:spChg>
+        <pc:spChg chg="add mod">
+          <ac:chgData name="Manaswini Ray" userId="451f23f8-43b4-4daa-9511-0c9fb98bad1c" providerId="ADAL" clId="{034AA59E-D954-44E8-84AB-C770C7EA240B}" dt="2023-09-14T11:16:37.611" v="2016" actId="20577"/>
+          <ac:spMkLst>
+            <pc:docMk/>
+            <pc:sldMk cId="592478941" sldId="362"/>
+            <ac:spMk id="26" creationId="{0778CD71-1AFD-FD76-C4C9-08E66216D9BD}"/>
+          </ac:spMkLst>
+        </pc:spChg>
+        <pc:spChg chg="add mod">
+          <ac:chgData name="Manaswini Ray" userId="451f23f8-43b4-4daa-9511-0c9fb98bad1c" providerId="ADAL" clId="{034AA59E-D954-44E8-84AB-C770C7EA240B}" dt="2023-09-14T10:29:36.059" v="1807" actId="1076"/>
+          <ac:spMkLst>
+            <pc:docMk/>
+            <pc:sldMk cId="592478941" sldId="362"/>
+            <ac:spMk id="33" creationId="{F4136DB8-0C45-2C98-8376-850BA43EEF3E}"/>
+          </ac:spMkLst>
+        </pc:spChg>
+        <pc:spChg chg="add mod">
+          <ac:chgData name="Manaswini Ray" userId="451f23f8-43b4-4daa-9511-0c9fb98bad1c" providerId="ADAL" clId="{034AA59E-D954-44E8-84AB-C770C7EA240B}" dt="2023-09-14T10:29:38.102" v="1808" actId="20577"/>
+          <ac:spMkLst>
+            <pc:docMk/>
+            <pc:sldMk cId="592478941" sldId="362"/>
+            <ac:spMk id="35" creationId="{13EAE598-B70D-A21B-9A5B-8EE00420E2D2}"/>
+          </ac:spMkLst>
+        </pc:spChg>
+        <pc:spChg chg="add mod">
+          <ac:chgData name="Manaswini Ray" userId="451f23f8-43b4-4daa-9511-0c9fb98bad1c" providerId="ADAL" clId="{034AA59E-D954-44E8-84AB-C770C7EA240B}" dt="2023-09-14T11:16:34.641" v="2015" actId="20577"/>
+          <ac:spMkLst>
+            <pc:docMk/>
+            <pc:sldMk cId="592478941" sldId="362"/>
+            <ac:spMk id="36" creationId="{DB6325AA-741C-7D95-7289-6B3F83EA8563}"/>
+          </ac:spMkLst>
+        </pc:spChg>
+        <pc:spChg chg="add del mod">
+          <ac:chgData name="Manaswini Ray" userId="451f23f8-43b4-4daa-9511-0c9fb98bad1c" providerId="ADAL" clId="{034AA59E-D954-44E8-84AB-C770C7EA240B}" dt="2023-09-14T10:31:54.427" v="1833"/>
+          <ac:spMkLst>
+            <pc:docMk/>
+            <pc:sldMk cId="592478941" sldId="362"/>
+            <ac:spMk id="47" creationId="{E94CBE6B-C136-84DB-676F-6C0C219F7457}"/>
+          </ac:spMkLst>
+        </pc:spChg>
+        <pc:spChg chg="add del mod">
+          <ac:chgData name="Manaswini Ray" userId="451f23f8-43b4-4daa-9511-0c9fb98bad1c" providerId="ADAL" clId="{034AA59E-D954-44E8-84AB-C770C7EA240B}" dt="2023-09-14T10:31:54.427" v="1833"/>
+          <ac:spMkLst>
+            <pc:docMk/>
+            <pc:sldMk cId="592478941" sldId="362"/>
+            <ac:spMk id="48" creationId="{8DF18C20-3F1F-2465-EEA5-0620E727E455}"/>
+          </ac:spMkLst>
+        </pc:spChg>
+        <pc:spChg chg="add del mod">
+          <ac:chgData name="Manaswini Ray" userId="451f23f8-43b4-4daa-9511-0c9fb98bad1c" providerId="ADAL" clId="{034AA59E-D954-44E8-84AB-C770C7EA240B}" dt="2023-09-14T10:31:54.427" v="1833"/>
+          <ac:spMkLst>
+            <pc:docMk/>
+            <pc:sldMk cId="592478941" sldId="362"/>
+            <ac:spMk id="49" creationId="{11FDE820-C1C0-909A-DC27-B4F7FFFC5468}"/>
+          </ac:spMkLst>
+        </pc:spChg>
+        <pc:spChg chg="add del mod">
+          <ac:chgData name="Manaswini Ray" userId="451f23f8-43b4-4daa-9511-0c9fb98bad1c" providerId="ADAL" clId="{034AA59E-D954-44E8-84AB-C770C7EA240B}" dt="2023-09-14T10:31:54.427" v="1833"/>
+          <ac:spMkLst>
+            <pc:docMk/>
+            <pc:sldMk cId="592478941" sldId="362"/>
+            <ac:spMk id="50" creationId="{4B4D1A78-79F7-1C3E-1DA3-F359664161B2}"/>
+          </ac:spMkLst>
+        </pc:spChg>
+        <pc:spChg chg="add del mod">
+          <ac:chgData name="Manaswini Ray" userId="451f23f8-43b4-4daa-9511-0c9fb98bad1c" providerId="ADAL" clId="{034AA59E-D954-44E8-84AB-C770C7EA240B}" dt="2023-09-14T10:31:54.427" v="1833"/>
+          <ac:spMkLst>
+            <pc:docMk/>
+            <pc:sldMk cId="592478941" sldId="362"/>
+            <ac:spMk id="51" creationId="{C75EDC92-0CD4-610A-3FDC-9A4DD7D0441E}"/>
+          </ac:spMkLst>
+        </pc:spChg>
+        <pc:spChg chg="add del mod">
+          <ac:chgData name="Manaswini Ray" userId="451f23f8-43b4-4daa-9511-0c9fb98bad1c" providerId="ADAL" clId="{034AA59E-D954-44E8-84AB-C770C7EA240B}" dt="2023-09-14T10:31:54.427" v="1833"/>
+          <ac:spMkLst>
+            <pc:docMk/>
+            <pc:sldMk cId="592478941" sldId="362"/>
+            <ac:spMk id="52" creationId="{5D412F02-975C-E77F-55D4-3CDD11AB50E8}"/>
+          </ac:spMkLst>
+        </pc:spChg>
+        <pc:spChg chg="add del mod">
+          <ac:chgData name="Manaswini Ray" userId="451f23f8-43b4-4daa-9511-0c9fb98bad1c" providerId="ADAL" clId="{034AA59E-D954-44E8-84AB-C770C7EA240B}" dt="2023-09-14T10:31:54.427" v="1833"/>
+          <ac:spMkLst>
+            <pc:docMk/>
+            <pc:sldMk cId="592478941" sldId="362"/>
+            <ac:spMk id="53" creationId="{FC3BE06B-DC04-ECC4-2E96-93C9C0DA2FB5}"/>
+          </ac:spMkLst>
+        </pc:spChg>
+        <pc:spChg chg="add del mod">
+          <ac:chgData name="Manaswini Ray" userId="451f23f8-43b4-4daa-9511-0c9fb98bad1c" providerId="ADAL" clId="{034AA59E-D954-44E8-84AB-C770C7EA240B}" dt="2023-09-14T10:31:54.427" v="1833"/>
+          <ac:spMkLst>
+            <pc:docMk/>
+            <pc:sldMk cId="592478941" sldId="362"/>
+            <ac:spMk id="54" creationId="{D841FA6C-943E-25BC-6488-2093F2B4FB27}"/>
+          </ac:spMkLst>
+        </pc:spChg>
+        <pc:spChg chg="add del mod">
+          <ac:chgData name="Manaswini Ray" userId="451f23f8-43b4-4daa-9511-0c9fb98bad1c" providerId="ADAL" clId="{034AA59E-D954-44E8-84AB-C770C7EA240B}" dt="2023-09-14T10:35:54.074" v="1910" actId="478"/>
+          <ac:spMkLst>
+            <pc:docMk/>
+            <pc:sldMk cId="592478941" sldId="362"/>
+            <ac:spMk id="72" creationId="{9FDF0699-7CFD-892B-3CCD-950F9A66506B}"/>
+          </ac:spMkLst>
+        </pc:spChg>
+        <pc:spChg chg="add del mod">
+          <ac:chgData name="Manaswini Ray" userId="451f23f8-43b4-4daa-9511-0c9fb98bad1c" providerId="ADAL" clId="{034AA59E-D954-44E8-84AB-C770C7EA240B}" dt="2023-09-14T10:35:54.074" v="1910" actId="478"/>
+          <ac:spMkLst>
+            <pc:docMk/>
+            <pc:sldMk cId="592478941" sldId="362"/>
+            <ac:spMk id="73" creationId="{35782A67-9F58-E8D1-9F12-1034C8247CA8}"/>
+          </ac:spMkLst>
+        </pc:spChg>
+        <pc:spChg chg="add mod">
+          <ac:chgData name="Manaswini Ray" userId="451f23f8-43b4-4daa-9511-0c9fb98bad1c" providerId="ADAL" clId="{034AA59E-D954-44E8-84AB-C770C7EA240B}" dt="2023-09-14T10:37:20.799" v="1925" actId="1076"/>
+          <ac:spMkLst>
+            <pc:docMk/>
+            <pc:sldMk cId="592478941" sldId="362"/>
+            <ac:spMk id="74" creationId="{E8B12CC5-A239-D536-4BD3-2B3987830D72}"/>
+          </ac:spMkLst>
+        </pc:spChg>
+        <pc:spChg chg="add mod">
+          <ac:chgData name="Manaswini Ray" userId="451f23f8-43b4-4daa-9511-0c9fb98bad1c" providerId="ADAL" clId="{034AA59E-D954-44E8-84AB-C770C7EA240B}" dt="2023-09-14T10:37:20.799" v="1925" actId="1076"/>
+          <ac:spMkLst>
+            <pc:docMk/>
+            <pc:sldMk cId="592478941" sldId="362"/>
+            <ac:spMk id="75" creationId="{0E4CD42B-F2F9-771E-9BE1-E445178B5BDA}"/>
+          </ac:spMkLst>
+        </pc:spChg>
+        <pc:spChg chg="add mod">
+          <ac:chgData name="Manaswini Ray" userId="451f23f8-43b4-4daa-9511-0c9fb98bad1c" providerId="ADAL" clId="{034AA59E-D954-44E8-84AB-C770C7EA240B}" dt="2023-09-14T10:37:31.559" v="1927" actId="1076"/>
+          <ac:spMkLst>
+            <pc:docMk/>
+            <pc:sldMk cId="592478941" sldId="362"/>
+            <ac:spMk id="76" creationId="{2293C80C-05CB-3B49-6E7F-C73705EAFC6A}"/>
+          </ac:spMkLst>
+        </pc:spChg>
+        <pc:spChg chg="add mod">
+          <ac:chgData name="Manaswini Ray" userId="451f23f8-43b4-4daa-9511-0c9fb98bad1c" providerId="ADAL" clId="{034AA59E-D954-44E8-84AB-C770C7EA240B}" dt="2023-09-14T10:37:31.559" v="1927" actId="1076"/>
+          <ac:spMkLst>
+            <pc:docMk/>
+            <pc:sldMk cId="592478941" sldId="362"/>
+            <ac:spMk id="77" creationId="{3460E997-4B78-7170-C6AF-E9A8A246917A}"/>
+          </ac:spMkLst>
+        </pc:spChg>
+        <pc:spChg chg="add mod">
+          <ac:chgData name="Manaswini Ray" userId="451f23f8-43b4-4daa-9511-0c9fb98bad1c" providerId="ADAL" clId="{034AA59E-D954-44E8-84AB-C770C7EA240B}" dt="2023-09-14T10:35:15.179" v="1876" actId="20577"/>
+          <ac:spMkLst>
+            <pc:docMk/>
+            <pc:sldMk cId="592478941" sldId="362"/>
+            <ac:spMk id="78" creationId="{9771C93A-48F8-A1D4-59CC-83FC2737A2A7}"/>
+          </ac:spMkLst>
+        </pc:spChg>
+        <pc:spChg chg="add mod">
+          <ac:chgData name="Manaswini Ray" userId="451f23f8-43b4-4daa-9511-0c9fb98bad1c" providerId="ADAL" clId="{034AA59E-D954-44E8-84AB-C770C7EA240B}" dt="2023-09-14T10:34:22.469" v="1859" actId="14100"/>
+          <ac:spMkLst>
+            <pc:docMk/>
+            <pc:sldMk cId="592478941" sldId="362"/>
+            <ac:spMk id="79" creationId="{3C65AD0F-0AE7-D598-C2F4-F01F0E0695C8}"/>
+          </ac:spMkLst>
+        </pc:spChg>
+        <pc:cxnChg chg="add del mod">
+          <ac:chgData name="Manaswini Ray" userId="451f23f8-43b4-4daa-9511-0c9fb98bad1c" providerId="ADAL" clId="{034AA59E-D954-44E8-84AB-C770C7EA240B}" dt="2023-09-14T10:32:04.912" v="1834" actId="1076"/>
+          <ac:cxnSpMkLst>
+            <pc:docMk/>
+            <pc:sldMk cId="592478941" sldId="362"/>
+            <ac:cxnSpMk id="3" creationId="{F048E608-B3CB-B74D-755A-F8D0DDF672E4}"/>
+          </ac:cxnSpMkLst>
+        </pc:cxnChg>
+        <pc:cxnChg chg="add del mod">
+          <ac:chgData name="Manaswini Ray" userId="451f23f8-43b4-4daa-9511-0c9fb98bad1c" providerId="ADAL" clId="{034AA59E-D954-44E8-84AB-C770C7EA240B}" dt="2023-09-14T10:26:35.939" v="1767" actId="478"/>
+          <ac:cxnSpMkLst>
+            <pc:docMk/>
+            <pc:sldMk cId="592478941" sldId="362"/>
+            <ac:cxnSpMk id="6" creationId="{E3BE9AD3-7062-E680-151E-A26038D828BD}"/>
+          </ac:cxnSpMkLst>
+        </pc:cxnChg>
+        <pc:cxnChg chg="add del mod">
+          <ac:chgData name="Manaswini Ray" userId="451f23f8-43b4-4daa-9511-0c9fb98bad1c" providerId="ADAL" clId="{034AA59E-D954-44E8-84AB-C770C7EA240B}" dt="2023-09-14T10:29:00.383" v="1802" actId="478"/>
+          <ac:cxnSpMkLst>
+            <pc:docMk/>
+            <pc:sldMk cId="592478941" sldId="362"/>
+            <ac:cxnSpMk id="10" creationId="{EE7E21C1-44DE-F805-A041-A990F813359A}"/>
+          </ac:cxnSpMkLst>
+        </pc:cxnChg>
+        <pc:cxnChg chg="add del mod">
+          <ac:chgData name="Manaswini Ray" userId="451f23f8-43b4-4daa-9511-0c9fb98bad1c" providerId="ADAL" clId="{034AA59E-D954-44E8-84AB-C770C7EA240B}" dt="2023-09-14T10:33:46.935" v="1855" actId="1076"/>
+          <ac:cxnSpMkLst>
+            <pc:docMk/>
+            <pc:sldMk cId="592478941" sldId="362"/>
+            <ac:cxnSpMk id="11" creationId="{55899AEF-9D01-D2AE-E592-DD7EF712C8D5}"/>
+          </ac:cxnSpMkLst>
+        </pc:cxnChg>
+        <pc:cxnChg chg="add del mod">
+          <ac:chgData name="Manaswini Ray" userId="451f23f8-43b4-4daa-9511-0c9fb98bad1c" providerId="ADAL" clId="{034AA59E-D954-44E8-84AB-C770C7EA240B}" dt="2023-09-14T10:23:46.826" v="1684" actId="478"/>
+          <ac:cxnSpMkLst>
+            <pc:docMk/>
+            <pc:sldMk cId="592478941" sldId="362"/>
+            <ac:cxnSpMk id="14" creationId="{AC009C77-4B6B-A5C5-918B-D3FE97B2FAD8}"/>
+          </ac:cxnSpMkLst>
+        </pc:cxnChg>
+        <pc:cxnChg chg="add mod">
+          <ac:chgData name="Manaswini Ray" userId="451f23f8-43b4-4daa-9511-0c9fb98bad1c" providerId="ADAL" clId="{034AA59E-D954-44E8-84AB-C770C7EA240B}" dt="2023-09-14T10:32:19.990" v="1837" actId="1076"/>
+          <ac:cxnSpMkLst>
+            <pc:docMk/>
+            <pc:sldMk cId="592478941" sldId="362"/>
+            <ac:cxnSpMk id="17" creationId="{1A573B48-95F4-B2E3-3403-66BBAAFE4A1F}"/>
+          </ac:cxnSpMkLst>
+        </pc:cxnChg>
+        <pc:cxnChg chg="add mod">
+          <ac:chgData name="Manaswini Ray" userId="451f23f8-43b4-4daa-9511-0c9fb98bad1c" providerId="ADAL" clId="{034AA59E-D954-44E8-84AB-C770C7EA240B}" dt="2023-09-14T10:36:57.347" v="1921" actId="1582"/>
+          <ac:cxnSpMkLst>
+            <pc:docMk/>
+            <pc:sldMk cId="592478941" sldId="362"/>
+            <ac:cxnSpMk id="20" creationId="{0C3D24E1-2E8D-7176-BE07-999B0FDEF466}"/>
+          </ac:cxnSpMkLst>
+        </pc:cxnChg>
+        <pc:cxnChg chg="add mod">
+          <ac:chgData name="Manaswini Ray" userId="451f23f8-43b4-4daa-9511-0c9fb98bad1c" providerId="ADAL" clId="{034AA59E-D954-44E8-84AB-C770C7EA240B}" dt="2023-09-14T10:27:40.872" v="1781" actId="14100"/>
+          <ac:cxnSpMkLst>
+            <pc:docMk/>
+            <pc:sldMk cId="592478941" sldId="362"/>
+            <ac:cxnSpMk id="24" creationId="{17598B8D-61DD-4C6A-1587-38C9B11D0F3B}"/>
+          </ac:cxnSpMkLst>
+        </pc:cxnChg>
+        <pc:cxnChg chg="add mod">
+          <ac:chgData name="Manaswini Ray" userId="451f23f8-43b4-4daa-9511-0c9fb98bad1c" providerId="ADAL" clId="{034AA59E-D954-44E8-84AB-C770C7EA240B}" dt="2023-09-14T10:29:36.059" v="1807" actId="1076"/>
+          <ac:cxnSpMkLst>
+            <pc:docMk/>
+            <pc:sldMk cId="592478941" sldId="362"/>
+            <ac:cxnSpMk id="34" creationId="{47E9B744-1DFC-EB90-48F3-993D7CE8C34B}"/>
+          </ac:cxnSpMkLst>
+        </pc:cxnChg>
+        <pc:cxnChg chg="add mod">
+          <ac:chgData name="Manaswini Ray" userId="451f23f8-43b4-4daa-9511-0c9fb98bad1c" providerId="ADAL" clId="{034AA59E-D954-44E8-84AB-C770C7EA240B}" dt="2023-09-14T10:30:45.053" v="1820" actId="14100"/>
+          <ac:cxnSpMkLst>
+            <pc:docMk/>
+            <pc:sldMk cId="592478941" sldId="362"/>
+            <ac:cxnSpMk id="37" creationId="{FA9F5739-0F17-AB2B-7F62-21A16B54EBAD}"/>
+          </ac:cxnSpMkLst>
+        </pc:cxnChg>
+        <pc:cxnChg chg="add del mod">
+          <ac:chgData name="Manaswini Ray" userId="451f23f8-43b4-4daa-9511-0c9fb98bad1c" providerId="ADAL" clId="{034AA59E-D954-44E8-84AB-C770C7EA240B}" dt="2023-09-14T10:31:54.427" v="1833"/>
+          <ac:cxnSpMkLst>
+            <pc:docMk/>
+            <pc:sldMk cId="592478941" sldId="362"/>
+            <ac:cxnSpMk id="46" creationId="{5CA1F9F0-3445-014E-266C-C4F5CF3C1286}"/>
+          </ac:cxnSpMkLst>
+        </pc:cxnChg>
+        <pc:cxnChg chg="add del mod">
+          <ac:chgData name="Manaswini Ray" userId="451f23f8-43b4-4daa-9511-0c9fb98bad1c" providerId="ADAL" clId="{034AA59E-D954-44E8-84AB-C770C7EA240B}" dt="2023-09-14T10:31:54.427" v="1833"/>
+          <ac:cxnSpMkLst>
+            <pc:docMk/>
+            <pc:sldMk cId="592478941" sldId="362"/>
+            <ac:cxnSpMk id="55" creationId="{AE1CC08B-8AB8-AE85-C9F2-99722C7E220C}"/>
+          </ac:cxnSpMkLst>
+        </pc:cxnChg>
+        <pc:cxnChg chg="add del mod">
+          <ac:chgData name="Manaswini Ray" userId="451f23f8-43b4-4daa-9511-0c9fb98bad1c" providerId="ADAL" clId="{034AA59E-D954-44E8-84AB-C770C7EA240B}" dt="2023-09-14T10:31:54.427" v="1833"/>
+          <ac:cxnSpMkLst>
+            <pc:docMk/>
+            <pc:sldMk cId="592478941" sldId="362"/>
+            <ac:cxnSpMk id="56" creationId="{9D59ABA3-E840-B47C-8ED9-B71247C0BF87}"/>
+          </ac:cxnSpMkLst>
+        </pc:cxnChg>
+        <pc:cxnChg chg="add del mod">
+          <ac:chgData name="Manaswini Ray" userId="451f23f8-43b4-4daa-9511-0c9fb98bad1c" providerId="ADAL" clId="{034AA59E-D954-44E8-84AB-C770C7EA240B}" dt="2023-09-14T10:31:54.427" v="1833"/>
+          <ac:cxnSpMkLst>
+            <pc:docMk/>
+            <pc:sldMk cId="592478941" sldId="362"/>
+            <ac:cxnSpMk id="57" creationId="{D1707D6C-B64B-8276-96C7-6D58C531EC17}"/>
+          </ac:cxnSpMkLst>
+        </pc:cxnChg>
+        <pc:cxnChg chg="add mod">
+          <ac:chgData name="Manaswini Ray" userId="451f23f8-43b4-4daa-9511-0c9fb98bad1c" providerId="ADAL" clId="{034AA59E-D954-44E8-84AB-C770C7EA240B}" dt="2023-09-14T10:37:10.052" v="1924" actId="14100"/>
+          <ac:cxnSpMkLst>
+            <pc:docMk/>
+            <pc:sldMk cId="592478941" sldId="362"/>
+            <ac:cxnSpMk id="71" creationId="{D402AE5D-E7B4-BCB7-4431-8E12770D65EF}"/>
+          </ac:cxnSpMkLst>
+        </pc:cxnChg>
+        <pc:cxnChg chg="add mod">
+          <ac:chgData name="Manaswini Ray" userId="451f23f8-43b4-4daa-9511-0c9fb98bad1c" providerId="ADAL" clId="{034AA59E-D954-44E8-84AB-C770C7EA240B}" dt="2023-09-14T10:37:31.559" v="1927" actId="1076"/>
+          <ac:cxnSpMkLst>
+            <pc:docMk/>
+            <pc:sldMk cId="592478941" sldId="362"/>
+            <ac:cxnSpMk id="80" creationId="{661AE82D-F3EC-DACA-389B-A818DB7262F2}"/>
+          </ac:cxnSpMkLst>
+        </pc:cxnChg>
+        <pc:cxnChg chg="add mod">
+          <ac:chgData name="Manaswini Ray" userId="451f23f8-43b4-4daa-9511-0c9fb98bad1c" providerId="ADAL" clId="{034AA59E-D954-44E8-84AB-C770C7EA240B}" dt="2023-09-14T10:37:20.799" v="1925" actId="1076"/>
+          <ac:cxnSpMkLst>
+            <pc:docMk/>
+            <pc:sldMk cId="592478941" sldId="362"/>
+            <ac:cxnSpMk id="81" creationId="{05869FD4-240B-F66E-92B1-A3AB18CA67F8}"/>
+          </ac:cxnSpMkLst>
+        </pc:cxnChg>
+        <pc:cxnChg chg="add del mod">
+          <ac:chgData name="Manaswini Ray" userId="451f23f8-43b4-4daa-9511-0c9fb98bad1c" providerId="ADAL" clId="{034AA59E-D954-44E8-84AB-C770C7EA240B}" dt="2023-09-14T10:35:57.583" v="1912" actId="478"/>
+          <ac:cxnSpMkLst>
+            <pc:docMk/>
+            <pc:sldMk cId="592478941" sldId="362"/>
+            <ac:cxnSpMk id="82" creationId="{BC551395-EE64-2159-FB00-8796E988886E}"/>
           </ac:cxnSpMkLst>
         </pc:cxnChg>
       </pc:sldChg>
@@ -4794,6 +5337,90 @@
 </file>
 
 <file path=ppt/notesSlides/notesSlide1.xml><?xml version="1.0" encoding="utf-8"?>
+<p:notes xmlns:a="http://schemas.openxmlformats.org/drawingml/2006/main" xmlns:r="http://schemas.openxmlformats.org/officeDocument/2006/relationships" xmlns:p="http://schemas.openxmlformats.org/presentationml/2006/main">
+  <p:cSld>
+    <p:spTree>
+      <p:nvGrpSpPr>
+        <p:cNvPr id="1" name=""/>
+        <p:cNvGrpSpPr/>
+        <p:nvPr/>
+      </p:nvGrpSpPr>
+      <p:grpSpPr>
+        <a:xfrm>
+          <a:off x="0" y="0"/>
+          <a:ext cx="0" cy="0"/>
+          <a:chOff x="0" y="0"/>
+          <a:chExt cx="0" cy="0"/>
+        </a:xfrm>
+      </p:grpSpPr>
+      <p:sp>
+        <p:nvSpPr>
+          <p:cNvPr id="2" name="Slide Image Placeholder 1"/>
+          <p:cNvSpPr>
+            <a:spLocks noGrp="1" noRot="1" noChangeAspect="1"/>
+          </p:cNvSpPr>
+          <p:nvPr>
+            <p:ph type="sldImg"/>
+          </p:nvPr>
+        </p:nvSpPr>
+        <p:spPr/>
+      </p:sp>
+      <p:sp>
+        <p:nvSpPr>
+          <p:cNvPr id="3" name="Notes Placeholder 2"/>
+          <p:cNvSpPr>
+            <a:spLocks noGrp="1"/>
+          </p:cNvSpPr>
+          <p:nvPr>
+            <p:ph type="body" idx="1"/>
+          </p:nvPr>
+        </p:nvSpPr>
+        <p:spPr/>
+        <p:txBody>
+          <a:bodyPr/>
+          <a:lstStyle/>
+          <a:p>
+            <a:endParaRPr lang="en-IN" dirty="0"/>
+          </a:p>
+        </p:txBody>
+      </p:sp>
+      <p:sp>
+        <p:nvSpPr>
+          <p:cNvPr id="4" name="Slide Number Placeholder 3"/>
+          <p:cNvSpPr>
+            <a:spLocks noGrp="1"/>
+          </p:cNvSpPr>
+          <p:nvPr>
+            <p:ph type="sldNum" sz="quarter" idx="5"/>
+          </p:nvPr>
+        </p:nvSpPr>
+        <p:spPr/>
+        <p:txBody>
+          <a:bodyPr/>
+          <a:lstStyle/>
+          <a:p>
+            <a:fld id="{8CFD7A69-FA20-4EA6-BB4D-CD5B291B6EAE}" type="slidenum">
+              <a:rPr lang="en-IN" smtClean="0"/>
+              <a:t>1</a:t>
+            </a:fld>
+            <a:endParaRPr lang="en-IN"/>
+          </a:p>
+        </p:txBody>
+      </p:sp>
+    </p:spTree>
+    <p:extLst>
+      <p:ext uri="{BB962C8B-B14F-4D97-AF65-F5344CB8AC3E}">
+        <p14:creationId xmlns:p14="http://schemas.microsoft.com/office/powerpoint/2010/main" val="2395226955"/>
+      </p:ext>
+    </p:extLst>
+  </p:cSld>
+  <p:clrMapOvr>
+    <a:masterClrMapping/>
+  </p:clrMapOvr>
+</p:notes>
+</file>
+
+<file path=ppt/notesSlides/notesSlide2.xml><?xml version="1.0" encoding="utf-8"?>
 <p:notes xmlns:a="http://schemas.openxmlformats.org/drawingml/2006/main" xmlns:r="http://schemas.openxmlformats.org/officeDocument/2006/relationships" xmlns:p="http://schemas.openxmlformats.org/presentationml/2006/main">
   <p:cSld>
     <p:spTree>
@@ -8243,37 +8870,23 @@
             <p:ph type="ctrTitle"/>
           </p:nvPr>
         </p:nvSpPr>
-        <p:spPr/>
-        <p:txBody>
-          <a:bodyPr/>
-          <a:lstStyle/>
-          <a:p>
-            <a:endParaRPr lang="en-IN" dirty="0"/>
-          </a:p>
-        </p:txBody>
-      </p:sp>
-      <p:sp>
-        <p:nvSpPr>
-          <p:cNvPr id="3" name="Subtitle 2">
-            <a:extLst>
-              <a:ext uri="{FF2B5EF4-FFF2-40B4-BE49-F238E27FC236}">
-                <a16:creationId xmlns:a16="http://schemas.microsoft.com/office/drawing/2014/main" id="{44716E92-FEB4-D571-8FAF-8381E74ECB33}"/>
-              </a:ext>
-            </a:extLst>
-          </p:cNvPr>
-          <p:cNvSpPr>
-            <a:spLocks noGrp="1"/>
-          </p:cNvSpPr>
-          <p:nvPr>
-            <p:ph type="subTitle" idx="1"/>
-          </p:nvPr>
-        </p:nvSpPr>
-        <p:spPr/>
-        <p:txBody>
-          <a:bodyPr/>
-          <a:lstStyle/>
-          <a:p>
-            <a:endParaRPr lang="en-IN"/>
+        <p:spPr>
+          <a:xfrm>
+            <a:off x="1524000" y="1520396"/>
+            <a:ext cx="9144000" cy="2387600"/>
+          </a:xfrm>
+        </p:spPr>
+        <p:txBody>
+          <a:bodyPr>
+            <a:normAutofit/>
+          </a:bodyPr>
+          <a:lstStyle/>
+          <a:p>
+            <a:r>
+              <a:rPr lang="en-US" sz="8000" b="1" dirty="0"/>
+              <a:t>UML DIAGRAMS</a:t>
+            </a:r>
+            <a:endParaRPr lang="en-IN" sz="8000" b="1" dirty="0"/>
           </a:p>
         </p:txBody>
       </p:sp>
@@ -19645,6 +20258,1839 @@
   <p:clrMapOvr>
     <a:masterClrMapping/>
   </p:clrMapOvr>
+</p:sld>
+</file>
+
+<file path=ppt/slides/slide19.xml><?xml version="1.0" encoding="utf-8"?>
+<p:sld xmlns:a="http://schemas.openxmlformats.org/drawingml/2006/main" xmlns:r="http://schemas.openxmlformats.org/officeDocument/2006/relationships" xmlns:p="http://schemas.openxmlformats.org/presentationml/2006/main">
+  <p:cSld>
+    <p:spTree>
+      <p:nvGrpSpPr>
+        <p:cNvPr id="1" name=""/>
+        <p:cNvGrpSpPr/>
+        <p:nvPr/>
+      </p:nvGrpSpPr>
+      <p:grpSpPr>
+        <a:xfrm>
+          <a:off x="0" y="0"/>
+          <a:ext cx="0" cy="0"/>
+          <a:chOff x="0" y="0"/>
+          <a:chExt cx="0" cy="0"/>
+        </a:xfrm>
+      </p:grpSpPr>
+      <p:sp>
+        <p:nvSpPr>
+          <p:cNvPr id="2" name="Rectangle 1">
+            <a:extLst>
+              <a:ext uri="{FF2B5EF4-FFF2-40B4-BE49-F238E27FC236}">
+                <a16:creationId xmlns:a16="http://schemas.microsoft.com/office/drawing/2014/main" id="{90926BF3-B67F-A716-5A8C-4B0813531291}"/>
+              </a:ext>
+            </a:extLst>
+          </p:cNvPr>
+          <p:cNvSpPr/>
+          <p:nvPr/>
+        </p:nvSpPr>
+        <p:spPr>
+          <a:xfrm>
+            <a:off x="580254" y="581224"/>
+            <a:ext cx="4398866" cy="2658050"/>
+          </a:xfrm>
+          <a:prstGeom prst="rect">
+            <a:avLst/>
+          </a:prstGeom>
+          <a:noFill/>
+          <a:ln>
+            <a:solidFill>
+              <a:schemeClr val="bg2">
+                <a:lumMod val="10000"/>
+              </a:schemeClr>
+            </a:solidFill>
+          </a:ln>
+        </p:spPr>
+        <p:style>
+          <a:lnRef idx="2">
+            <a:schemeClr val="accent1">
+              <a:shade val="50000"/>
+            </a:schemeClr>
+          </a:lnRef>
+          <a:fillRef idx="1">
+            <a:schemeClr val="accent1"/>
+          </a:fillRef>
+          <a:effectRef idx="0">
+            <a:schemeClr val="accent1"/>
+          </a:effectRef>
+          <a:fontRef idx="minor">
+            <a:schemeClr val="lt1"/>
+          </a:fontRef>
+        </p:style>
+        <p:txBody>
+          <a:bodyPr rtlCol="0" anchor="ctr"/>
+          <a:lstStyle/>
+          <a:p>
+            <a:pPr algn="ctr"/>
+            <a:endParaRPr lang="en-IN"/>
+          </a:p>
+        </p:txBody>
+      </p:sp>
+      <p:cxnSp>
+        <p:nvCxnSpPr>
+          <p:cNvPr id="3" name="Straight Connector 2">
+            <a:extLst>
+              <a:ext uri="{FF2B5EF4-FFF2-40B4-BE49-F238E27FC236}">
+                <a16:creationId xmlns:a16="http://schemas.microsoft.com/office/drawing/2014/main" id="{F048E608-B3CB-B74D-755A-F8D0DDF672E4}"/>
+              </a:ext>
+            </a:extLst>
+          </p:cNvPr>
+          <p:cNvCxnSpPr>
+            <a:cxnSpLocks/>
+          </p:cNvCxnSpPr>
+          <p:nvPr/>
+        </p:nvCxnSpPr>
+        <p:spPr>
+          <a:xfrm>
+            <a:off x="580253" y="1154482"/>
+            <a:ext cx="4398867" cy="0"/>
+          </a:xfrm>
+          <a:prstGeom prst="line">
+            <a:avLst/>
+          </a:prstGeom>
+          <a:ln>
+            <a:solidFill>
+              <a:schemeClr val="tx1">
+                <a:lumMod val="95000"/>
+                <a:lumOff val="5000"/>
+              </a:schemeClr>
+            </a:solidFill>
+          </a:ln>
+        </p:spPr>
+        <p:style>
+          <a:lnRef idx="1">
+            <a:schemeClr val="accent1"/>
+          </a:lnRef>
+          <a:fillRef idx="0">
+            <a:schemeClr val="accent1"/>
+          </a:fillRef>
+          <a:effectRef idx="0">
+            <a:schemeClr val="accent1"/>
+          </a:effectRef>
+          <a:fontRef idx="minor">
+            <a:schemeClr val="tx1"/>
+          </a:fontRef>
+        </p:style>
+      </p:cxnSp>
+      <p:sp>
+        <p:nvSpPr>
+          <p:cNvPr id="4" name="TextBox 3">
+            <a:extLst>
+              <a:ext uri="{FF2B5EF4-FFF2-40B4-BE49-F238E27FC236}">
+                <a16:creationId xmlns:a16="http://schemas.microsoft.com/office/drawing/2014/main" id="{4AA06174-5F79-5624-5CF4-7CE8EC51AECB}"/>
+              </a:ext>
+            </a:extLst>
+          </p:cNvPr>
+          <p:cNvSpPr txBox="1"/>
+          <p:nvPr/>
+        </p:nvSpPr>
+        <p:spPr>
+          <a:xfrm>
+            <a:off x="580254" y="703363"/>
+            <a:ext cx="2684550" cy="369571"/>
+          </a:xfrm>
+          <a:prstGeom prst="rect">
+            <a:avLst/>
+          </a:prstGeom>
+          <a:noFill/>
+        </p:spPr>
+        <p:txBody>
+          <a:bodyPr wrap="square" rtlCol="0">
+            <a:spAutoFit/>
+          </a:bodyPr>
+          <a:lstStyle/>
+          <a:p>
+            <a:r>
+              <a:rPr lang="en-US" dirty="0" err="1"/>
+              <a:t>IMediator</a:t>
+            </a:r>
+            <a:endParaRPr lang="en-IN" dirty="0"/>
+          </a:p>
+        </p:txBody>
+      </p:sp>
+      <p:sp>
+        <p:nvSpPr>
+          <p:cNvPr id="8" name="TextBox 7">
+            <a:extLst>
+              <a:ext uri="{FF2B5EF4-FFF2-40B4-BE49-F238E27FC236}">
+                <a16:creationId xmlns:a16="http://schemas.microsoft.com/office/drawing/2014/main" id="{47420239-2D63-F19A-144B-2198282C2982}"/>
+              </a:ext>
+            </a:extLst>
+          </p:cNvPr>
+          <p:cNvSpPr txBox="1"/>
+          <p:nvPr/>
+        </p:nvSpPr>
+        <p:spPr>
+          <a:xfrm>
+            <a:off x="185786" y="119896"/>
+            <a:ext cx="6138040" cy="400110"/>
+          </a:xfrm>
+          <a:prstGeom prst="rect">
+            <a:avLst/>
+          </a:prstGeom>
+          <a:noFill/>
+        </p:spPr>
+        <p:txBody>
+          <a:bodyPr wrap="square">
+            <a:spAutoFit/>
+          </a:bodyPr>
+          <a:lstStyle/>
+          <a:p>
+            <a:r>
+              <a:rPr lang="en-US" sz="2000" b="1" u="sng" dirty="0">
+                <a:solidFill>
+                  <a:srgbClr val="000000"/>
+                </a:solidFill>
+              </a:rPr>
+              <a:t>Mediator </a:t>
+            </a:r>
+            <a:r>
+              <a:rPr lang="en-IN" sz="2000" b="1" u="sng" dirty="0">
+                <a:solidFill>
+                  <a:srgbClr val="000000"/>
+                </a:solidFill>
+              </a:rPr>
+              <a:t>Design Pattern</a:t>
+            </a:r>
+            <a:endParaRPr lang="en-IN" sz="2000" b="1" u="sng" dirty="0"/>
+          </a:p>
+        </p:txBody>
+      </p:sp>
+      <p:cxnSp>
+        <p:nvCxnSpPr>
+          <p:cNvPr id="11" name="Straight Connector 53">
+            <a:extLst>
+              <a:ext uri="{FF2B5EF4-FFF2-40B4-BE49-F238E27FC236}">
+                <a16:creationId xmlns:a16="http://schemas.microsoft.com/office/drawing/2014/main" id="{55899AEF-9D01-D2AE-E592-DD7EF712C8D5}"/>
+              </a:ext>
+            </a:extLst>
+          </p:cNvPr>
+          <p:cNvCxnSpPr>
+            <a:cxnSpLocks/>
+            <a:stCxn id="12" idx="1"/>
+          </p:cNvCxnSpPr>
+          <p:nvPr/>
+        </p:nvCxnSpPr>
+        <p:spPr>
+          <a:xfrm rot="10800000" flipH="1" flipV="1">
+            <a:off x="642967" y="2361334"/>
+            <a:ext cx="608059" cy="1411849"/>
+          </a:xfrm>
+          <a:prstGeom prst="bentConnector4">
+            <a:avLst>
+              <a:gd name="adj1" fmla="val -37595"/>
+              <a:gd name="adj2" fmla="val 85969"/>
+            </a:avLst>
+          </a:prstGeom>
+          <a:ln w="19050">
+            <a:prstDash val="lgDashDot"/>
+          </a:ln>
+        </p:spPr>
+        <p:style>
+          <a:lnRef idx="1">
+            <a:schemeClr val="dk1"/>
+          </a:lnRef>
+          <a:fillRef idx="0">
+            <a:schemeClr val="dk1"/>
+          </a:fillRef>
+          <a:effectRef idx="0">
+            <a:schemeClr val="dk1"/>
+          </a:effectRef>
+          <a:fontRef idx="minor">
+            <a:schemeClr val="tx1"/>
+          </a:fontRef>
+        </p:style>
+      </p:cxnSp>
+      <p:sp>
+        <p:nvSpPr>
+          <p:cNvPr id="12" name="TextBox 11">
+            <a:extLst>
+              <a:ext uri="{FF2B5EF4-FFF2-40B4-BE49-F238E27FC236}">
+                <a16:creationId xmlns:a16="http://schemas.microsoft.com/office/drawing/2014/main" id="{E45EFFC8-FBFB-D82B-6436-8FF4ADDA1C80}"/>
+              </a:ext>
+            </a:extLst>
+          </p:cNvPr>
+          <p:cNvSpPr txBox="1"/>
+          <p:nvPr/>
+        </p:nvSpPr>
+        <p:spPr>
+          <a:xfrm>
+            <a:off x="642968" y="1345672"/>
+            <a:ext cx="4582365" cy="2031325"/>
+          </a:xfrm>
+          <a:prstGeom prst="rect">
+            <a:avLst/>
+          </a:prstGeom>
+          <a:noFill/>
+        </p:spPr>
+        <p:txBody>
+          <a:bodyPr wrap="square" rtlCol="0">
+            <a:spAutoFit/>
+          </a:bodyPr>
+          <a:lstStyle/>
+          <a:p>
+            <a:r>
+              <a:rPr lang="en-US" dirty="0"/>
+              <a:t>void </a:t>
+            </a:r>
+            <a:r>
+              <a:rPr lang="en-US" dirty="0" err="1"/>
+              <a:t>RegisterDevice</a:t>
+            </a:r>
+            <a:r>
+              <a:rPr lang="en-US" dirty="0"/>
+              <a:t>(</a:t>
+            </a:r>
+            <a:r>
+              <a:rPr lang="en-US" dirty="0" err="1"/>
+              <a:t>IDevice</a:t>
+            </a:r>
+            <a:r>
+              <a:rPr lang="en-US" dirty="0"/>
+              <a:t> device);</a:t>
+            </a:r>
+          </a:p>
+          <a:p>
+            <a:r>
+              <a:rPr lang="en-US" dirty="0"/>
+              <a:t>void </a:t>
+            </a:r>
+            <a:r>
+              <a:rPr lang="en-US" dirty="0" err="1"/>
+              <a:t>TurnOffAllDevices</a:t>
+            </a:r>
+            <a:r>
+              <a:rPr lang="en-US" dirty="0"/>
+              <a:t>();</a:t>
+            </a:r>
+          </a:p>
+          <a:p>
+            <a:r>
+              <a:rPr lang="en-US" dirty="0"/>
+              <a:t>void </a:t>
+            </a:r>
+            <a:r>
+              <a:rPr lang="en-US" dirty="0" err="1"/>
+              <a:t>TurnOnAllDevices</a:t>
+            </a:r>
+            <a:r>
+              <a:rPr lang="en-US" dirty="0"/>
+              <a:t>();</a:t>
+            </a:r>
+          </a:p>
+          <a:p>
+            <a:r>
+              <a:rPr lang="en-US" dirty="0"/>
+              <a:t>void </a:t>
+            </a:r>
+            <a:r>
+              <a:rPr lang="en-US" dirty="0" err="1"/>
+              <a:t>TurnOffDevice</a:t>
+            </a:r>
+            <a:r>
+              <a:rPr lang="en-US" dirty="0"/>
+              <a:t>(</a:t>
+            </a:r>
+            <a:r>
+              <a:rPr lang="en-US" dirty="0" err="1"/>
+              <a:t>IDevice</a:t>
+            </a:r>
+            <a:r>
+              <a:rPr lang="en-US" dirty="0"/>
+              <a:t> device);</a:t>
+            </a:r>
+          </a:p>
+          <a:p>
+            <a:r>
+              <a:rPr lang="en-US" dirty="0"/>
+              <a:t>void </a:t>
+            </a:r>
+            <a:r>
+              <a:rPr lang="en-US" dirty="0" err="1"/>
+              <a:t>TurnOnDevice</a:t>
+            </a:r>
+            <a:r>
+              <a:rPr lang="en-US" dirty="0"/>
+              <a:t>(</a:t>
+            </a:r>
+            <a:r>
+              <a:rPr lang="en-US" dirty="0" err="1"/>
+              <a:t>IDevice</a:t>
+            </a:r>
+            <a:r>
+              <a:rPr lang="en-US" dirty="0"/>
+              <a:t> device);</a:t>
+            </a:r>
+          </a:p>
+          <a:p>
+            <a:r>
+              <a:rPr lang="en-US" dirty="0"/>
+              <a:t>void </a:t>
+            </a:r>
+            <a:r>
+              <a:rPr lang="en-US" dirty="0" err="1"/>
+              <a:t>AdjustDevice</a:t>
+            </a:r>
+            <a:r>
+              <a:rPr lang="en-US" dirty="0"/>
+              <a:t>(</a:t>
+            </a:r>
+            <a:r>
+              <a:rPr lang="en-US" dirty="0" err="1"/>
+              <a:t>IDevice</a:t>
+            </a:r>
+            <a:r>
+              <a:rPr lang="en-US" dirty="0"/>
+              <a:t> device);</a:t>
+            </a:r>
+          </a:p>
+          <a:p>
+            <a:endParaRPr lang="en-US" dirty="0"/>
+          </a:p>
+        </p:txBody>
+      </p:sp>
+      <p:sp>
+        <p:nvSpPr>
+          <p:cNvPr id="16" name="Rectangle 15">
+            <a:extLst>
+              <a:ext uri="{FF2B5EF4-FFF2-40B4-BE49-F238E27FC236}">
+                <a16:creationId xmlns:a16="http://schemas.microsoft.com/office/drawing/2014/main" id="{54BE5C6B-7195-1F79-C5E4-692E1AB63DB8}"/>
+              </a:ext>
+            </a:extLst>
+          </p:cNvPr>
+          <p:cNvSpPr/>
+          <p:nvPr/>
+        </p:nvSpPr>
+        <p:spPr>
+          <a:xfrm>
+            <a:off x="5471552" y="703363"/>
+            <a:ext cx="4398866" cy="2658050"/>
+          </a:xfrm>
+          <a:prstGeom prst="rect">
+            <a:avLst/>
+          </a:prstGeom>
+          <a:noFill/>
+          <a:ln>
+            <a:solidFill>
+              <a:schemeClr val="bg2">
+                <a:lumMod val="10000"/>
+              </a:schemeClr>
+            </a:solidFill>
+          </a:ln>
+        </p:spPr>
+        <p:style>
+          <a:lnRef idx="2">
+            <a:schemeClr val="accent1">
+              <a:shade val="50000"/>
+            </a:schemeClr>
+          </a:lnRef>
+          <a:fillRef idx="1">
+            <a:schemeClr val="accent1"/>
+          </a:fillRef>
+          <a:effectRef idx="0">
+            <a:schemeClr val="accent1"/>
+          </a:effectRef>
+          <a:fontRef idx="minor">
+            <a:schemeClr val="lt1"/>
+          </a:fontRef>
+        </p:style>
+        <p:txBody>
+          <a:bodyPr rtlCol="0" anchor="ctr"/>
+          <a:lstStyle/>
+          <a:p>
+            <a:pPr algn="ctr"/>
+            <a:endParaRPr lang="en-IN"/>
+          </a:p>
+        </p:txBody>
+      </p:sp>
+      <p:cxnSp>
+        <p:nvCxnSpPr>
+          <p:cNvPr id="17" name="Straight Connector 16">
+            <a:extLst>
+              <a:ext uri="{FF2B5EF4-FFF2-40B4-BE49-F238E27FC236}">
+                <a16:creationId xmlns:a16="http://schemas.microsoft.com/office/drawing/2014/main" id="{1A573B48-95F4-B2E3-3403-66BBAAFE4A1F}"/>
+              </a:ext>
+            </a:extLst>
+          </p:cNvPr>
+          <p:cNvCxnSpPr>
+            <a:cxnSpLocks/>
+          </p:cNvCxnSpPr>
+          <p:nvPr/>
+        </p:nvCxnSpPr>
+        <p:spPr>
+          <a:xfrm>
+            <a:off x="5471551" y="1276621"/>
+            <a:ext cx="4398867" cy="0"/>
+          </a:xfrm>
+          <a:prstGeom prst="line">
+            <a:avLst/>
+          </a:prstGeom>
+          <a:ln>
+            <a:solidFill>
+              <a:schemeClr val="tx1">
+                <a:lumMod val="95000"/>
+                <a:lumOff val="5000"/>
+              </a:schemeClr>
+            </a:solidFill>
+          </a:ln>
+        </p:spPr>
+        <p:style>
+          <a:lnRef idx="1">
+            <a:schemeClr val="accent1"/>
+          </a:lnRef>
+          <a:fillRef idx="0">
+            <a:schemeClr val="accent1"/>
+          </a:fillRef>
+          <a:effectRef idx="0">
+            <a:schemeClr val="accent1"/>
+          </a:effectRef>
+          <a:fontRef idx="minor">
+            <a:schemeClr val="tx1"/>
+          </a:fontRef>
+        </p:style>
+      </p:cxnSp>
+      <p:sp>
+        <p:nvSpPr>
+          <p:cNvPr id="18" name="TextBox 17">
+            <a:extLst>
+              <a:ext uri="{FF2B5EF4-FFF2-40B4-BE49-F238E27FC236}">
+                <a16:creationId xmlns:a16="http://schemas.microsoft.com/office/drawing/2014/main" id="{18360850-E966-ED0C-449B-6F3F2E7ED487}"/>
+              </a:ext>
+            </a:extLst>
+          </p:cNvPr>
+          <p:cNvSpPr txBox="1"/>
+          <p:nvPr/>
+        </p:nvSpPr>
+        <p:spPr>
+          <a:xfrm>
+            <a:off x="5471552" y="825502"/>
+            <a:ext cx="2684550" cy="369571"/>
+          </a:xfrm>
+          <a:prstGeom prst="rect">
+            <a:avLst/>
+          </a:prstGeom>
+          <a:noFill/>
+        </p:spPr>
+        <p:txBody>
+          <a:bodyPr wrap="square" rtlCol="0">
+            <a:spAutoFit/>
+          </a:bodyPr>
+          <a:lstStyle/>
+          <a:p>
+            <a:r>
+              <a:rPr lang="en-US" dirty="0" err="1"/>
+              <a:t>SmartAssistantMediator</a:t>
+            </a:r>
+            <a:endParaRPr lang="en-IN" dirty="0"/>
+          </a:p>
+        </p:txBody>
+      </p:sp>
+      <p:sp>
+        <p:nvSpPr>
+          <p:cNvPr id="19" name="TextBox 18">
+            <a:extLst>
+              <a:ext uri="{FF2B5EF4-FFF2-40B4-BE49-F238E27FC236}">
+                <a16:creationId xmlns:a16="http://schemas.microsoft.com/office/drawing/2014/main" id="{3A649D37-3738-2FC1-7328-6F647B0111EE}"/>
+              </a:ext>
+            </a:extLst>
+          </p:cNvPr>
+          <p:cNvSpPr txBox="1"/>
+          <p:nvPr/>
+        </p:nvSpPr>
+        <p:spPr>
+          <a:xfrm>
+            <a:off x="5471550" y="1260529"/>
+            <a:ext cx="4582365" cy="2308324"/>
+          </a:xfrm>
+          <a:prstGeom prst="rect">
+            <a:avLst/>
+          </a:prstGeom>
+          <a:noFill/>
+        </p:spPr>
+        <p:txBody>
+          <a:bodyPr wrap="square" rtlCol="0">
+            <a:spAutoFit/>
+          </a:bodyPr>
+          <a:lstStyle/>
+          <a:p>
+            <a:r>
+              <a:rPr lang="en-US" dirty="0"/>
+              <a:t>_</a:t>
+            </a:r>
+            <a:r>
+              <a:rPr lang="en-US" dirty="0" err="1"/>
+              <a:t>devicesList</a:t>
+            </a:r>
+            <a:endParaRPr lang="en-US" dirty="0"/>
+          </a:p>
+          <a:p>
+            <a:r>
+              <a:rPr lang="en-US" dirty="0"/>
+              <a:t>void </a:t>
+            </a:r>
+            <a:r>
+              <a:rPr lang="en-US" dirty="0" err="1"/>
+              <a:t>RegisterDevice</a:t>
+            </a:r>
+            <a:r>
+              <a:rPr lang="en-US" dirty="0"/>
+              <a:t>(</a:t>
+            </a:r>
+            <a:r>
+              <a:rPr lang="en-US" dirty="0" err="1"/>
+              <a:t>IDevice</a:t>
+            </a:r>
+            <a:r>
+              <a:rPr lang="en-US" dirty="0"/>
+              <a:t> device){}</a:t>
+            </a:r>
+          </a:p>
+          <a:p>
+            <a:r>
+              <a:rPr lang="en-US" dirty="0"/>
+              <a:t>void </a:t>
+            </a:r>
+            <a:r>
+              <a:rPr lang="en-US" dirty="0" err="1"/>
+              <a:t>TurnOffAllDevices</a:t>
+            </a:r>
+            <a:r>
+              <a:rPr lang="en-US" dirty="0"/>
+              <a:t>(){}</a:t>
+            </a:r>
+          </a:p>
+          <a:p>
+            <a:r>
+              <a:rPr lang="en-US" dirty="0"/>
+              <a:t>void </a:t>
+            </a:r>
+            <a:r>
+              <a:rPr lang="en-US" dirty="0" err="1"/>
+              <a:t>TurnOnAllDevices</a:t>
+            </a:r>
+            <a:r>
+              <a:rPr lang="en-US" dirty="0"/>
+              <a:t>(){}</a:t>
+            </a:r>
+          </a:p>
+          <a:p>
+            <a:r>
+              <a:rPr lang="en-US" dirty="0"/>
+              <a:t>void </a:t>
+            </a:r>
+            <a:r>
+              <a:rPr lang="en-US" dirty="0" err="1"/>
+              <a:t>TurnOffDevice</a:t>
+            </a:r>
+            <a:r>
+              <a:rPr lang="en-US" dirty="0"/>
+              <a:t>(</a:t>
+            </a:r>
+            <a:r>
+              <a:rPr lang="en-US" dirty="0" err="1"/>
+              <a:t>IDevice</a:t>
+            </a:r>
+            <a:r>
+              <a:rPr lang="en-US" dirty="0"/>
+              <a:t> device){}</a:t>
+            </a:r>
+          </a:p>
+          <a:p>
+            <a:r>
+              <a:rPr lang="en-US" dirty="0"/>
+              <a:t>void </a:t>
+            </a:r>
+            <a:r>
+              <a:rPr lang="en-US" dirty="0" err="1"/>
+              <a:t>TurnOnDevice</a:t>
+            </a:r>
+            <a:r>
+              <a:rPr lang="en-US" dirty="0"/>
+              <a:t>(</a:t>
+            </a:r>
+            <a:r>
+              <a:rPr lang="en-US" dirty="0" err="1"/>
+              <a:t>IDevice</a:t>
+            </a:r>
+            <a:r>
+              <a:rPr lang="en-US" dirty="0"/>
+              <a:t> device){}</a:t>
+            </a:r>
+          </a:p>
+          <a:p>
+            <a:r>
+              <a:rPr lang="en-US" dirty="0"/>
+              <a:t>void </a:t>
+            </a:r>
+            <a:r>
+              <a:rPr lang="en-US" dirty="0" err="1"/>
+              <a:t>AdjustDevice</a:t>
+            </a:r>
+            <a:r>
+              <a:rPr lang="en-US" dirty="0"/>
+              <a:t>(</a:t>
+            </a:r>
+            <a:r>
+              <a:rPr lang="en-US" dirty="0" err="1"/>
+              <a:t>IDevice</a:t>
+            </a:r>
+            <a:r>
+              <a:rPr lang="en-US" dirty="0"/>
+              <a:t> device){}</a:t>
+            </a:r>
+          </a:p>
+          <a:p>
+            <a:endParaRPr lang="en-US" dirty="0"/>
+          </a:p>
+        </p:txBody>
+      </p:sp>
+      <p:cxnSp>
+        <p:nvCxnSpPr>
+          <p:cNvPr id="20" name="Straight Arrow Connector 17">
+            <a:extLst>
+              <a:ext uri="{FF2B5EF4-FFF2-40B4-BE49-F238E27FC236}">
+                <a16:creationId xmlns:a16="http://schemas.microsoft.com/office/drawing/2014/main" id="{0C3D24E1-2E8D-7176-BE07-999B0FDEF466}"/>
+              </a:ext>
+            </a:extLst>
+          </p:cNvPr>
+          <p:cNvCxnSpPr>
+            <a:cxnSpLocks/>
+            <a:stCxn id="19" idx="1"/>
+            <a:endCxn id="2" idx="2"/>
+          </p:cNvCxnSpPr>
+          <p:nvPr/>
+        </p:nvCxnSpPr>
+        <p:spPr>
+          <a:xfrm rot="10800000" flipV="1">
+            <a:off x="2779688" y="2414690"/>
+            <a:ext cx="2691863" cy="824583"/>
+          </a:xfrm>
+          <a:prstGeom prst="bentConnector4">
+            <a:avLst>
+              <a:gd name="adj1" fmla="val 9147"/>
+              <a:gd name="adj2" fmla="val 143230"/>
+            </a:avLst>
+          </a:prstGeom>
+          <a:ln w="28575">
+            <a:tailEnd type="triangle"/>
+          </a:ln>
+        </p:spPr>
+        <p:style>
+          <a:lnRef idx="1">
+            <a:schemeClr val="dk1"/>
+          </a:lnRef>
+          <a:fillRef idx="0">
+            <a:schemeClr val="dk1"/>
+          </a:fillRef>
+          <a:effectRef idx="0">
+            <a:schemeClr val="dk1"/>
+          </a:effectRef>
+          <a:fontRef idx="minor">
+            <a:schemeClr val="tx1"/>
+          </a:fontRef>
+        </p:style>
+      </p:cxnSp>
+      <p:sp>
+        <p:nvSpPr>
+          <p:cNvPr id="23" name="Rectangle 22">
+            <a:extLst>
+              <a:ext uri="{FF2B5EF4-FFF2-40B4-BE49-F238E27FC236}">
+                <a16:creationId xmlns:a16="http://schemas.microsoft.com/office/drawing/2014/main" id="{970C95FE-A257-68AD-DDF5-39E771B603ED}"/>
+              </a:ext>
+            </a:extLst>
+          </p:cNvPr>
+          <p:cNvSpPr/>
+          <p:nvPr/>
+        </p:nvSpPr>
+        <p:spPr>
+          <a:xfrm>
+            <a:off x="736087" y="3736289"/>
+            <a:ext cx="3593866" cy="2281140"/>
+          </a:xfrm>
+          <a:prstGeom prst="rect">
+            <a:avLst/>
+          </a:prstGeom>
+          <a:noFill/>
+          <a:ln>
+            <a:solidFill>
+              <a:schemeClr val="bg2">
+                <a:lumMod val="10000"/>
+              </a:schemeClr>
+            </a:solidFill>
+          </a:ln>
+        </p:spPr>
+        <p:style>
+          <a:lnRef idx="2">
+            <a:schemeClr val="accent1">
+              <a:shade val="50000"/>
+            </a:schemeClr>
+          </a:lnRef>
+          <a:fillRef idx="1">
+            <a:schemeClr val="accent1"/>
+          </a:fillRef>
+          <a:effectRef idx="0">
+            <a:schemeClr val="accent1"/>
+          </a:effectRef>
+          <a:fontRef idx="minor">
+            <a:schemeClr val="lt1"/>
+          </a:fontRef>
+        </p:style>
+        <p:txBody>
+          <a:bodyPr rtlCol="0" anchor="ctr"/>
+          <a:lstStyle/>
+          <a:p>
+            <a:pPr algn="ctr"/>
+            <a:endParaRPr lang="en-IN"/>
+          </a:p>
+        </p:txBody>
+      </p:sp>
+      <p:cxnSp>
+        <p:nvCxnSpPr>
+          <p:cNvPr id="24" name="Straight Connector 23">
+            <a:extLst>
+              <a:ext uri="{FF2B5EF4-FFF2-40B4-BE49-F238E27FC236}">
+                <a16:creationId xmlns:a16="http://schemas.microsoft.com/office/drawing/2014/main" id="{17598B8D-61DD-4C6A-1587-38C9B11D0F3B}"/>
+              </a:ext>
+            </a:extLst>
+          </p:cNvPr>
+          <p:cNvCxnSpPr>
+            <a:cxnSpLocks/>
+          </p:cNvCxnSpPr>
+          <p:nvPr/>
+        </p:nvCxnSpPr>
+        <p:spPr>
+          <a:xfrm>
+            <a:off x="736086" y="4309547"/>
+            <a:ext cx="3593867" cy="0"/>
+          </a:xfrm>
+          <a:prstGeom prst="line">
+            <a:avLst/>
+          </a:prstGeom>
+          <a:ln>
+            <a:solidFill>
+              <a:schemeClr val="tx1">
+                <a:lumMod val="95000"/>
+                <a:lumOff val="5000"/>
+              </a:schemeClr>
+            </a:solidFill>
+          </a:ln>
+        </p:spPr>
+        <p:style>
+          <a:lnRef idx="1">
+            <a:schemeClr val="accent1"/>
+          </a:lnRef>
+          <a:fillRef idx="0">
+            <a:schemeClr val="accent1"/>
+          </a:fillRef>
+          <a:effectRef idx="0">
+            <a:schemeClr val="accent1"/>
+          </a:effectRef>
+          <a:fontRef idx="minor">
+            <a:schemeClr val="tx1"/>
+          </a:fontRef>
+        </p:style>
+      </p:cxnSp>
+      <p:sp>
+        <p:nvSpPr>
+          <p:cNvPr id="25" name="TextBox 24">
+            <a:extLst>
+              <a:ext uri="{FF2B5EF4-FFF2-40B4-BE49-F238E27FC236}">
+                <a16:creationId xmlns:a16="http://schemas.microsoft.com/office/drawing/2014/main" id="{F3C2EB61-61D8-D50F-ED83-CEEFC6A1E427}"/>
+              </a:ext>
+            </a:extLst>
+          </p:cNvPr>
+          <p:cNvSpPr txBox="1"/>
+          <p:nvPr/>
+        </p:nvSpPr>
+        <p:spPr>
+          <a:xfrm>
+            <a:off x="736087" y="3858428"/>
+            <a:ext cx="2684550" cy="369571"/>
+          </a:xfrm>
+          <a:prstGeom prst="rect">
+            <a:avLst/>
+          </a:prstGeom>
+          <a:noFill/>
+        </p:spPr>
+        <p:txBody>
+          <a:bodyPr wrap="square" rtlCol="0">
+            <a:spAutoFit/>
+          </a:bodyPr>
+          <a:lstStyle/>
+          <a:p>
+            <a:r>
+              <a:rPr lang="en-US" dirty="0" err="1"/>
+              <a:t>IDevice</a:t>
+            </a:r>
+            <a:endParaRPr lang="en-IN" dirty="0"/>
+          </a:p>
+        </p:txBody>
+      </p:sp>
+      <p:sp>
+        <p:nvSpPr>
+          <p:cNvPr id="26" name="TextBox 25">
+            <a:extLst>
+              <a:ext uri="{FF2B5EF4-FFF2-40B4-BE49-F238E27FC236}">
+                <a16:creationId xmlns:a16="http://schemas.microsoft.com/office/drawing/2014/main" id="{0778CD71-1AFD-FD76-C4C9-08E66216D9BD}"/>
+              </a:ext>
+            </a:extLst>
+          </p:cNvPr>
+          <p:cNvSpPr txBox="1"/>
+          <p:nvPr/>
+        </p:nvSpPr>
+        <p:spPr>
+          <a:xfrm>
+            <a:off x="736086" y="4540103"/>
+            <a:ext cx="4582365" cy="1477328"/>
+          </a:xfrm>
+          <a:prstGeom prst="rect">
+            <a:avLst/>
+          </a:prstGeom>
+          <a:noFill/>
+        </p:spPr>
+        <p:txBody>
+          <a:bodyPr wrap="square" rtlCol="0">
+            <a:spAutoFit/>
+          </a:bodyPr>
+          <a:lstStyle/>
+          <a:p>
+            <a:r>
+              <a:rPr lang="en-US" dirty="0"/>
+              <a:t>void </a:t>
+            </a:r>
+            <a:r>
+              <a:rPr lang="en-US" dirty="0" err="1"/>
+              <a:t>SetMediator</a:t>
+            </a:r>
+            <a:r>
+              <a:rPr lang="en-US" dirty="0"/>
+              <a:t>(</a:t>
+            </a:r>
+            <a:r>
+              <a:rPr lang="en-US" dirty="0" err="1"/>
+              <a:t>IDevice</a:t>
+            </a:r>
+            <a:r>
+              <a:rPr lang="en-US" dirty="0"/>
+              <a:t> device);</a:t>
+            </a:r>
+          </a:p>
+          <a:p>
+            <a:r>
+              <a:rPr lang="en-US" dirty="0"/>
+              <a:t>void </a:t>
+            </a:r>
+            <a:r>
+              <a:rPr lang="en-US" dirty="0" err="1"/>
+              <a:t>TurnOffDevice</a:t>
+            </a:r>
+            <a:r>
+              <a:rPr lang="en-US" dirty="0"/>
+              <a:t>(</a:t>
+            </a:r>
+            <a:r>
+              <a:rPr lang="en-US" dirty="0" err="1"/>
+              <a:t>IDevice</a:t>
+            </a:r>
+            <a:r>
+              <a:rPr lang="en-US" dirty="0"/>
+              <a:t> device);</a:t>
+            </a:r>
+          </a:p>
+          <a:p>
+            <a:r>
+              <a:rPr lang="en-US" dirty="0"/>
+              <a:t>void </a:t>
+            </a:r>
+            <a:r>
+              <a:rPr lang="en-US" dirty="0" err="1"/>
+              <a:t>TurnOnDevice</a:t>
+            </a:r>
+            <a:r>
+              <a:rPr lang="en-US" dirty="0"/>
+              <a:t>();</a:t>
+            </a:r>
+          </a:p>
+          <a:p>
+            <a:r>
+              <a:rPr lang="en-US" dirty="0"/>
+              <a:t>void </a:t>
+            </a:r>
+            <a:r>
+              <a:rPr lang="en-US" dirty="0" err="1"/>
+              <a:t>AdjustDevice</a:t>
+            </a:r>
+            <a:r>
+              <a:rPr lang="en-US" dirty="0"/>
+              <a:t>(int value);</a:t>
+            </a:r>
+          </a:p>
+          <a:p>
+            <a:endParaRPr lang="en-US" dirty="0"/>
+          </a:p>
+        </p:txBody>
+      </p:sp>
+      <p:sp>
+        <p:nvSpPr>
+          <p:cNvPr id="33" name="Rectangle 32">
+            <a:extLst>
+              <a:ext uri="{FF2B5EF4-FFF2-40B4-BE49-F238E27FC236}">
+                <a16:creationId xmlns:a16="http://schemas.microsoft.com/office/drawing/2014/main" id="{F4136DB8-0C45-2C98-8376-850BA43EEF3E}"/>
+              </a:ext>
+            </a:extLst>
+          </p:cNvPr>
+          <p:cNvSpPr/>
+          <p:nvPr/>
+        </p:nvSpPr>
+        <p:spPr>
+          <a:xfrm>
+            <a:off x="4609510" y="4429190"/>
+            <a:ext cx="3593866" cy="2281140"/>
+          </a:xfrm>
+          <a:prstGeom prst="rect">
+            <a:avLst/>
+          </a:prstGeom>
+          <a:noFill/>
+          <a:ln>
+            <a:solidFill>
+              <a:schemeClr val="bg2">
+                <a:lumMod val="10000"/>
+              </a:schemeClr>
+            </a:solidFill>
+          </a:ln>
+        </p:spPr>
+        <p:style>
+          <a:lnRef idx="2">
+            <a:schemeClr val="accent1">
+              <a:shade val="50000"/>
+            </a:schemeClr>
+          </a:lnRef>
+          <a:fillRef idx="1">
+            <a:schemeClr val="accent1"/>
+          </a:fillRef>
+          <a:effectRef idx="0">
+            <a:schemeClr val="accent1"/>
+          </a:effectRef>
+          <a:fontRef idx="minor">
+            <a:schemeClr val="lt1"/>
+          </a:fontRef>
+        </p:style>
+        <p:txBody>
+          <a:bodyPr rtlCol="0" anchor="ctr"/>
+          <a:lstStyle/>
+          <a:p>
+            <a:pPr algn="ctr"/>
+            <a:endParaRPr lang="en-IN"/>
+          </a:p>
+        </p:txBody>
+      </p:sp>
+      <p:cxnSp>
+        <p:nvCxnSpPr>
+          <p:cNvPr id="34" name="Straight Connector 33">
+            <a:extLst>
+              <a:ext uri="{FF2B5EF4-FFF2-40B4-BE49-F238E27FC236}">
+                <a16:creationId xmlns:a16="http://schemas.microsoft.com/office/drawing/2014/main" id="{47E9B744-1DFC-EB90-48F3-993D7CE8C34B}"/>
+              </a:ext>
+            </a:extLst>
+          </p:cNvPr>
+          <p:cNvCxnSpPr>
+            <a:cxnSpLocks/>
+          </p:cNvCxnSpPr>
+          <p:nvPr/>
+        </p:nvCxnSpPr>
+        <p:spPr>
+          <a:xfrm>
+            <a:off x="4609509" y="5002448"/>
+            <a:ext cx="3593867" cy="0"/>
+          </a:xfrm>
+          <a:prstGeom prst="line">
+            <a:avLst/>
+          </a:prstGeom>
+          <a:ln>
+            <a:solidFill>
+              <a:schemeClr val="tx1">
+                <a:lumMod val="95000"/>
+                <a:lumOff val="5000"/>
+              </a:schemeClr>
+            </a:solidFill>
+          </a:ln>
+        </p:spPr>
+        <p:style>
+          <a:lnRef idx="1">
+            <a:schemeClr val="accent1"/>
+          </a:lnRef>
+          <a:fillRef idx="0">
+            <a:schemeClr val="accent1"/>
+          </a:fillRef>
+          <a:effectRef idx="0">
+            <a:schemeClr val="accent1"/>
+          </a:effectRef>
+          <a:fontRef idx="minor">
+            <a:schemeClr val="tx1"/>
+          </a:fontRef>
+        </p:style>
+      </p:cxnSp>
+      <p:sp>
+        <p:nvSpPr>
+          <p:cNvPr id="35" name="TextBox 34">
+            <a:extLst>
+              <a:ext uri="{FF2B5EF4-FFF2-40B4-BE49-F238E27FC236}">
+                <a16:creationId xmlns:a16="http://schemas.microsoft.com/office/drawing/2014/main" id="{13EAE598-B70D-A21B-9A5B-8EE00420E2D2}"/>
+              </a:ext>
+            </a:extLst>
+          </p:cNvPr>
+          <p:cNvSpPr txBox="1"/>
+          <p:nvPr/>
+        </p:nvSpPr>
+        <p:spPr>
+          <a:xfrm>
+            <a:off x="4609510" y="4551329"/>
+            <a:ext cx="2684550" cy="369571"/>
+          </a:xfrm>
+          <a:prstGeom prst="rect">
+            <a:avLst/>
+          </a:prstGeom>
+          <a:noFill/>
+        </p:spPr>
+        <p:txBody>
+          <a:bodyPr wrap="square" rtlCol="0">
+            <a:spAutoFit/>
+          </a:bodyPr>
+          <a:lstStyle/>
+          <a:p>
+            <a:r>
+              <a:rPr lang="en-US" dirty="0"/>
+              <a:t>Device</a:t>
+            </a:r>
+            <a:endParaRPr lang="en-IN" dirty="0"/>
+          </a:p>
+        </p:txBody>
+      </p:sp>
+      <p:sp>
+        <p:nvSpPr>
+          <p:cNvPr id="36" name="TextBox 35">
+            <a:extLst>
+              <a:ext uri="{FF2B5EF4-FFF2-40B4-BE49-F238E27FC236}">
+                <a16:creationId xmlns:a16="http://schemas.microsoft.com/office/drawing/2014/main" id="{DB6325AA-741C-7D95-7289-6B3F83EA8563}"/>
+              </a:ext>
+            </a:extLst>
+          </p:cNvPr>
+          <p:cNvSpPr txBox="1"/>
+          <p:nvPr/>
+        </p:nvSpPr>
+        <p:spPr>
+          <a:xfrm>
+            <a:off x="4582879" y="5146768"/>
+            <a:ext cx="4211762" cy="1477328"/>
+          </a:xfrm>
+          <a:prstGeom prst="rect">
+            <a:avLst/>
+          </a:prstGeom>
+          <a:noFill/>
+        </p:spPr>
+        <p:txBody>
+          <a:bodyPr wrap="square" rtlCol="0">
+            <a:spAutoFit/>
+          </a:bodyPr>
+          <a:lstStyle/>
+          <a:p>
+            <a:r>
+              <a:rPr lang="en-US" dirty="0"/>
+              <a:t>void </a:t>
+            </a:r>
+            <a:r>
+              <a:rPr lang="en-US" dirty="0" err="1"/>
+              <a:t>SetMediator</a:t>
+            </a:r>
+            <a:r>
+              <a:rPr lang="en-US" dirty="0"/>
+              <a:t>(</a:t>
+            </a:r>
+            <a:r>
+              <a:rPr lang="en-US" dirty="0" err="1"/>
+              <a:t>IDevice</a:t>
+            </a:r>
+            <a:r>
+              <a:rPr lang="en-US" dirty="0"/>
+              <a:t> device){}</a:t>
+            </a:r>
+          </a:p>
+          <a:p>
+            <a:r>
+              <a:rPr lang="en-US" dirty="0"/>
+              <a:t>void </a:t>
+            </a:r>
+            <a:r>
+              <a:rPr lang="en-US" dirty="0" err="1"/>
+              <a:t>TurnOffDevice</a:t>
+            </a:r>
+            <a:r>
+              <a:rPr lang="en-US" dirty="0"/>
+              <a:t>();</a:t>
+            </a:r>
+          </a:p>
+          <a:p>
+            <a:r>
+              <a:rPr lang="en-US" dirty="0"/>
+              <a:t>void </a:t>
+            </a:r>
+            <a:r>
+              <a:rPr lang="en-US" dirty="0" err="1"/>
+              <a:t>TurnOnDevice</a:t>
+            </a:r>
+            <a:r>
+              <a:rPr lang="en-US" dirty="0"/>
+              <a:t>();</a:t>
+            </a:r>
+          </a:p>
+          <a:p>
+            <a:r>
+              <a:rPr lang="en-US" dirty="0"/>
+              <a:t>void </a:t>
+            </a:r>
+            <a:r>
+              <a:rPr lang="en-US" dirty="0" err="1"/>
+              <a:t>AdjustDevice</a:t>
+            </a:r>
+            <a:r>
+              <a:rPr lang="en-US" dirty="0"/>
+              <a:t>(int value);</a:t>
+            </a:r>
+          </a:p>
+          <a:p>
+            <a:endParaRPr lang="en-US" dirty="0"/>
+          </a:p>
+        </p:txBody>
+      </p:sp>
+      <p:cxnSp>
+        <p:nvCxnSpPr>
+          <p:cNvPr id="37" name="Straight Arrow Connector 17">
+            <a:extLst>
+              <a:ext uri="{FF2B5EF4-FFF2-40B4-BE49-F238E27FC236}">
+                <a16:creationId xmlns:a16="http://schemas.microsoft.com/office/drawing/2014/main" id="{FA9F5739-0F17-AB2B-7F62-21A16B54EBAD}"/>
+              </a:ext>
+            </a:extLst>
+          </p:cNvPr>
+          <p:cNvCxnSpPr>
+            <a:cxnSpLocks/>
+            <a:stCxn id="33" idx="0"/>
+          </p:cNvCxnSpPr>
+          <p:nvPr/>
+        </p:nvCxnSpPr>
+        <p:spPr>
+          <a:xfrm rot="16200000" flipV="1">
+            <a:off x="5193099" y="3215846"/>
+            <a:ext cx="350198" cy="2076490"/>
+          </a:xfrm>
+          <a:prstGeom prst="bentConnector2">
+            <a:avLst/>
+          </a:prstGeom>
+          <a:ln>
+            <a:tailEnd type="triangle"/>
+          </a:ln>
+        </p:spPr>
+        <p:style>
+          <a:lnRef idx="1">
+            <a:schemeClr val="dk1"/>
+          </a:lnRef>
+          <a:fillRef idx="0">
+            <a:schemeClr val="dk1"/>
+          </a:fillRef>
+          <a:effectRef idx="0">
+            <a:schemeClr val="dk1"/>
+          </a:effectRef>
+          <a:fontRef idx="minor">
+            <a:schemeClr val="tx1"/>
+          </a:fontRef>
+        </p:style>
+      </p:cxnSp>
+      <p:cxnSp>
+        <p:nvCxnSpPr>
+          <p:cNvPr id="71" name="Straight Arrow Connector 17">
+            <a:extLst>
+              <a:ext uri="{FF2B5EF4-FFF2-40B4-BE49-F238E27FC236}">
+                <a16:creationId xmlns:a16="http://schemas.microsoft.com/office/drawing/2014/main" id="{D402AE5D-E7B4-BCB7-4431-8E12770D65EF}"/>
+              </a:ext>
+            </a:extLst>
+          </p:cNvPr>
+          <p:cNvCxnSpPr>
+            <a:cxnSpLocks/>
+          </p:cNvCxnSpPr>
+          <p:nvPr/>
+        </p:nvCxnSpPr>
+        <p:spPr>
+          <a:xfrm rot="10800000">
+            <a:off x="8203376" y="5569760"/>
+            <a:ext cx="1858403" cy="434356"/>
+          </a:xfrm>
+          <a:prstGeom prst="bentConnector3">
+            <a:avLst>
+              <a:gd name="adj1" fmla="val 7309"/>
+            </a:avLst>
+          </a:prstGeom>
+          <a:ln>
+            <a:tailEnd type="triangle"/>
+          </a:ln>
+        </p:spPr>
+        <p:style>
+          <a:lnRef idx="1">
+            <a:schemeClr val="dk1"/>
+          </a:lnRef>
+          <a:fillRef idx="0">
+            <a:schemeClr val="dk1"/>
+          </a:fillRef>
+          <a:effectRef idx="0">
+            <a:schemeClr val="dk1"/>
+          </a:effectRef>
+          <a:fontRef idx="minor">
+            <a:schemeClr val="tx1"/>
+          </a:fontRef>
+        </p:style>
+      </p:cxnSp>
+      <p:sp>
+        <p:nvSpPr>
+          <p:cNvPr id="74" name="TextBox 73">
+            <a:extLst>
+              <a:ext uri="{FF2B5EF4-FFF2-40B4-BE49-F238E27FC236}">
+                <a16:creationId xmlns:a16="http://schemas.microsoft.com/office/drawing/2014/main" id="{E8B12CC5-A239-D536-4BD3-2B3987830D72}"/>
+              </a:ext>
+            </a:extLst>
+          </p:cNvPr>
+          <p:cNvSpPr txBox="1"/>
+          <p:nvPr/>
+        </p:nvSpPr>
+        <p:spPr>
+          <a:xfrm>
+            <a:off x="10088578" y="3549843"/>
+            <a:ext cx="2051975" cy="369332"/>
+          </a:xfrm>
+          <a:prstGeom prst="rect">
+            <a:avLst/>
+          </a:prstGeom>
+          <a:noFill/>
+        </p:spPr>
+        <p:txBody>
+          <a:bodyPr wrap="square" rtlCol="0">
+            <a:spAutoFit/>
+          </a:bodyPr>
+          <a:lstStyle/>
+          <a:p>
+            <a:r>
+              <a:rPr lang="en-US" dirty="0" err="1"/>
+              <a:t>MusicSystem</a:t>
+            </a:r>
+            <a:endParaRPr lang="en-IN" dirty="0"/>
+          </a:p>
+        </p:txBody>
+      </p:sp>
+      <p:sp>
+        <p:nvSpPr>
+          <p:cNvPr id="75" name="Rectangle 74">
+            <a:extLst>
+              <a:ext uri="{FF2B5EF4-FFF2-40B4-BE49-F238E27FC236}">
+                <a16:creationId xmlns:a16="http://schemas.microsoft.com/office/drawing/2014/main" id="{0E4CD42B-F2F9-771E-9BE1-E445178B5BDA}"/>
+              </a:ext>
+            </a:extLst>
+          </p:cNvPr>
+          <p:cNvSpPr/>
+          <p:nvPr/>
+        </p:nvSpPr>
+        <p:spPr>
+          <a:xfrm>
+            <a:off x="10075177" y="3364312"/>
+            <a:ext cx="2051975" cy="765777"/>
+          </a:xfrm>
+          <a:prstGeom prst="rect">
+            <a:avLst/>
+          </a:prstGeom>
+          <a:noFill/>
+          <a:ln>
+            <a:solidFill>
+              <a:schemeClr val="bg2">
+                <a:lumMod val="10000"/>
+              </a:schemeClr>
+            </a:solidFill>
+          </a:ln>
+        </p:spPr>
+        <p:style>
+          <a:lnRef idx="2">
+            <a:schemeClr val="accent1">
+              <a:shade val="50000"/>
+            </a:schemeClr>
+          </a:lnRef>
+          <a:fillRef idx="1">
+            <a:schemeClr val="accent1"/>
+          </a:fillRef>
+          <a:effectRef idx="0">
+            <a:schemeClr val="accent1"/>
+          </a:effectRef>
+          <a:fontRef idx="minor">
+            <a:schemeClr val="lt1"/>
+          </a:fontRef>
+        </p:style>
+        <p:txBody>
+          <a:bodyPr rtlCol="0" anchor="ctr"/>
+          <a:lstStyle/>
+          <a:p>
+            <a:pPr algn="ctr"/>
+            <a:endParaRPr lang="en-IN"/>
+          </a:p>
+        </p:txBody>
+      </p:sp>
+      <p:sp>
+        <p:nvSpPr>
+          <p:cNvPr id="76" name="TextBox 75">
+            <a:extLst>
+              <a:ext uri="{FF2B5EF4-FFF2-40B4-BE49-F238E27FC236}">
+                <a16:creationId xmlns:a16="http://schemas.microsoft.com/office/drawing/2014/main" id="{2293C80C-05CB-3B49-6E7F-C73705EAFC6A}"/>
+              </a:ext>
+            </a:extLst>
+          </p:cNvPr>
+          <p:cNvSpPr txBox="1"/>
+          <p:nvPr/>
+        </p:nvSpPr>
+        <p:spPr>
+          <a:xfrm>
+            <a:off x="10052253" y="4676879"/>
+            <a:ext cx="1961690" cy="369332"/>
+          </a:xfrm>
+          <a:prstGeom prst="rect">
+            <a:avLst/>
+          </a:prstGeom>
+          <a:noFill/>
+        </p:spPr>
+        <p:txBody>
+          <a:bodyPr wrap="square" rtlCol="0">
+            <a:spAutoFit/>
+          </a:bodyPr>
+          <a:lstStyle/>
+          <a:p>
+            <a:r>
+              <a:rPr lang="en-US" dirty="0" err="1"/>
+              <a:t>SecurityCamera</a:t>
+            </a:r>
+            <a:endParaRPr lang="en-IN" dirty="0"/>
+          </a:p>
+        </p:txBody>
+      </p:sp>
+      <p:sp>
+        <p:nvSpPr>
+          <p:cNvPr id="77" name="Rectangle 76">
+            <a:extLst>
+              <a:ext uri="{FF2B5EF4-FFF2-40B4-BE49-F238E27FC236}">
+                <a16:creationId xmlns:a16="http://schemas.microsoft.com/office/drawing/2014/main" id="{3460E997-4B78-7170-C6AF-E9A8A246917A}"/>
+              </a:ext>
+            </a:extLst>
+          </p:cNvPr>
+          <p:cNvSpPr/>
+          <p:nvPr/>
+        </p:nvSpPr>
+        <p:spPr>
+          <a:xfrm>
+            <a:off x="10088578" y="4465965"/>
+            <a:ext cx="2051975" cy="765777"/>
+          </a:xfrm>
+          <a:prstGeom prst="rect">
+            <a:avLst/>
+          </a:prstGeom>
+          <a:noFill/>
+          <a:ln>
+            <a:solidFill>
+              <a:schemeClr val="bg2">
+                <a:lumMod val="10000"/>
+              </a:schemeClr>
+            </a:solidFill>
+          </a:ln>
+        </p:spPr>
+        <p:style>
+          <a:lnRef idx="2">
+            <a:schemeClr val="accent1">
+              <a:shade val="50000"/>
+            </a:schemeClr>
+          </a:lnRef>
+          <a:fillRef idx="1">
+            <a:schemeClr val="accent1"/>
+          </a:fillRef>
+          <a:effectRef idx="0">
+            <a:schemeClr val="accent1"/>
+          </a:effectRef>
+          <a:fontRef idx="minor">
+            <a:schemeClr val="lt1"/>
+          </a:fontRef>
+        </p:style>
+        <p:txBody>
+          <a:bodyPr rtlCol="0" anchor="ctr"/>
+          <a:lstStyle/>
+          <a:p>
+            <a:pPr algn="ctr"/>
+            <a:endParaRPr lang="en-IN"/>
+          </a:p>
+        </p:txBody>
+      </p:sp>
+      <p:sp>
+        <p:nvSpPr>
+          <p:cNvPr id="78" name="TextBox 77">
+            <a:extLst>
+              <a:ext uri="{FF2B5EF4-FFF2-40B4-BE49-F238E27FC236}">
+                <a16:creationId xmlns:a16="http://schemas.microsoft.com/office/drawing/2014/main" id="{9771C93A-48F8-A1D4-59CC-83FC2737A2A7}"/>
+              </a:ext>
+            </a:extLst>
+          </p:cNvPr>
+          <p:cNvSpPr txBox="1"/>
+          <p:nvPr/>
+        </p:nvSpPr>
+        <p:spPr>
+          <a:xfrm>
+            <a:off x="10075177" y="5806760"/>
+            <a:ext cx="2051975" cy="369332"/>
+          </a:xfrm>
+          <a:prstGeom prst="rect">
+            <a:avLst/>
+          </a:prstGeom>
+          <a:noFill/>
+        </p:spPr>
+        <p:txBody>
+          <a:bodyPr wrap="square" rtlCol="0">
+            <a:spAutoFit/>
+          </a:bodyPr>
+          <a:lstStyle/>
+          <a:p>
+            <a:r>
+              <a:rPr lang="en-US" dirty="0"/>
+              <a:t>Lights</a:t>
+            </a:r>
+            <a:endParaRPr lang="en-IN" dirty="0"/>
+          </a:p>
+        </p:txBody>
+      </p:sp>
+      <p:sp>
+        <p:nvSpPr>
+          <p:cNvPr id="79" name="Rectangle 78">
+            <a:extLst>
+              <a:ext uri="{FF2B5EF4-FFF2-40B4-BE49-F238E27FC236}">
+                <a16:creationId xmlns:a16="http://schemas.microsoft.com/office/drawing/2014/main" id="{3C65AD0F-0AE7-D598-C2F4-F01F0E0695C8}"/>
+              </a:ext>
+            </a:extLst>
+          </p:cNvPr>
+          <p:cNvSpPr/>
+          <p:nvPr/>
+        </p:nvSpPr>
+        <p:spPr>
+          <a:xfrm>
+            <a:off x="10061776" y="5621229"/>
+            <a:ext cx="2051975" cy="765777"/>
+          </a:xfrm>
+          <a:prstGeom prst="rect">
+            <a:avLst/>
+          </a:prstGeom>
+          <a:noFill/>
+          <a:ln>
+            <a:solidFill>
+              <a:schemeClr val="bg2">
+                <a:lumMod val="10000"/>
+              </a:schemeClr>
+            </a:solidFill>
+          </a:ln>
+        </p:spPr>
+        <p:style>
+          <a:lnRef idx="2">
+            <a:schemeClr val="accent1">
+              <a:shade val="50000"/>
+            </a:schemeClr>
+          </a:lnRef>
+          <a:fillRef idx="1">
+            <a:schemeClr val="accent1"/>
+          </a:fillRef>
+          <a:effectRef idx="0">
+            <a:schemeClr val="accent1"/>
+          </a:effectRef>
+          <a:fontRef idx="minor">
+            <a:schemeClr val="lt1"/>
+          </a:fontRef>
+        </p:style>
+        <p:txBody>
+          <a:bodyPr rtlCol="0" anchor="ctr"/>
+          <a:lstStyle/>
+          <a:p>
+            <a:pPr algn="ctr"/>
+            <a:endParaRPr lang="en-IN"/>
+          </a:p>
+        </p:txBody>
+      </p:sp>
+      <p:cxnSp>
+        <p:nvCxnSpPr>
+          <p:cNvPr id="80" name="Straight Arrow Connector 17">
+            <a:extLst>
+              <a:ext uri="{FF2B5EF4-FFF2-40B4-BE49-F238E27FC236}">
+                <a16:creationId xmlns:a16="http://schemas.microsoft.com/office/drawing/2014/main" id="{661AE82D-F3EC-DACA-389B-A818DB7262F2}"/>
+              </a:ext>
+            </a:extLst>
+          </p:cNvPr>
+          <p:cNvCxnSpPr>
+            <a:cxnSpLocks/>
+            <a:stCxn id="77" idx="1"/>
+            <a:endCxn id="33" idx="3"/>
+          </p:cNvCxnSpPr>
+          <p:nvPr/>
+        </p:nvCxnSpPr>
+        <p:spPr>
+          <a:xfrm rot="10800000" flipV="1">
+            <a:off x="8203376" y="4848854"/>
+            <a:ext cx="1885202" cy="720906"/>
+          </a:xfrm>
+          <a:prstGeom prst="bentConnector3">
+            <a:avLst>
+              <a:gd name="adj1" fmla="val 50000"/>
+            </a:avLst>
+          </a:prstGeom>
+          <a:ln>
+            <a:tailEnd type="triangle"/>
+          </a:ln>
+        </p:spPr>
+        <p:style>
+          <a:lnRef idx="1">
+            <a:schemeClr val="dk1"/>
+          </a:lnRef>
+          <a:fillRef idx="0">
+            <a:schemeClr val="dk1"/>
+          </a:fillRef>
+          <a:effectRef idx="0">
+            <a:schemeClr val="dk1"/>
+          </a:effectRef>
+          <a:fontRef idx="minor">
+            <a:schemeClr val="tx1"/>
+          </a:fontRef>
+        </p:style>
+      </p:cxnSp>
+      <p:cxnSp>
+        <p:nvCxnSpPr>
+          <p:cNvPr id="81" name="Straight Arrow Connector 17">
+            <a:extLst>
+              <a:ext uri="{FF2B5EF4-FFF2-40B4-BE49-F238E27FC236}">
+                <a16:creationId xmlns:a16="http://schemas.microsoft.com/office/drawing/2014/main" id="{05869FD4-240B-F66E-92B1-A3AB18CA67F8}"/>
+              </a:ext>
+            </a:extLst>
+          </p:cNvPr>
+          <p:cNvCxnSpPr>
+            <a:cxnSpLocks/>
+            <a:stCxn id="75" idx="1"/>
+            <a:endCxn id="33" idx="3"/>
+          </p:cNvCxnSpPr>
+          <p:nvPr/>
+        </p:nvCxnSpPr>
+        <p:spPr>
+          <a:xfrm rot="10800000" flipV="1">
+            <a:off x="8203377" y="3747200"/>
+            <a:ext cx="1871801" cy="1822559"/>
+          </a:xfrm>
+          <a:prstGeom prst="bentConnector3">
+            <a:avLst>
+              <a:gd name="adj1" fmla="val 50000"/>
+            </a:avLst>
+          </a:prstGeom>
+          <a:ln>
+            <a:tailEnd type="triangle"/>
+          </a:ln>
+        </p:spPr>
+        <p:style>
+          <a:lnRef idx="1">
+            <a:schemeClr val="dk1"/>
+          </a:lnRef>
+          <a:fillRef idx="0">
+            <a:schemeClr val="dk1"/>
+          </a:fillRef>
+          <a:effectRef idx="0">
+            <a:schemeClr val="dk1"/>
+          </a:effectRef>
+          <a:fontRef idx="minor">
+            <a:schemeClr val="tx1"/>
+          </a:fontRef>
+        </p:style>
+      </p:cxnSp>
+    </p:spTree>
+    <p:extLst>
+      <p:ext uri="{BB962C8B-B14F-4D97-AF65-F5344CB8AC3E}">
+        <p14:creationId xmlns:p14="http://schemas.microsoft.com/office/powerpoint/2010/main" val="592478941"/>
+      </p:ext>
+    </p:extLst>
+  </p:cSld>
+  <p:clrMapOvr>
+    <a:masterClrMapping/>
+  </p:clrMapOvr>
+  <p:timing>
+    <p:tnLst>
+      <p:par>
+        <p:cTn id="1" dur="indefinite" restart="never" nodeType="tmRoot">
+          <p:childTnLst>
+            <p:seq concurrent="1" nextAc="seek">
+              <p:cTn id="2" dur="indefinite" nodeType="mainSeq">
+                <p:childTnLst>
+                  <p:par>
+                    <p:cTn id="3" fill="hold">
+                      <p:stCondLst>
+                        <p:cond delay="indefinite"/>
+                      </p:stCondLst>
+                      <p:childTnLst>
+                        <p:par>
+                          <p:cTn id="4" fill="hold">
+                            <p:stCondLst>
+                              <p:cond delay="0"/>
+                            </p:stCondLst>
+                            <p:childTnLst>
+                              <p:par>
+                                <p:cTn id="5" presetID="1" presetClass="emph" presetSubtype="2" fill="hold" nodeType="clickEffect">
+                                  <p:stCondLst>
+                                    <p:cond delay="0"/>
+                                  </p:stCondLst>
+                                  <p:childTnLst>
+                                    <p:animClr clrSpc="rgb" dir="cw">
+                                      <p:cBhvr>
+                                        <p:cTn id="6" dur="2000" fill="hold"/>
+                                        <p:tgtEl>
+                                          <p:spTgt spid="80"/>
+                                        </p:tgtEl>
+                                        <p:attrNameLst>
+                                          <p:attrName>fillcolor</p:attrName>
+                                        </p:attrNameLst>
+                                      </p:cBhvr>
+                                      <p:to>
+                                        <a:schemeClr val="accent2"/>
+                                      </p:to>
+                                    </p:animClr>
+                                    <p:set>
+                                      <p:cBhvr>
+                                        <p:cTn id="7" dur="2000" fill="hold"/>
+                                        <p:tgtEl>
+                                          <p:spTgt spid="80"/>
+                                        </p:tgtEl>
+                                        <p:attrNameLst>
+                                          <p:attrName>fill.type</p:attrName>
+                                        </p:attrNameLst>
+                                      </p:cBhvr>
+                                      <p:to>
+                                        <p:strVal val="solid"/>
+                                      </p:to>
+                                    </p:set>
+                                    <p:set>
+                                      <p:cBhvr>
+                                        <p:cTn id="8" dur="2000" fill="hold"/>
+                                        <p:tgtEl>
+                                          <p:spTgt spid="80"/>
+                                        </p:tgtEl>
+                                        <p:attrNameLst>
+                                          <p:attrName>fill.on</p:attrName>
+                                        </p:attrNameLst>
+                                      </p:cBhvr>
+                                      <p:to>
+                                        <p:strVal val="true"/>
+                                      </p:to>
+                                    </p:set>
+                                  </p:childTnLst>
+                                </p:cTn>
+                              </p:par>
+                            </p:childTnLst>
+                          </p:cTn>
+                        </p:par>
+                      </p:childTnLst>
+                    </p:cTn>
+                  </p:par>
+                  <p:par>
+                    <p:cTn id="9" fill="hold">
+                      <p:stCondLst>
+                        <p:cond delay="indefinite"/>
+                      </p:stCondLst>
+                      <p:childTnLst>
+                        <p:par>
+                          <p:cTn id="10" fill="hold">
+                            <p:stCondLst>
+                              <p:cond delay="0"/>
+                            </p:stCondLst>
+                            <p:childTnLst>
+                              <p:par>
+                                <p:cTn id="11" presetID="1" presetClass="emph" presetSubtype="2" fill="hold" nodeType="clickEffect">
+                                  <p:stCondLst>
+                                    <p:cond delay="0"/>
+                                  </p:stCondLst>
+                                  <p:childTnLst>
+                                    <p:animClr clrSpc="rgb" dir="cw">
+                                      <p:cBhvr>
+                                        <p:cTn id="12" dur="2000" fill="hold"/>
+                                        <p:tgtEl>
+                                          <p:spTgt spid="81"/>
+                                        </p:tgtEl>
+                                        <p:attrNameLst>
+                                          <p:attrName>fillcolor</p:attrName>
+                                        </p:attrNameLst>
+                                      </p:cBhvr>
+                                      <p:to>
+                                        <a:schemeClr val="accent2"/>
+                                      </p:to>
+                                    </p:animClr>
+                                    <p:set>
+                                      <p:cBhvr>
+                                        <p:cTn id="13" dur="2000" fill="hold"/>
+                                        <p:tgtEl>
+                                          <p:spTgt spid="81"/>
+                                        </p:tgtEl>
+                                        <p:attrNameLst>
+                                          <p:attrName>fill.type</p:attrName>
+                                        </p:attrNameLst>
+                                      </p:cBhvr>
+                                      <p:to>
+                                        <p:strVal val="solid"/>
+                                      </p:to>
+                                    </p:set>
+                                    <p:set>
+                                      <p:cBhvr>
+                                        <p:cTn id="14" dur="2000" fill="hold"/>
+                                        <p:tgtEl>
+                                          <p:spTgt spid="81"/>
+                                        </p:tgtEl>
+                                        <p:attrNameLst>
+                                          <p:attrName>fill.on</p:attrName>
+                                        </p:attrNameLst>
+                                      </p:cBhvr>
+                                      <p:to>
+                                        <p:strVal val="true"/>
+                                      </p:to>
+                                    </p:set>
+                                  </p:childTnLst>
+                                </p:cTn>
+                              </p:par>
+                            </p:childTnLst>
+                          </p:cTn>
+                        </p:par>
+                      </p:childTnLst>
+                    </p:cTn>
+                  </p:par>
+                </p:childTnLst>
+              </p:cTn>
+              <p:prevCondLst>
+                <p:cond evt="onPrev" delay="0">
+                  <p:tgtEl>
+                    <p:sldTgt/>
+                  </p:tgtEl>
+                </p:cond>
+              </p:prevCondLst>
+              <p:nextCondLst>
+                <p:cond evt="onNext" delay="0">
+                  <p:tgtEl>
+                    <p:sldTgt/>
+                  </p:tgtEl>
+                </p:cond>
+              </p:nextCondLst>
+            </p:seq>
+          </p:childTnLst>
+        </p:cTn>
+      </p:par>
+    </p:tnLst>
+  </p:timing>
 </p:sld>
 </file>
 

</xml_diff>